<commit_message>
init debug Technical and FunctionalException
com.dummy.myerp.technical.exception.FunctionalException
</commit_message>
<xml_diff>
--- a/doc/Présentation_OCP9_projetB4.pptx
+++ b/doc/Présentation_OCP9_projetB4.pptx
@@ -5,20 +5,23 @@
     <p:sldMasterId id="2147483790" r:id="rId34"/>
   </p:sldMasterIdLst>
   <p:notesMasterIdLst>
-    <p:notesMasterId r:id="rId38"/>
+    <p:notesMasterId r:id="rId41"/>
   </p:notesMasterIdLst>
   <p:handoutMasterIdLst>
-    <p:handoutMasterId r:id="rId39"/>
+    <p:handoutMasterId r:id="rId42"/>
   </p:handoutMasterIdLst>
   <p:sldIdLst>
     <p:sldId id="256" r:id="rId35"/>
     <p:sldId id="257" r:id="rId36"/>
     <p:sldId id="258" r:id="rId37"/>
+    <p:sldId id="259" r:id="rId38"/>
+    <p:sldId id="260" r:id="rId39"/>
+    <p:sldId id="261" r:id="rId40"/>
   </p:sldIdLst>
   <p:sldSz cx="9144000" cy="5143500" type="screen16x9"/>
   <p:notesSz cx="6858000" cy="9144000"/>
   <p:custDataLst>
-    <p:tags r:id="rId40"/>
+    <p:tags r:id="rId43"/>
   </p:custDataLst>
   <p:defaultTextStyle>
     <a:defPPr lvl="0">
@@ -117,7 +120,7 @@
   </p:defaultTextStyle>
   <p:extLst>
     <p:ext uri="{EFAFB233-063F-42B5-8137-9DF3F51BA10A}">
-      <p15:sldGuideLst xmlns:p15="http://schemas.microsoft.com/office/powerpoint/2012/main" xmlns="">
+      <p15:sldGuideLst xmlns="" xmlns:p15="http://schemas.microsoft.com/office/powerpoint/2012/main">
         <p15:guide id="1" orient="horz" pos="1620" userDrawn="1">
           <p15:clr>
             <a:srgbClr val="A4A3A4"/>
@@ -131,7 +134,7 @@
       </p15:sldGuideLst>
     </p:ext>
     <p:ext uri="{2D200454-40CA-4A62-9FC3-DE9A4176ACB9}">
-      <p15:notesGuideLst xmlns:p15="http://schemas.microsoft.com/office/powerpoint/2012/main" xmlns="">
+      <p15:notesGuideLst xmlns="" xmlns:p15="http://schemas.microsoft.com/office/powerpoint/2012/main">
         <p15:guide id="1" orient="horz" pos="2880">
           <p15:clr>
             <a:srgbClr val="A4A3A4"/>
@@ -230,7 +233,7 @@
           <a:p>
             <a:fld id="{04C3C42E-F14B-43F4-9917-B663E421A4BC}" type="datetime1">
               <a:rPr lang="en-GB" smtClean="0"/>
-              <a:t>11/12/2020</a:t>
+              <a:t>18/12/2020</a:t>
             </a:fld>
             <a:endParaRPr lang="en-GB" dirty="0"/>
           </a:p>
@@ -552,7 +555,7 @@
           <a:p>
             <a:fld id="{66D87BF4-87F9-4694-AD8C-50CF69A6B1A5}" type="datetime1">
               <a:rPr lang="en-GB" smtClean="0"/>
-              <a:t>11/12/2020</a:t>
+              <a:t>18/12/2020</a:t>
             </a:fld>
             <a:endParaRPr lang="en-GB" dirty="0"/>
           </a:p>
@@ -928,7 +931,7 @@
           <p:cNvPr id="6" name="Frame picture 1">
             <a:extLst>
               <a:ext uri="{FF2B5EF4-FFF2-40B4-BE49-F238E27FC236}">
-                <a16:creationId xmlns:a16="http://schemas.microsoft.com/office/drawing/2014/main" xmlns="" id="{65E86301-1998-EF4F-B706-B9BC864A3BF7}"/>
+                <a16:creationId xmlns="" xmlns:a16="http://schemas.microsoft.com/office/drawing/2014/main" id="{65E86301-1998-EF4F-B706-B9BC864A3BF7}"/>
               </a:ext>
             </a:extLst>
           </p:cNvPr>
@@ -975,7 +978,7 @@
           <p:cNvPr id="2" name="Title 1">
             <a:extLst>
               <a:ext uri="{FF2B5EF4-FFF2-40B4-BE49-F238E27FC236}">
-                <a16:creationId xmlns:a16="http://schemas.microsoft.com/office/drawing/2014/main" xmlns="" id="{CF267043-749E-4CC4-95FD-6FA8F074C44A}"/>
+                <a16:creationId xmlns="" xmlns:a16="http://schemas.microsoft.com/office/drawing/2014/main" id="{CF267043-749E-4CC4-95FD-6FA8F074C44A}"/>
               </a:ext>
             </a:extLst>
           </p:cNvPr>
@@ -1070,7 +1073,7 @@
           <p:cNvPr id="5" name="Title 1">
             <a:extLst>
               <a:ext uri="{FF2B5EF4-FFF2-40B4-BE49-F238E27FC236}">
-                <a16:creationId xmlns:a16="http://schemas.microsoft.com/office/drawing/2014/main" xmlns="" id="{CAF4CD65-24E4-4A2C-9857-C8365CEDC4DA}"/>
+                <a16:creationId xmlns="" xmlns:a16="http://schemas.microsoft.com/office/drawing/2014/main" id="{CAF4CD65-24E4-4A2C-9857-C8365CEDC4DA}"/>
               </a:ext>
             </a:extLst>
           </p:cNvPr>
@@ -1115,7 +1118,7 @@
           <a:p>
             <a:fld id="{1A1F3D4D-7719-4C9C-984C-2B0A0637B460}" type="datetime1">
               <a:rPr lang="en-GB" smtClean="0"/>
-              <a:t>11/12/2020</a:t>
+              <a:t>18/12/2020</a:t>
             </a:fld>
             <a:endParaRPr lang="nl-NL" dirty="0"/>
           </a:p>
@@ -1183,7 +1186,7 @@
   </p:clrMapOvr>
   <p:extLst>
     <p:ext uri="{DCECCB84-F9BA-43D5-87BE-67443E8EF086}">
-      <p15:sldGuideLst xmlns:p15="http://schemas.microsoft.com/office/powerpoint/2012/main" xmlns=""/>
+      <p15:sldGuideLst xmlns="" xmlns:p15="http://schemas.microsoft.com/office/powerpoint/2012/main"/>
     </p:ext>
   </p:extLst>
 </p:sldLayout>
@@ -1275,7 +1278,7 @@
           <p:cNvPr id="6" name="Title 1">
             <a:extLst>
               <a:ext uri="{FF2B5EF4-FFF2-40B4-BE49-F238E27FC236}">
-                <a16:creationId xmlns:a16="http://schemas.microsoft.com/office/drawing/2014/main" xmlns="" id="{41571FD5-12B2-421F-9B07-99071A4E6161}"/>
+                <a16:creationId xmlns="" xmlns:a16="http://schemas.microsoft.com/office/drawing/2014/main" id="{41571FD5-12B2-421F-9B07-99071A4E6161}"/>
               </a:ext>
             </a:extLst>
           </p:cNvPr>
@@ -1320,7 +1323,7 @@
           <a:p>
             <a:fld id="{04464E88-4E71-4354-BE7A-174CCCF59950}" type="datetime1">
               <a:rPr lang="en-GB" smtClean="0"/>
-              <a:t>11/12/2020</a:t>
+              <a:t>18/12/2020</a:t>
             </a:fld>
             <a:endParaRPr lang="nl-NL" dirty="0"/>
           </a:p>
@@ -1411,7 +1414,7 @@
           <p:cNvPr id="6" name="Title 1">
             <a:extLst>
               <a:ext uri="{FF2B5EF4-FFF2-40B4-BE49-F238E27FC236}">
-                <a16:creationId xmlns:a16="http://schemas.microsoft.com/office/drawing/2014/main" xmlns="" id="{67AF7496-90D2-4A52-8B85-42B4E4BF71E7}"/>
+                <a16:creationId xmlns="" xmlns:a16="http://schemas.microsoft.com/office/drawing/2014/main" id="{67AF7496-90D2-4A52-8B85-42B4E4BF71E7}"/>
               </a:ext>
             </a:extLst>
           </p:cNvPr>
@@ -1456,7 +1459,7 @@
           <a:p>
             <a:fld id="{8BCE2C7E-1904-4A76-9B4D-1FA6CB4C91CD}" type="datetime1">
               <a:rPr lang="en-GB" smtClean="0"/>
-              <a:t>11/12/2020</a:t>
+              <a:t>18/12/2020</a:t>
             </a:fld>
             <a:endParaRPr lang="nl-NL" dirty="0"/>
           </a:p>
@@ -1559,7 +1562,7 @@
           <a:p>
             <a:fld id="{A4AD7718-3417-4D0A-9590-03A5DBFAF68F}" type="datetime1">
               <a:rPr lang="en-GB" smtClean="0"/>
-              <a:t>11/12/2020</a:t>
+              <a:t>18/12/2020</a:t>
             </a:fld>
             <a:endParaRPr lang="nl-NL" dirty="0"/>
           </a:p>
@@ -1801,7 +1804,7 @@
           <a:p>
             <a:fld id="{3D169808-AA3B-4028-A830-A5012111354C}" type="datetime1">
               <a:rPr lang="en-GB" smtClean="0"/>
-              <a:t>11/12/2020</a:t>
+              <a:t>18/12/2020</a:t>
             </a:fld>
             <a:endParaRPr lang="nl-NL" dirty="0"/>
           </a:p>
@@ -2188,7 +2191,7 @@
   </p:txStyles>
   <p:extLst mod="1">
     <p:ext uri="{27BBF7A9-308A-43DC-89C8-2F10F3537804}">
-      <p15:sldGuideLst xmlns:p15="http://schemas.microsoft.com/office/powerpoint/2012/main" xmlns="">
+      <p15:sldGuideLst xmlns="" xmlns:p15="http://schemas.microsoft.com/office/powerpoint/2012/main">
         <p15:guide id="1" orient="horz" pos="3103" userDrawn="1">
           <p15:clr>
             <a:srgbClr val="000000"/>
@@ -2375,8 +2378,8 @@
         </p:blipFill>
         <p:spPr bwMode="auto">
           <a:xfrm>
-            <a:off x="271084" y="2197989"/>
-            <a:ext cx="4095330" cy="1508379"/>
+            <a:off x="427371" y="2503410"/>
+            <a:ext cx="3782756" cy="1393253"/>
           </a:xfrm>
           <a:prstGeom prst="rect">
             <a:avLst/>
@@ -2429,8 +2432,8 @@
         </p:blipFill>
         <p:spPr bwMode="auto">
           <a:xfrm>
-            <a:off x="271084" y="176405"/>
-            <a:ext cx="4095330" cy="1934477"/>
+            <a:off x="427371" y="716581"/>
+            <a:ext cx="3782756" cy="1786829"/>
           </a:xfrm>
           <a:prstGeom prst="rect">
             <a:avLst/>
@@ -2483,8 +2486,8 @@
         </p:blipFill>
         <p:spPr bwMode="auto">
           <a:xfrm>
-            <a:off x="4750845" y="176405"/>
-            <a:ext cx="3764641" cy="2204463"/>
+            <a:off x="4485880" y="716581"/>
+            <a:ext cx="3420452" cy="2002916"/>
           </a:xfrm>
           <a:prstGeom prst="rect">
             <a:avLst/>
@@ -2537,8 +2540,8 @@
         </p:blipFill>
         <p:spPr bwMode="auto">
           <a:xfrm>
-            <a:off x="4750844" y="2380868"/>
-            <a:ext cx="3764641" cy="2303074"/>
+            <a:off x="4494814" y="2719497"/>
+            <a:ext cx="3411518" cy="2087046"/>
           </a:xfrm>
           <a:prstGeom prst="rect">
             <a:avLst/>
@@ -2576,7 +2579,7 @@
         </p:nvSpPr>
         <p:spPr>
           <a:xfrm>
-            <a:off x="271084" y="3852672"/>
+            <a:off x="271084" y="3901440"/>
             <a:ext cx="4095330" cy="1038746"/>
           </a:xfrm>
           <a:prstGeom prst="rect">
@@ -2635,6 +2638,38 @@
               <a:t>() appropriée à notre besoin.</a:t>
             </a:r>
             <a:endParaRPr lang="fr-FR" dirty="0"/>
+          </a:p>
+        </p:txBody>
+      </p:sp>
+      <p:sp>
+        <p:nvSpPr>
+          <p:cNvPr id="7" name="Titre 3"/>
+          <p:cNvSpPr>
+            <a:spLocks noGrp="1"/>
+          </p:cNvSpPr>
+          <p:nvPr>
+            <p:ph type="title"/>
+          </p:nvPr>
+        </p:nvSpPr>
+        <p:spPr>
+          <a:xfrm>
+            <a:off x="271084" y="292418"/>
+            <a:ext cx="8714184" cy="301621"/>
+          </a:xfrm>
+        </p:spPr>
+        <p:txBody>
+          <a:bodyPr/>
+          <a:lstStyle/>
+          <a:p>
+            <a:r>
+              <a:rPr lang="fr-FR" sz="2000" dirty="0" smtClean="0"/>
+              <a:t>écriture comptable : </a:t>
+            </a:r>
+            <a:r>
+              <a:rPr lang="fr-FR" sz="2000" dirty="0" err="1" smtClean="0"/>
+              <a:t>éQUILIBRE</a:t>
+            </a:r>
+            <a:endParaRPr lang="fr-FR" sz="2000" dirty="0"/>
           </a:p>
         </p:txBody>
       </p:sp>
@@ -2677,42 +2712,301 @@
       </p:grpSpPr>
       <p:sp>
         <p:nvSpPr>
-          <p:cNvPr id="2" name="Espace réservé du contenu 1"/>
+          <p:cNvPr id="4" name="Titre 3"/>
           <p:cNvSpPr>
             <a:spLocks noGrp="1"/>
           </p:cNvSpPr>
           <p:nvPr>
-            <p:ph sz="quarter" idx="13"/>
+            <p:ph type="title"/>
           </p:nvPr>
         </p:nvSpPr>
-        <p:spPr/>
+        <p:spPr>
+          <a:xfrm>
+            <a:off x="213122" y="339924"/>
+            <a:ext cx="8714184" cy="301621"/>
+          </a:xfrm>
+        </p:spPr>
         <p:txBody>
           <a:bodyPr/>
           <a:lstStyle/>
           <a:p>
-            <a:endParaRPr lang="fr-FR"/>
+            <a:r>
+              <a:rPr lang="fr-FR" sz="2000" dirty="0"/>
+              <a:t>Ajoute une référence à l'écriture comptable</a:t>
+            </a:r>
+            <a:endParaRPr lang="fr-FR" sz="2000" dirty="0"/>
+          </a:p>
+        </p:txBody>
+      </p:sp>
+      <p:pic>
+        <p:nvPicPr>
+          <p:cNvPr id="1026" name="Picture 2"/>
+          <p:cNvPicPr>
+            <a:picLocks noGrp="1" noChangeAspect="1" noChangeArrowheads="1"/>
+          </p:cNvPicPr>
+          <p:nvPr>
+            <p:ph sz="quarter" idx="13"/>
+          </p:nvPr>
+        </p:nvPicPr>
+        <p:blipFill>
+          <a:blip r:embed="rId2">
+            <a:extLst>
+              <a:ext uri="{28A0092B-C50C-407E-A947-70E740481C1C}">
+                <a14:useLocalDpi xmlns:a14="http://schemas.microsoft.com/office/drawing/2010/main" val="0"/>
+              </a:ext>
+            </a:extLst>
+          </a:blip>
+          <a:srcRect/>
+          <a:stretch>
+            <a:fillRect/>
+          </a:stretch>
+        </p:blipFill>
+        <p:spPr bwMode="auto">
+          <a:xfrm>
+            <a:off x="2021905" y="1291148"/>
+            <a:ext cx="1995359" cy="706876"/>
+          </a:xfrm>
+          <a:prstGeom prst="rect">
+            <a:avLst/>
+          </a:prstGeom>
+          <a:noFill/>
+          <a:ln>
+            <a:noFill/>
+          </a:ln>
+          <a:extLst>
+            <a:ext uri="{909E8E84-426E-40DD-AFC4-6F175D3DCCD1}">
+              <a14:hiddenFill xmlns:a14="http://schemas.microsoft.com/office/drawing/2010/main">
+                <a:solidFill>
+                  <a:schemeClr val="accent1"/>
+                </a:solidFill>
+              </a14:hiddenFill>
+            </a:ext>
+            <a:ext uri="{91240B29-F687-4F45-9708-019B960494DF}">
+              <a14:hiddenLine xmlns:a14="http://schemas.microsoft.com/office/drawing/2010/main" w="9525">
+                <a:solidFill>
+                  <a:schemeClr val="tx1"/>
+                </a:solidFill>
+                <a:miter lim="800000"/>
+                <a:headEnd/>
+                <a:tailEnd/>
+              </a14:hiddenLine>
+            </a:ext>
+          </a:extLst>
+        </p:spPr>
+      </p:pic>
+      <p:pic>
+        <p:nvPicPr>
+          <p:cNvPr id="1027" name="Picture 3"/>
+          <p:cNvPicPr>
+            <a:picLocks noChangeAspect="1" noChangeArrowheads="1"/>
+          </p:cNvPicPr>
+          <p:nvPr/>
+        </p:nvPicPr>
+        <p:blipFill>
+          <a:blip r:embed="rId3">
+            <a:extLst>
+              <a:ext uri="{28A0092B-C50C-407E-A947-70E740481C1C}">
+                <a14:useLocalDpi xmlns:a14="http://schemas.microsoft.com/office/drawing/2010/main" val="0"/>
+              </a:ext>
+            </a:extLst>
+          </a:blip>
+          <a:srcRect/>
+          <a:stretch>
+            <a:fillRect/>
+          </a:stretch>
+        </p:blipFill>
+        <p:spPr bwMode="auto">
+          <a:xfrm>
+            <a:off x="471297" y="1326261"/>
+            <a:ext cx="1400632" cy="636651"/>
+          </a:xfrm>
+          <a:prstGeom prst="rect">
+            <a:avLst/>
+          </a:prstGeom>
+          <a:noFill/>
+          <a:ln>
+            <a:noFill/>
+          </a:ln>
+          <a:extLst>
+            <a:ext uri="{909E8E84-426E-40DD-AFC4-6F175D3DCCD1}">
+              <a14:hiddenFill xmlns:a14="http://schemas.microsoft.com/office/drawing/2010/main">
+                <a:solidFill>
+                  <a:schemeClr val="accent1"/>
+                </a:solidFill>
+              </a14:hiddenFill>
+            </a:ext>
+            <a:ext uri="{91240B29-F687-4F45-9708-019B960494DF}">
+              <a14:hiddenLine xmlns:a14="http://schemas.microsoft.com/office/drawing/2010/main" w="9525">
+                <a:solidFill>
+                  <a:schemeClr val="tx1"/>
+                </a:solidFill>
+                <a:miter lim="800000"/>
+                <a:headEnd/>
+                <a:tailEnd/>
+              </a14:hiddenLine>
+            </a:ext>
+          </a:extLst>
+        </p:spPr>
+      </p:pic>
+      <p:sp>
+        <p:nvSpPr>
+          <p:cNvPr id="5" name="ZoneTexte 4"/>
+          <p:cNvSpPr txBox="1"/>
+          <p:nvPr/>
+        </p:nvSpPr>
+        <p:spPr>
+          <a:xfrm>
+            <a:off x="426720" y="926592"/>
+            <a:ext cx="3206496" cy="207749"/>
+          </a:xfrm>
+          <a:prstGeom prst="rect">
+            <a:avLst/>
+          </a:prstGeom>
+          <a:noFill/>
+        </p:spPr>
+        <p:txBody>
+          <a:bodyPr wrap="square" lIns="0" tIns="0" rIns="0" bIns="0" rtlCol="0">
+            <a:spAutoFit/>
+          </a:bodyPr>
+          <a:lstStyle/>
+          <a:p>
+            <a:r>
+              <a:rPr lang="fr-FR" dirty="0" smtClean="0"/>
+              <a:t>Ajustement des attributs en BDD</a:t>
+            </a:r>
+            <a:endParaRPr lang="fr-FR" dirty="0"/>
           </a:p>
         </p:txBody>
       </p:sp>
       <p:sp>
         <p:nvSpPr>
-          <p:cNvPr id="3" name="Espace réservé du contenu 2"/>
-          <p:cNvSpPr>
-            <a:spLocks noGrp="1"/>
-          </p:cNvSpPr>
-          <p:nvPr>
-            <p:ph sz="quarter" idx="14"/>
-          </p:nvPr>
+          <p:cNvPr id="8" name="ZoneTexte 7"/>
+          <p:cNvSpPr txBox="1"/>
+          <p:nvPr/>
         </p:nvSpPr>
-        <p:spPr/>
+        <p:spPr>
+          <a:xfrm>
+            <a:off x="426720" y="2231136"/>
+            <a:ext cx="3645408" cy="207749"/>
+          </a:xfrm>
+          <a:prstGeom prst="rect">
+            <a:avLst/>
+          </a:prstGeom>
+          <a:noFill/>
+        </p:spPr>
         <p:txBody>
-          <a:bodyPr/>
+          <a:bodyPr wrap="square" lIns="0" tIns="0" rIns="0" bIns="0" rtlCol="0">
+            <a:spAutoFit/>
+          </a:bodyPr>
           <a:lstStyle/>
           <a:p>
-            <a:endParaRPr lang="fr-FR"/>
+            <a:r>
+              <a:rPr lang="fr-FR" dirty="0" smtClean="0"/>
+              <a:t>Calcul de </a:t>
+            </a:r>
+            <a:r>
+              <a:rPr lang="fr-FR" dirty="0"/>
+              <a:t>la séquence (</a:t>
+            </a:r>
+            <a:r>
+              <a:rPr lang="fr-FR" dirty="0" smtClean="0"/>
+              <a:t>RG_Compta_5)</a:t>
+            </a:r>
+            <a:endParaRPr lang="fr-FR" dirty="0"/>
           </a:p>
         </p:txBody>
       </p:sp>
+      <p:pic>
+        <p:nvPicPr>
+          <p:cNvPr id="1028" name="Picture 4"/>
+          <p:cNvPicPr>
+            <a:picLocks noChangeAspect="1" noChangeArrowheads="1"/>
+          </p:cNvPicPr>
+          <p:nvPr/>
+        </p:nvPicPr>
+        <p:blipFill>
+          <a:blip r:embed="rId4">
+            <a:extLst>
+              <a:ext uri="{28A0092B-C50C-407E-A947-70E740481C1C}">
+                <a14:useLocalDpi xmlns:a14="http://schemas.microsoft.com/office/drawing/2010/main" val="0"/>
+              </a:ext>
+            </a:extLst>
+          </a:blip>
+          <a:srcRect/>
+          <a:stretch>
+            <a:fillRect/>
+          </a:stretch>
+        </p:blipFill>
+        <p:spPr bwMode="auto">
+          <a:xfrm>
+            <a:off x="471297" y="2614422"/>
+            <a:ext cx="3984114" cy="1872234"/>
+          </a:xfrm>
+          <a:prstGeom prst="rect">
+            <a:avLst/>
+          </a:prstGeom>
+          <a:noFill/>
+          <a:ln>
+            <a:noFill/>
+          </a:ln>
+          <a:extLst>
+            <a:ext uri="{909E8E84-426E-40DD-AFC4-6F175D3DCCD1}">
+              <a14:hiddenFill xmlns:a14="http://schemas.microsoft.com/office/drawing/2010/main">
+                <a:solidFill>
+                  <a:schemeClr val="accent1"/>
+                </a:solidFill>
+              </a14:hiddenFill>
+            </a:ext>
+            <a:ext uri="{91240B29-F687-4F45-9708-019B960494DF}">
+              <a14:hiddenLine xmlns:a14="http://schemas.microsoft.com/office/drawing/2010/main" w="9525">
+                <a:solidFill>
+                  <a:schemeClr val="tx1"/>
+                </a:solidFill>
+                <a:miter lim="800000"/>
+                <a:headEnd/>
+                <a:tailEnd/>
+              </a14:hiddenLine>
+            </a:ext>
+          </a:extLst>
+        </p:spPr>
+      </p:pic>
+    </p:spTree>
+    <p:extLst>
+      <p:ext uri="{BB962C8B-B14F-4D97-AF65-F5344CB8AC3E}">
+        <p14:creationId xmlns:p14="http://schemas.microsoft.com/office/powerpoint/2010/main" val="649944897"/>
+      </p:ext>
+    </p:extLst>
+  </p:cSld>
+  <p:clrMapOvr>
+    <a:masterClrMapping/>
+  </p:clrMapOvr>
+  <p:timing>
+    <p:tnLst>
+      <p:par>
+        <p:cTn id="1" dur="indefinite" restart="never" nodeType="tmRoot"/>
+      </p:par>
+    </p:tnLst>
+  </p:timing>
+</p:sld>
+</file>
+
+<file path=ppt/slides/slide4.xml><?xml version="1.0" encoding="utf-8"?>
+<p:sld xmlns:a="http://schemas.openxmlformats.org/drawingml/2006/main" xmlns:r="http://schemas.openxmlformats.org/officeDocument/2006/relationships" xmlns:p="http://schemas.openxmlformats.org/presentationml/2006/main">
+  <p:cSld>
+    <p:spTree>
+      <p:nvGrpSpPr>
+        <p:cNvPr id="1" name=""/>
+        <p:cNvGrpSpPr/>
+        <p:nvPr/>
+      </p:nvGrpSpPr>
+      <p:grpSpPr>
+        <a:xfrm>
+          <a:off x="0" y="0"/>
+          <a:ext cx="0" cy="0"/>
+          <a:chOff x="0" y="0"/>
+          <a:chExt cx="0" cy="0"/>
+        </a:xfrm>
+      </p:grpSpPr>
       <p:sp>
         <p:nvSpPr>
           <p:cNvPr id="4" name="Titre 3"/>
@@ -2723,19 +3017,484 @@
             <p:ph type="title"/>
           </p:nvPr>
         </p:nvSpPr>
-        <p:spPr/>
+        <p:spPr>
+          <a:xfrm>
+            <a:off x="213122" y="339924"/>
+            <a:ext cx="8714184" cy="301621"/>
+          </a:xfrm>
+        </p:spPr>
         <p:txBody>
           <a:bodyPr/>
           <a:lstStyle/>
           <a:p>
-            <a:endParaRPr lang="fr-FR"/>
+            <a:r>
+              <a:rPr lang="fr-FR" sz="2000" dirty="0"/>
+              <a:t>Ajoute une référence à l'écriture comptable</a:t>
+            </a:r>
+            <a:endParaRPr lang="fr-FR" sz="2000" dirty="0"/>
+          </a:p>
+        </p:txBody>
+      </p:sp>
+      <p:pic>
+        <p:nvPicPr>
+          <p:cNvPr id="2050" name="Picture 2"/>
+          <p:cNvPicPr>
+            <a:picLocks noGrp="1" noChangeAspect="1" noChangeArrowheads="1"/>
+          </p:cNvPicPr>
+          <p:nvPr>
+            <p:ph sz="quarter" idx="13"/>
+          </p:nvPr>
+        </p:nvPicPr>
+        <p:blipFill>
+          <a:blip r:embed="rId2">
+            <a:extLst>
+              <a:ext uri="{28A0092B-C50C-407E-A947-70E740481C1C}">
+                <a14:useLocalDpi xmlns:a14="http://schemas.microsoft.com/office/drawing/2010/main" val="0"/>
+              </a:ext>
+            </a:extLst>
+          </a:blip>
+          <a:srcRect/>
+          <a:stretch>
+            <a:fillRect/>
+          </a:stretch>
+        </p:blipFill>
+        <p:spPr bwMode="auto">
+          <a:xfrm>
+            <a:off x="288523" y="822960"/>
+            <a:ext cx="3966484" cy="2048114"/>
+          </a:xfrm>
+          <a:prstGeom prst="rect">
+            <a:avLst/>
+          </a:prstGeom>
+          <a:noFill/>
+          <a:ln>
+            <a:noFill/>
+          </a:ln>
+          <a:extLst>
+            <a:ext uri="{909E8E84-426E-40DD-AFC4-6F175D3DCCD1}">
+              <a14:hiddenFill xmlns:a14="http://schemas.microsoft.com/office/drawing/2010/main">
+                <a:solidFill>
+                  <a:schemeClr val="accent1"/>
+                </a:solidFill>
+              </a14:hiddenFill>
+            </a:ext>
+            <a:ext uri="{91240B29-F687-4F45-9708-019B960494DF}">
+              <a14:hiddenLine xmlns:a14="http://schemas.microsoft.com/office/drawing/2010/main" w="9525">
+                <a:solidFill>
+                  <a:schemeClr val="tx1"/>
+                </a:solidFill>
+                <a:miter lim="800000"/>
+                <a:headEnd/>
+                <a:tailEnd/>
+              </a14:hiddenLine>
+            </a:ext>
+          </a:extLst>
+        </p:spPr>
+      </p:pic>
+      <p:pic>
+        <p:nvPicPr>
+          <p:cNvPr id="2055" name="Picture 7"/>
+          <p:cNvPicPr>
+            <a:picLocks noChangeAspect="1" noChangeArrowheads="1"/>
+          </p:cNvPicPr>
+          <p:nvPr/>
+        </p:nvPicPr>
+        <p:blipFill>
+          <a:blip r:embed="rId3">
+            <a:extLst>
+              <a:ext uri="{28A0092B-C50C-407E-A947-70E740481C1C}">
+                <a14:useLocalDpi xmlns:a14="http://schemas.microsoft.com/office/drawing/2010/main" val="0"/>
+              </a:ext>
+            </a:extLst>
+          </a:blip>
+          <a:srcRect/>
+          <a:stretch>
+            <a:fillRect/>
+          </a:stretch>
+        </p:blipFill>
+        <p:spPr bwMode="auto">
+          <a:xfrm>
+            <a:off x="294511" y="2991857"/>
+            <a:ext cx="3960495" cy="1959780"/>
+          </a:xfrm>
+          <a:prstGeom prst="rect">
+            <a:avLst/>
+          </a:prstGeom>
+          <a:noFill/>
+          <a:ln>
+            <a:noFill/>
+          </a:ln>
+          <a:extLst>
+            <a:ext uri="{909E8E84-426E-40DD-AFC4-6F175D3DCCD1}">
+              <a14:hiddenFill xmlns:a14="http://schemas.microsoft.com/office/drawing/2010/main">
+                <a:solidFill>
+                  <a:schemeClr val="accent1"/>
+                </a:solidFill>
+              </a14:hiddenFill>
+            </a:ext>
+            <a:ext uri="{91240B29-F687-4F45-9708-019B960494DF}">
+              <a14:hiddenLine xmlns:a14="http://schemas.microsoft.com/office/drawing/2010/main" w="9525">
+                <a:solidFill>
+                  <a:schemeClr val="tx1"/>
+                </a:solidFill>
+                <a:miter lim="800000"/>
+                <a:headEnd/>
+                <a:tailEnd/>
+              </a14:hiddenLine>
+            </a:ext>
+          </a:extLst>
+        </p:spPr>
+      </p:pic>
+    </p:spTree>
+    <p:extLst>
+      <p:ext uri="{BB962C8B-B14F-4D97-AF65-F5344CB8AC3E}">
+        <p14:creationId xmlns:p14="http://schemas.microsoft.com/office/powerpoint/2010/main" val="2088120194"/>
+      </p:ext>
+    </p:extLst>
+  </p:cSld>
+  <p:clrMapOvr>
+    <a:masterClrMapping/>
+  </p:clrMapOvr>
+  <p:timing>
+    <p:tnLst>
+      <p:par>
+        <p:cTn id="1" dur="indefinite" restart="never" nodeType="tmRoot"/>
+      </p:par>
+    </p:tnLst>
+  </p:timing>
+</p:sld>
+</file>
+
+<file path=ppt/slides/slide5.xml><?xml version="1.0" encoding="utf-8"?>
+<p:sld xmlns:a="http://schemas.openxmlformats.org/drawingml/2006/main" xmlns:r="http://schemas.openxmlformats.org/officeDocument/2006/relationships" xmlns:p="http://schemas.openxmlformats.org/presentationml/2006/main">
+  <p:cSld>
+    <p:spTree>
+      <p:nvGrpSpPr>
+        <p:cNvPr id="1" name=""/>
+        <p:cNvGrpSpPr/>
+        <p:nvPr/>
+      </p:nvGrpSpPr>
+      <p:grpSpPr>
+        <a:xfrm>
+          <a:off x="0" y="0"/>
+          <a:ext cx="0" cy="0"/>
+          <a:chOff x="0" y="0"/>
+          <a:chExt cx="0" cy="0"/>
+        </a:xfrm>
+      </p:grpSpPr>
+      <p:sp>
+        <p:nvSpPr>
+          <p:cNvPr id="4" name="Titre 3"/>
+          <p:cNvSpPr>
+            <a:spLocks noGrp="1"/>
+          </p:cNvSpPr>
+          <p:nvPr>
+            <p:ph type="title"/>
+          </p:nvPr>
+        </p:nvSpPr>
+        <p:spPr>
+          <a:xfrm>
+            <a:off x="213122" y="339924"/>
+            <a:ext cx="8714184" cy="301621"/>
+          </a:xfrm>
+        </p:spPr>
+        <p:txBody>
+          <a:bodyPr/>
+          <a:lstStyle/>
+          <a:p>
+            <a:r>
+              <a:rPr lang="fr-FR" sz="2000" dirty="0"/>
+              <a:t>Ajoute une référence à l'écriture comptable</a:t>
+            </a:r>
+            <a:endParaRPr lang="fr-FR" sz="2000" dirty="0"/>
+          </a:p>
+        </p:txBody>
+      </p:sp>
+      <p:pic>
+        <p:nvPicPr>
+          <p:cNvPr id="2053" name="Picture 5"/>
+          <p:cNvPicPr>
+            <a:picLocks noChangeAspect="1" noChangeArrowheads="1"/>
+          </p:cNvPicPr>
+          <p:nvPr/>
+        </p:nvPicPr>
+        <p:blipFill>
+          <a:blip r:embed="rId2">
+            <a:extLst>
+              <a:ext uri="{28A0092B-C50C-407E-A947-70E740481C1C}">
+                <a14:useLocalDpi xmlns:a14="http://schemas.microsoft.com/office/drawing/2010/main" val="0"/>
+              </a:ext>
+            </a:extLst>
+          </a:blip>
+          <a:srcRect/>
+          <a:stretch>
+            <a:fillRect/>
+          </a:stretch>
+        </p:blipFill>
+        <p:spPr bwMode="auto">
+          <a:xfrm>
+            <a:off x="329926" y="698731"/>
+            <a:ext cx="4254266" cy="2247195"/>
+          </a:xfrm>
+          <a:prstGeom prst="rect">
+            <a:avLst/>
+          </a:prstGeom>
+          <a:noFill/>
+          <a:ln>
+            <a:noFill/>
+          </a:ln>
+          <a:extLst>
+            <a:ext uri="{909E8E84-426E-40DD-AFC4-6F175D3DCCD1}">
+              <a14:hiddenFill xmlns:a14="http://schemas.microsoft.com/office/drawing/2010/main">
+                <a:solidFill>
+                  <a:schemeClr val="accent1"/>
+                </a:solidFill>
+              </a14:hiddenFill>
+            </a:ext>
+            <a:ext uri="{91240B29-F687-4F45-9708-019B960494DF}">
+              <a14:hiddenLine xmlns:a14="http://schemas.microsoft.com/office/drawing/2010/main" w="9525">
+                <a:solidFill>
+                  <a:schemeClr val="tx1"/>
+                </a:solidFill>
+                <a:miter lim="800000"/>
+                <a:headEnd/>
+                <a:tailEnd/>
+              </a14:hiddenLine>
+            </a:ext>
+          </a:extLst>
+        </p:spPr>
+      </p:pic>
+      <p:pic>
+        <p:nvPicPr>
+          <p:cNvPr id="2054" name="Picture 6"/>
+          <p:cNvPicPr>
+            <a:picLocks noChangeAspect="1" noChangeArrowheads="1"/>
+          </p:cNvPicPr>
+          <p:nvPr/>
+        </p:nvPicPr>
+        <p:blipFill>
+          <a:blip r:embed="rId3">
+            <a:extLst>
+              <a:ext uri="{28A0092B-C50C-407E-A947-70E740481C1C}">
+                <a14:useLocalDpi xmlns:a14="http://schemas.microsoft.com/office/drawing/2010/main" val="0"/>
+              </a:ext>
+            </a:extLst>
+          </a:blip>
+          <a:srcRect/>
+          <a:stretch>
+            <a:fillRect/>
+          </a:stretch>
+        </p:blipFill>
+        <p:spPr bwMode="auto">
+          <a:xfrm>
+            <a:off x="4713556" y="698731"/>
+            <a:ext cx="4322670" cy="2064352"/>
+          </a:xfrm>
+          <a:prstGeom prst="rect">
+            <a:avLst/>
+          </a:prstGeom>
+          <a:noFill/>
+          <a:ln>
+            <a:noFill/>
+          </a:ln>
+          <a:extLst>
+            <a:ext uri="{909E8E84-426E-40DD-AFC4-6F175D3DCCD1}">
+              <a14:hiddenFill xmlns:a14="http://schemas.microsoft.com/office/drawing/2010/main">
+                <a:solidFill>
+                  <a:schemeClr val="accent1"/>
+                </a:solidFill>
+              </a14:hiddenFill>
+            </a:ext>
+            <a:ext uri="{91240B29-F687-4F45-9708-019B960494DF}">
+              <a14:hiddenLine xmlns:a14="http://schemas.microsoft.com/office/drawing/2010/main" w="9525">
+                <a:solidFill>
+                  <a:schemeClr val="tx1"/>
+                </a:solidFill>
+                <a:miter lim="800000"/>
+                <a:headEnd/>
+                <a:tailEnd/>
+              </a14:hiddenLine>
+            </a:ext>
+          </a:extLst>
+        </p:spPr>
+      </p:pic>
+      <p:pic>
+        <p:nvPicPr>
+          <p:cNvPr id="4098" name="Picture 2"/>
+          <p:cNvPicPr>
+            <a:picLocks noChangeAspect="1" noChangeArrowheads="1"/>
+          </p:cNvPicPr>
+          <p:nvPr/>
+        </p:nvPicPr>
+        <p:blipFill>
+          <a:blip r:embed="rId4">
+            <a:extLst>
+              <a:ext uri="{28A0092B-C50C-407E-A947-70E740481C1C}">
+                <a14:useLocalDpi xmlns:a14="http://schemas.microsoft.com/office/drawing/2010/main" val="0"/>
+              </a:ext>
+            </a:extLst>
+          </a:blip>
+          <a:srcRect/>
+          <a:stretch>
+            <a:fillRect/>
+          </a:stretch>
+        </p:blipFill>
+        <p:spPr bwMode="auto">
+          <a:xfrm>
+            <a:off x="4713556" y="2945925"/>
+            <a:ext cx="2583356" cy="920321"/>
+          </a:xfrm>
+          <a:prstGeom prst="rect">
+            <a:avLst/>
+          </a:prstGeom>
+          <a:noFill/>
+          <a:ln>
+            <a:noFill/>
+          </a:ln>
+          <a:extLst>
+            <a:ext uri="{909E8E84-426E-40DD-AFC4-6F175D3DCCD1}">
+              <a14:hiddenFill xmlns:a14="http://schemas.microsoft.com/office/drawing/2010/main">
+                <a:solidFill>
+                  <a:schemeClr val="accent1"/>
+                </a:solidFill>
+              </a14:hiddenFill>
+            </a:ext>
+            <a:ext uri="{91240B29-F687-4F45-9708-019B960494DF}">
+              <a14:hiddenLine xmlns:a14="http://schemas.microsoft.com/office/drawing/2010/main" w="9525">
+                <a:solidFill>
+                  <a:schemeClr val="tx1"/>
+                </a:solidFill>
+                <a:miter lim="800000"/>
+                <a:headEnd/>
+                <a:tailEnd/>
+              </a14:hiddenLine>
+            </a:ext>
+          </a:extLst>
+        </p:spPr>
+      </p:pic>
+      <p:pic>
+        <p:nvPicPr>
+          <p:cNvPr id="4099" name="Picture 3"/>
+          <p:cNvPicPr>
+            <a:picLocks noChangeAspect="1" noChangeArrowheads="1"/>
+          </p:cNvPicPr>
+          <p:nvPr/>
+        </p:nvPicPr>
+        <p:blipFill>
+          <a:blip r:embed="rId5">
+            <a:extLst>
+              <a:ext uri="{28A0092B-C50C-407E-A947-70E740481C1C}">
+                <a14:useLocalDpi xmlns:a14="http://schemas.microsoft.com/office/drawing/2010/main" val="0"/>
+              </a:ext>
+            </a:extLst>
+          </a:blip>
+          <a:srcRect/>
+          <a:stretch>
+            <a:fillRect/>
+          </a:stretch>
+        </p:blipFill>
+        <p:spPr bwMode="auto">
+          <a:xfrm>
+            <a:off x="4721044" y="3938016"/>
+            <a:ext cx="2575868" cy="759148"/>
+          </a:xfrm>
+          <a:prstGeom prst="rect">
+            <a:avLst/>
+          </a:prstGeom>
+          <a:noFill/>
+          <a:ln>
+            <a:noFill/>
+          </a:ln>
+          <a:extLst>
+            <a:ext uri="{909E8E84-426E-40DD-AFC4-6F175D3DCCD1}">
+              <a14:hiddenFill xmlns:a14="http://schemas.microsoft.com/office/drawing/2010/main">
+                <a:solidFill>
+                  <a:schemeClr val="accent1"/>
+                </a:solidFill>
+              </a14:hiddenFill>
+            </a:ext>
+            <a:ext uri="{91240B29-F687-4F45-9708-019B960494DF}">
+              <a14:hiddenLine xmlns:a14="http://schemas.microsoft.com/office/drawing/2010/main" w="9525">
+                <a:solidFill>
+                  <a:schemeClr val="tx1"/>
+                </a:solidFill>
+                <a:miter lim="800000"/>
+                <a:headEnd/>
+                <a:tailEnd/>
+              </a14:hiddenLine>
+            </a:ext>
+          </a:extLst>
+        </p:spPr>
+      </p:pic>
+    </p:spTree>
+    <p:extLst>
+      <p:ext uri="{BB962C8B-B14F-4D97-AF65-F5344CB8AC3E}">
+        <p14:creationId xmlns:p14="http://schemas.microsoft.com/office/powerpoint/2010/main" val="1414833865"/>
+      </p:ext>
+    </p:extLst>
+  </p:cSld>
+  <p:clrMapOvr>
+    <a:masterClrMapping/>
+  </p:clrMapOvr>
+  <p:timing>
+    <p:tnLst>
+      <p:par>
+        <p:cTn id="1" dur="indefinite" restart="never" nodeType="tmRoot"/>
+      </p:par>
+    </p:tnLst>
+  </p:timing>
+</p:sld>
+</file>
+
+<file path=ppt/slides/slide6.xml><?xml version="1.0" encoding="utf-8"?>
+<p:sld xmlns:a="http://schemas.openxmlformats.org/drawingml/2006/main" xmlns:r="http://schemas.openxmlformats.org/officeDocument/2006/relationships" xmlns:p="http://schemas.openxmlformats.org/presentationml/2006/main">
+  <p:cSld>
+    <p:spTree>
+      <p:nvGrpSpPr>
+        <p:cNvPr id="1" name=""/>
+        <p:cNvGrpSpPr/>
+        <p:nvPr/>
+      </p:nvGrpSpPr>
+      <p:grpSpPr>
+        <a:xfrm>
+          <a:off x="0" y="0"/>
+          <a:ext cx="0" cy="0"/>
+          <a:chOff x="0" y="0"/>
+          <a:chExt cx="0" cy="0"/>
+        </a:xfrm>
+      </p:grpSpPr>
+      <p:sp>
+        <p:nvSpPr>
+          <p:cNvPr id="4" name="Titre 3"/>
+          <p:cNvSpPr>
+            <a:spLocks noGrp="1"/>
+          </p:cNvSpPr>
+          <p:nvPr>
+            <p:ph type="title"/>
+          </p:nvPr>
+        </p:nvSpPr>
+        <p:spPr>
+          <a:xfrm>
+            <a:off x="213122" y="339924"/>
+            <a:ext cx="8714184" cy="301621"/>
+          </a:xfrm>
+        </p:spPr>
+        <p:txBody>
+          <a:bodyPr/>
+          <a:lstStyle/>
+          <a:p>
+            <a:r>
+              <a:rPr lang="fr-FR" sz="2000" dirty="0"/>
+              <a:t>Ajoute une référence à l'écriture comptable</a:t>
+            </a:r>
+            <a:endParaRPr lang="fr-FR" sz="2000" dirty="0"/>
           </a:p>
         </p:txBody>
       </p:sp>
     </p:spTree>
     <p:extLst>
       <p:ext uri="{BB962C8B-B14F-4D97-AF65-F5344CB8AC3E}">
-        <p14:creationId xmlns:p14="http://schemas.microsoft.com/office/powerpoint/2010/main" val="649944897"/>
+        <p14:creationId xmlns:p14="http://schemas.microsoft.com/office/powerpoint/2010/main" val="578192977"/>
       </p:ext>
     </p:extLst>
   </p:cSld>
@@ -3069,7 +3828,7 @@
   </a:custClrLst>
   <a:extLst>
     <a:ext uri="{05A4C25C-085E-4340-85A3-A5531E510DB2}">
-      <thm15:themeFamily xmlns:thm15="http://schemas.microsoft.com/office/thememl/2012/main" xmlns="" name="Blank.potx" id="{D8CCFB3A-CA66-4E30-A885-EFBD64A1E9D9}" vid="{BF2D768E-DF08-4D64-BCAB-8216E154572B}"/>
+      <thm15:themeFamily xmlns="" xmlns:thm15="http://schemas.microsoft.com/office/thememl/2012/main" name="Blank.potx" id="{D8CCFB3A-CA66-4E30-A885-EFBD64A1E9D9}" vid="{BF2D768E-DF08-4D64-BCAB-8216E154572B}"/>
     </a:ext>
   </a:extLst>
 </a:theme>
@@ -3658,6 +4417,62 @@
 </file>
 
 <file path=customXml/itemProps1.xml><?xml version="1.0" encoding="utf-8"?>
+<ds:datastoreItem xmlns:ds="http://schemas.openxmlformats.org/officeDocument/2006/customXml" ds:itemID="{13100955-99DD-4F1D-B284-562F25173232}">
+  <ds:schemaRefs>
+    <ds:schemaRef ds:uri="http://www.joulesunlimited.com/juid"/>
+  </ds:schemaRefs>
+</ds:datastoreItem>
+</file>
+
+<file path=customXml/itemProps10.xml><?xml version="1.0" encoding="utf-8"?>
+<ds:datastoreItem xmlns:ds="http://schemas.openxmlformats.org/officeDocument/2006/customXml" ds:itemID="{4FCC20A6-1F8E-4FD8-A432-F84132A3DB86}">
+  <ds:schemaRefs>
+    <ds:schemaRef ds:uri="http://www.joulesunlimited.com/juid"/>
+  </ds:schemaRefs>
+</ds:datastoreItem>
+</file>
+
+<file path=customXml/itemProps11.xml><?xml version="1.0" encoding="utf-8"?>
+<ds:datastoreItem xmlns:ds="http://schemas.openxmlformats.org/officeDocument/2006/customXml" ds:itemID="{0553E0E7-1207-467A-862E-153EF903819B}">
+  <ds:schemaRefs>
+    <ds:schemaRef ds:uri="http://www.joulesunlimited.com/juid"/>
+  </ds:schemaRefs>
+</ds:datastoreItem>
+</file>
+
+<file path=customXml/itemProps12.xml><?xml version="1.0" encoding="utf-8"?>
+<ds:datastoreItem xmlns:ds="http://schemas.openxmlformats.org/officeDocument/2006/customXml" ds:itemID="{0A116FEA-2A43-4A18-8ADE-FE586D59B1F4}">
+  <ds:schemaRefs>
+    <ds:schemaRef ds:uri="http://www.joulesunlimited.com/juid"/>
+  </ds:schemaRefs>
+</ds:datastoreItem>
+</file>
+
+<file path=customXml/itemProps13.xml><?xml version="1.0" encoding="utf-8"?>
+<ds:datastoreItem xmlns:ds="http://schemas.openxmlformats.org/officeDocument/2006/customXml" ds:itemID="{8B6D617A-0FB1-4CA1-BA4C-BE06DE77381F}">
+  <ds:schemaRefs>
+    <ds:schemaRef ds:uri="http://www.joulesunlimited.com/juid"/>
+  </ds:schemaRefs>
+</ds:datastoreItem>
+</file>
+
+<file path=customXml/itemProps14.xml><?xml version="1.0" encoding="utf-8"?>
+<ds:datastoreItem xmlns:ds="http://schemas.openxmlformats.org/officeDocument/2006/customXml" ds:itemID="{0407DC00-3AD9-4765-9ECD-EC27EC34C724}">
+  <ds:schemaRefs>
+    <ds:schemaRef ds:uri="http://www.joulesunlimited.com/juid"/>
+  </ds:schemaRefs>
+</ds:datastoreItem>
+</file>
+
+<file path=customXml/itemProps15.xml><?xml version="1.0" encoding="utf-8"?>
+<ds:datastoreItem xmlns:ds="http://schemas.openxmlformats.org/officeDocument/2006/customXml" ds:itemID="{3D3EEC19-198B-4DBF-968B-617470FE52A3}">
+  <ds:schemaRefs>
+    <ds:schemaRef ds:uri="http://www.joulesunlimited.com/juid"/>
+  </ds:schemaRefs>
+</ds:datastoreItem>
+</file>
+
+<file path=customXml/itemProps16.xml><?xml version="1.0" encoding="utf-8"?>
 <ds:datastoreItem xmlns:ds="http://schemas.openxmlformats.org/officeDocument/2006/customXml" ds:itemID="{272EBBDC-D360-4348-913A-50BDC586F769}">
   <ds:schemaRefs>
     <ds:schemaRef ds:uri="http://www.joulesunlimited.com/juid"/>
@@ -3665,15 +4480,15 @@
 </ds:datastoreItem>
 </file>
 
-<file path=customXml/itemProps10.xml><?xml version="1.0" encoding="utf-8"?>
-<ds:datastoreItem xmlns:ds="http://schemas.openxmlformats.org/officeDocument/2006/customXml" ds:itemID="{E5A43A96-145C-4051-B26F-63E30B16E14A}">
+<file path=customXml/itemProps17.xml><?xml version="1.0" encoding="utf-8"?>
+<ds:datastoreItem xmlns:ds="http://schemas.openxmlformats.org/officeDocument/2006/customXml" ds:itemID="{6A900602-4AA5-4175-B192-210836D17189}">
   <ds:schemaRefs>
     <ds:schemaRef ds:uri="http://www.joulesunlimited.com/juid"/>
   </ds:schemaRefs>
 </ds:datastoreItem>
 </file>
 
-<file path=customXml/itemProps11.xml><?xml version="1.0" encoding="utf-8"?>
+<file path=customXml/itemProps18.xml><?xml version="1.0" encoding="utf-8"?>
 <ds:datastoreItem xmlns:ds="http://schemas.openxmlformats.org/officeDocument/2006/customXml" ds:itemID="{CE178A92-2A4A-4337-B7B7-67EB322B5A46}">
   <ds:schemaRefs>
     <ds:schemaRef ds:uri="http://www.joulesunlimited.com/juid"/>
@@ -3681,15 +4496,15 @@
 </ds:datastoreItem>
 </file>
 
-<file path=customXml/itemProps12.xml><?xml version="1.0" encoding="utf-8"?>
-<ds:datastoreItem xmlns:ds="http://schemas.openxmlformats.org/officeDocument/2006/customXml" ds:itemID="{BA388501-9B54-4C94-A6D2-E2FCF940976D}">
+<file path=customXml/itemProps19.xml><?xml version="1.0" encoding="utf-8"?>
+<ds:datastoreItem xmlns:ds="http://schemas.openxmlformats.org/officeDocument/2006/customXml" ds:itemID="{4A602AE2-C421-49AA-A620-FC4F38415B84}">
   <ds:schemaRefs>
     <ds:schemaRef ds:uri="http://www.joulesunlimited.com/juid"/>
   </ds:schemaRefs>
 </ds:datastoreItem>
 </file>
 
-<file path=customXml/itemProps13.xml><?xml version="1.0" encoding="utf-8"?>
+<file path=customXml/itemProps2.xml><?xml version="1.0" encoding="utf-8"?>
 <ds:datastoreItem xmlns:ds="http://schemas.openxmlformats.org/officeDocument/2006/customXml" ds:itemID="{1371732C-77C3-47EE-BF45-4B66918F92B9}">
   <ds:schemaRefs>
     <ds:schemaRef ds:uri="http://www.joulesunlimited.com/juid"/>
@@ -3697,80 +4512,24 @@
 </ds:datastoreItem>
 </file>
 
-<file path=customXml/itemProps14.xml><?xml version="1.0" encoding="utf-8"?>
-<ds:datastoreItem xmlns:ds="http://schemas.openxmlformats.org/officeDocument/2006/customXml" ds:itemID="{12A90D42-96F5-4AA3-8B57-0B593BA25485}">
+<file path=customXml/itemProps20.xml><?xml version="1.0" encoding="utf-8"?>
+<ds:datastoreItem xmlns:ds="http://schemas.openxmlformats.org/officeDocument/2006/customXml" ds:itemID="{C1AD6AC2-B36E-4A8B-8C05-EC93DE0FE4C6}">
   <ds:schemaRefs>
     <ds:schemaRef ds:uri="http://www.joulesunlimited.com/juid"/>
   </ds:schemaRefs>
 </ds:datastoreItem>
 </file>
 
-<file path=customXml/itemProps15.xml><?xml version="1.0" encoding="utf-8"?>
-<ds:datastoreItem xmlns:ds="http://schemas.openxmlformats.org/officeDocument/2006/customXml" ds:itemID="{05108CB9-601D-4FD5-B851-23F5FECD446A}">
+<file path=customXml/itemProps21.xml><?xml version="1.0" encoding="utf-8"?>
+<ds:datastoreItem xmlns:ds="http://schemas.openxmlformats.org/officeDocument/2006/customXml" ds:itemID="{7FFB0592-BE29-41E9-B07C-3E9066368DA2}">
   <ds:schemaRefs>
     <ds:schemaRef ds:uri="http://www.joulesunlimited.com/juid"/>
   </ds:schemaRefs>
 </ds:datastoreItem>
 </file>
 
-<file path=customXml/itemProps16.xml><?xml version="1.0" encoding="utf-8"?>
-<ds:datastoreItem xmlns:ds="http://schemas.openxmlformats.org/officeDocument/2006/customXml" ds:itemID="{8B6D617A-0FB1-4CA1-BA4C-BE06DE77381F}">
-  <ds:schemaRefs>
-    <ds:schemaRef ds:uri="http://www.joulesunlimited.com/juid"/>
-  </ds:schemaRefs>
-</ds:datastoreItem>
-</file>
-
-<file path=customXml/itemProps17.xml><?xml version="1.0" encoding="utf-8"?>
-<ds:datastoreItem xmlns:ds="http://schemas.openxmlformats.org/officeDocument/2006/customXml" ds:itemID="{5211BA7A-995F-4966-ADEE-20903C05C84B}">
-  <ds:schemaRefs>
-    <ds:schemaRef ds:uri="http://www.joulesunlimited.com/juid"/>
-  </ds:schemaRefs>
-</ds:datastoreItem>
-</file>
-
-<file path=customXml/itemProps18.xml><?xml version="1.0" encoding="utf-8"?>
-<ds:datastoreItem xmlns:ds="http://schemas.openxmlformats.org/officeDocument/2006/customXml" ds:itemID="{4B36BCBD-AAD7-45FB-A384-6F9B19D98E94}">
-  <ds:schemaRefs>
-    <ds:schemaRef ds:uri="http://www.joulesunlimited.com/juid"/>
-  </ds:schemaRefs>
-</ds:datastoreItem>
-</file>
-
-<file path=customXml/itemProps19.xml><?xml version="1.0" encoding="utf-8"?>
-<ds:datastoreItem xmlns:ds="http://schemas.openxmlformats.org/officeDocument/2006/customXml" ds:itemID="{5FA85E9C-490F-4B8F-B50A-9DBF8145A93B}">
-  <ds:schemaRefs>
-    <ds:schemaRef ds:uri="http://www.joulesunlimited.com/juid"/>
-  </ds:schemaRefs>
-</ds:datastoreItem>
-</file>
-
-<file path=customXml/itemProps2.xml><?xml version="1.0" encoding="utf-8"?>
-<ds:datastoreItem xmlns:ds="http://schemas.openxmlformats.org/officeDocument/2006/customXml" ds:itemID="{0A116FEA-2A43-4A18-8ADE-FE586D59B1F4}">
-  <ds:schemaRefs>
-    <ds:schemaRef ds:uri="http://www.joulesunlimited.com/juid"/>
-  </ds:schemaRefs>
-</ds:datastoreItem>
-</file>
-
-<file path=customXml/itemProps20.xml><?xml version="1.0" encoding="utf-8"?>
-<ds:datastoreItem xmlns:ds="http://schemas.openxmlformats.org/officeDocument/2006/customXml" ds:itemID="{0407DC00-3AD9-4765-9ECD-EC27EC34C724}">
-  <ds:schemaRefs>
-    <ds:schemaRef ds:uri="http://www.joulesunlimited.com/juid"/>
-  </ds:schemaRefs>
-</ds:datastoreItem>
-</file>
-
-<file path=customXml/itemProps21.xml><?xml version="1.0" encoding="utf-8"?>
-<ds:datastoreItem xmlns:ds="http://schemas.openxmlformats.org/officeDocument/2006/customXml" ds:itemID="{7AB8C431-82F7-4495-9402-9D5736F47226}">
-  <ds:schemaRefs>
-    <ds:schemaRef ds:uri="http://www.joulesunlimited.com/juid"/>
-  </ds:schemaRefs>
-</ds:datastoreItem>
-</file>
-
 <file path=customXml/itemProps22.xml><?xml version="1.0" encoding="utf-8"?>
-<ds:datastoreItem xmlns:ds="http://schemas.openxmlformats.org/officeDocument/2006/customXml" ds:itemID="{EB4C4CD1-ABD9-48E9-9E69-815A9A096DE0}">
+<ds:datastoreItem xmlns:ds="http://schemas.openxmlformats.org/officeDocument/2006/customXml" ds:itemID="{05108CB9-601D-4FD5-B851-23F5FECD446A}">
   <ds:schemaRefs>
     <ds:schemaRef ds:uri="http://www.joulesunlimited.com/juid"/>
   </ds:schemaRefs>
@@ -3786,7 +4545,7 @@
 </file>
 
 <file path=customXml/itemProps24.xml><?xml version="1.0" encoding="utf-8"?>
-<ds:datastoreItem xmlns:ds="http://schemas.openxmlformats.org/officeDocument/2006/customXml" ds:itemID="{4A602AE2-C421-49AA-A620-FC4F38415B84}">
+<ds:datastoreItem xmlns:ds="http://schemas.openxmlformats.org/officeDocument/2006/customXml" ds:itemID="{66B75566-FAB0-45AB-9D05-98BB04F94002}">
   <ds:schemaRefs>
     <ds:schemaRef ds:uri="http://www.joulesunlimited.com/juid"/>
   </ds:schemaRefs>
@@ -3794,7 +4553,7 @@
 </file>
 
 <file path=customXml/itemProps25.xml><?xml version="1.0" encoding="utf-8"?>
-<ds:datastoreItem xmlns:ds="http://schemas.openxmlformats.org/officeDocument/2006/customXml" ds:itemID="{4FCC20A6-1F8E-4FD8-A432-F84132A3DB86}">
+<ds:datastoreItem xmlns:ds="http://schemas.openxmlformats.org/officeDocument/2006/customXml" ds:itemID="{E5A43A96-145C-4051-B26F-63E30B16E14A}">
   <ds:schemaRefs>
     <ds:schemaRef ds:uri="http://www.joulesunlimited.com/juid"/>
   </ds:schemaRefs>
@@ -3802,6 +4561,78 @@
 </file>
 
 <file path=customXml/itemProps26.xml><?xml version="1.0" encoding="utf-8"?>
+<ds:datastoreItem xmlns:ds="http://schemas.openxmlformats.org/officeDocument/2006/customXml" ds:itemID="{5FA85E9C-490F-4B8F-B50A-9DBF8145A93B}">
+  <ds:schemaRefs>
+    <ds:schemaRef ds:uri="http://www.joulesunlimited.com/juid"/>
+  </ds:schemaRefs>
+</ds:datastoreItem>
+</file>
+
+<file path=customXml/itemProps27.xml><?xml version="1.0" encoding="utf-8"?>
+<ds:datastoreItem xmlns:ds="http://schemas.openxmlformats.org/officeDocument/2006/customXml" ds:itemID="{6F9F3F13-4916-4C3E-9C5A-30ECD36B9B9A}">
+  <ds:schemaRefs>
+    <ds:schemaRef ds:uri="http://www.joulesunlimited.com/juid"/>
+  </ds:schemaRefs>
+</ds:datastoreItem>
+</file>
+
+<file path=customXml/itemProps28.xml><?xml version="1.0" encoding="utf-8"?>
+<ds:datastoreItem xmlns:ds="http://schemas.openxmlformats.org/officeDocument/2006/customXml" ds:itemID="{C1699E6A-38C6-446F-9665-D4128549273D}">
+  <ds:schemaRefs>
+    <ds:schemaRef ds:uri="http://www.joulesunlimited.com/juid"/>
+  </ds:schemaRefs>
+</ds:datastoreItem>
+</file>
+
+<file path=customXml/itemProps29.xml><?xml version="1.0" encoding="utf-8"?>
+<ds:datastoreItem xmlns:ds="http://schemas.openxmlformats.org/officeDocument/2006/customXml" ds:itemID="{14822298-B9D8-4DDA-9A59-C2A813037319}">
+  <ds:schemaRefs>
+    <ds:schemaRef ds:uri="http://www.joulesunlimited.com/juid"/>
+  </ds:schemaRefs>
+</ds:datastoreItem>
+</file>
+
+<file path=customXml/itemProps3.xml><?xml version="1.0" encoding="utf-8"?>
+<ds:datastoreItem xmlns:ds="http://schemas.openxmlformats.org/officeDocument/2006/customXml" ds:itemID="{4B36BCBD-AAD7-45FB-A384-6F9B19D98E94}">
+  <ds:schemaRefs>
+    <ds:schemaRef ds:uri="http://www.joulesunlimited.com/juid"/>
+  </ds:schemaRefs>
+</ds:datastoreItem>
+</file>
+
+<file path=customXml/itemProps30.xml><?xml version="1.0" encoding="utf-8"?>
+<ds:datastoreItem xmlns:ds="http://schemas.openxmlformats.org/officeDocument/2006/customXml" ds:itemID="{12A90D42-96F5-4AA3-8B57-0B593BA25485}">
+  <ds:schemaRefs>
+    <ds:schemaRef ds:uri="http://www.joulesunlimited.com/juid"/>
+  </ds:schemaRefs>
+</ds:datastoreItem>
+</file>
+
+<file path=customXml/itemProps31.xml><?xml version="1.0" encoding="utf-8"?>
+<ds:datastoreItem xmlns:ds="http://schemas.openxmlformats.org/officeDocument/2006/customXml" ds:itemID="{EB4C4CD1-ABD9-48E9-9E69-815A9A096DE0}">
+  <ds:schemaRefs>
+    <ds:schemaRef ds:uri="http://www.joulesunlimited.com/juid"/>
+  </ds:schemaRefs>
+</ds:datastoreItem>
+</file>
+
+<file path=customXml/itemProps32.xml><?xml version="1.0" encoding="utf-8"?>
+<ds:datastoreItem xmlns:ds="http://schemas.openxmlformats.org/officeDocument/2006/customXml" ds:itemID="{365D0148-12F0-478B-A755-985DA728D1A5}">
+  <ds:schemaRefs>
+    <ds:schemaRef ds:uri="http://www.joulesunlimited.com/juid"/>
+  </ds:schemaRefs>
+</ds:datastoreItem>
+</file>
+
+<file path=customXml/itemProps33.xml><?xml version="1.0" encoding="utf-8"?>
+<ds:datastoreItem xmlns:ds="http://schemas.openxmlformats.org/officeDocument/2006/customXml" ds:itemID="{BF8CBE15-079F-4675-BF63-5D820EEC8C03}">
+  <ds:schemaRefs>
+    <ds:schemaRef ds:uri="http://www.joulesunlimited.com/juid"/>
+  </ds:schemaRefs>
+</ds:datastoreItem>
+</file>
+
+<file path=customXml/itemProps4.xml><?xml version="1.0" encoding="utf-8"?>
 <ds:datastoreItem xmlns:ds="http://schemas.openxmlformats.org/officeDocument/2006/customXml" ds:itemID="{D5C1DE85-FEE5-4CD5-BEAB-32B31BACBCFE}">
   <ds:schemaRefs>
     <ds:schemaRef ds:uri="http://www.joulesunlimited.com/juid"/>
@@ -3809,31 +4640,7 @@
 </ds:datastoreItem>
 </file>
 
-<file path=customXml/itemProps27.xml><?xml version="1.0" encoding="utf-8"?>
-<ds:datastoreItem xmlns:ds="http://schemas.openxmlformats.org/officeDocument/2006/customXml" ds:itemID="{365D0148-12F0-478B-A755-985DA728D1A5}">
-  <ds:schemaRefs>
-    <ds:schemaRef ds:uri="http://www.joulesunlimited.com/juid"/>
-  </ds:schemaRefs>
-</ds:datastoreItem>
-</file>
-
-<file path=customXml/itemProps28.xml><?xml version="1.0" encoding="utf-8"?>
-<ds:datastoreItem xmlns:ds="http://schemas.openxmlformats.org/officeDocument/2006/customXml" ds:itemID="{66B75566-FAB0-45AB-9D05-98BB04F94002}">
-  <ds:schemaRefs>
-    <ds:schemaRef ds:uri="http://www.joulesunlimited.com/juid"/>
-  </ds:schemaRefs>
-</ds:datastoreItem>
-</file>
-
-<file path=customXml/itemProps29.xml><?xml version="1.0" encoding="utf-8"?>
-<ds:datastoreItem xmlns:ds="http://schemas.openxmlformats.org/officeDocument/2006/customXml" ds:itemID="{3D3EEC19-198B-4DBF-968B-617470FE52A3}">
-  <ds:schemaRefs>
-    <ds:schemaRef ds:uri="http://www.joulesunlimited.com/juid"/>
-  </ds:schemaRefs>
-</ds:datastoreItem>
-</file>
-
-<file path=customXml/itemProps3.xml><?xml version="1.0" encoding="utf-8"?>
+<file path=customXml/itemProps5.xml><?xml version="1.0" encoding="utf-8"?>
 <ds:datastoreItem xmlns:ds="http://schemas.openxmlformats.org/officeDocument/2006/customXml" ds:itemID="{7BB09290-3589-4182-ADD1-CA2E3C0F771D}">
   <ds:schemaRefs>
     <ds:schemaRef ds:uri="http://www.joulesunlimited.com/juid"/>
@@ -3841,56 +4648,8 @@
 </ds:datastoreItem>
 </file>
 
-<file path=customXml/itemProps30.xml><?xml version="1.0" encoding="utf-8"?>
-<ds:datastoreItem xmlns:ds="http://schemas.openxmlformats.org/officeDocument/2006/customXml" ds:itemID="{BF8CBE15-079F-4675-BF63-5D820EEC8C03}">
-  <ds:schemaRefs>
-    <ds:schemaRef ds:uri="http://www.joulesunlimited.com/juid"/>
-  </ds:schemaRefs>
-</ds:datastoreItem>
-</file>
-
-<file path=customXml/itemProps31.xml><?xml version="1.0" encoding="utf-8"?>
-<ds:datastoreItem xmlns:ds="http://schemas.openxmlformats.org/officeDocument/2006/customXml" ds:itemID="{6F9F3F13-4916-4C3E-9C5A-30ECD36B9B9A}">
-  <ds:schemaRefs>
-    <ds:schemaRef ds:uri="http://www.joulesunlimited.com/juid"/>
-  </ds:schemaRefs>
-</ds:datastoreItem>
-</file>
-
-<file path=customXml/itemProps32.xml><?xml version="1.0" encoding="utf-8"?>
-<ds:datastoreItem xmlns:ds="http://schemas.openxmlformats.org/officeDocument/2006/customXml" ds:itemID="{C1AD6AC2-B36E-4A8B-8C05-EC93DE0FE4C6}">
-  <ds:schemaRefs>
-    <ds:schemaRef ds:uri="http://www.joulesunlimited.com/juid"/>
-  </ds:schemaRefs>
-</ds:datastoreItem>
-</file>
-
-<file path=customXml/itemProps33.xml><?xml version="1.0" encoding="utf-8"?>
-<ds:datastoreItem xmlns:ds="http://schemas.openxmlformats.org/officeDocument/2006/customXml" ds:itemID="{0553E0E7-1207-467A-862E-153EF903819B}">
-  <ds:schemaRefs>
-    <ds:schemaRef ds:uri="http://www.joulesunlimited.com/juid"/>
-  </ds:schemaRefs>
-</ds:datastoreItem>
-</file>
-
-<file path=customXml/itemProps4.xml><?xml version="1.0" encoding="utf-8"?>
-<ds:datastoreItem xmlns:ds="http://schemas.openxmlformats.org/officeDocument/2006/customXml" ds:itemID="{C1699E6A-38C6-446F-9665-D4128549273D}">
-  <ds:schemaRefs>
-    <ds:schemaRef ds:uri="http://www.joulesunlimited.com/juid"/>
-  </ds:schemaRefs>
-</ds:datastoreItem>
-</file>
-
-<file path=customXml/itemProps5.xml><?xml version="1.0" encoding="utf-8"?>
-<ds:datastoreItem xmlns:ds="http://schemas.openxmlformats.org/officeDocument/2006/customXml" ds:itemID="{7FFB0592-BE29-41E9-B07C-3E9066368DA2}">
-  <ds:schemaRefs>
-    <ds:schemaRef ds:uri="http://www.joulesunlimited.com/juid"/>
-  </ds:schemaRefs>
-</ds:datastoreItem>
-</file>
-
 <file path=customXml/itemProps6.xml><?xml version="1.0" encoding="utf-8"?>
-<ds:datastoreItem xmlns:ds="http://schemas.openxmlformats.org/officeDocument/2006/customXml" ds:itemID="{6A900602-4AA5-4175-B192-210836D17189}">
+<ds:datastoreItem xmlns:ds="http://schemas.openxmlformats.org/officeDocument/2006/customXml" ds:itemID="{7AB8C431-82F7-4495-9402-9D5736F47226}">
   <ds:schemaRefs>
     <ds:schemaRef ds:uri="http://www.joulesunlimited.com/juid"/>
   </ds:schemaRefs>
@@ -3906,7 +4665,7 @@
 </file>
 
 <file path=customXml/itemProps8.xml><?xml version="1.0" encoding="utf-8"?>
-<ds:datastoreItem xmlns:ds="http://schemas.openxmlformats.org/officeDocument/2006/customXml" ds:itemID="{13100955-99DD-4F1D-B284-562F25173232}">
+<ds:datastoreItem xmlns:ds="http://schemas.openxmlformats.org/officeDocument/2006/customXml" ds:itemID="{BA388501-9B54-4C94-A6D2-E2FCF940976D}">
   <ds:schemaRefs>
     <ds:schemaRef ds:uri="http://www.joulesunlimited.com/juid"/>
   </ds:schemaRefs>
@@ -3914,7 +4673,7 @@
 </file>
 
 <file path=customXml/itemProps9.xml><?xml version="1.0" encoding="utf-8"?>
-<ds:datastoreItem xmlns:ds="http://schemas.openxmlformats.org/officeDocument/2006/customXml" ds:itemID="{14822298-B9D8-4DDA-9A59-C2A813037319}">
+<ds:datastoreItem xmlns:ds="http://schemas.openxmlformats.org/officeDocument/2006/customXml" ds:itemID="{5211BA7A-995F-4966-ADEE-20903C05C84B}">
   <ds:schemaRefs>
     <ds:schemaRef ds:uri="http://www.joulesunlimited.com/juid"/>
   </ds:schemaRefs>

</xml_diff>

<commit_message>
update pptx and travis
</commit_message>
<xml_diff>
--- a/doc/Présentation_OCP9_projetB4.pptx
+++ b/doc/Présentation_OCP9_projetB4.pptx
@@ -5,10 +5,10 @@
     <p:sldMasterId id="2147483790" r:id="rId34"/>
   </p:sldMasterIdLst>
   <p:notesMasterIdLst>
-    <p:notesMasterId r:id="rId41"/>
+    <p:notesMasterId r:id="rId45"/>
   </p:notesMasterIdLst>
   <p:handoutMasterIdLst>
-    <p:handoutMasterId r:id="rId42"/>
+    <p:handoutMasterId r:id="rId46"/>
   </p:handoutMasterIdLst>
   <p:sldIdLst>
     <p:sldId id="256" r:id="rId35"/>
@@ -17,11 +17,15 @@
     <p:sldId id="259" r:id="rId38"/>
     <p:sldId id="260" r:id="rId39"/>
     <p:sldId id="261" r:id="rId40"/>
+    <p:sldId id="262" r:id="rId41"/>
+    <p:sldId id="263" r:id="rId42"/>
+    <p:sldId id="264" r:id="rId43"/>
+    <p:sldId id="265" r:id="rId44"/>
   </p:sldIdLst>
   <p:sldSz cx="9144000" cy="5143500" type="screen16x9"/>
   <p:notesSz cx="6858000" cy="9144000"/>
   <p:custDataLst>
-    <p:tags r:id="rId43"/>
+    <p:tags r:id="rId47"/>
   </p:custDataLst>
   <p:defaultTextStyle>
     <a:defPPr lvl="0">
@@ -120,7 +124,7 @@
   </p:defaultTextStyle>
   <p:extLst>
     <p:ext uri="{EFAFB233-063F-42B5-8137-9DF3F51BA10A}">
-      <p15:sldGuideLst xmlns="" xmlns:p15="http://schemas.microsoft.com/office/powerpoint/2012/main">
+      <p15:sldGuideLst xmlns:p15="http://schemas.microsoft.com/office/powerpoint/2012/main" xmlns="">
         <p15:guide id="1" orient="horz" pos="1620" userDrawn="1">
           <p15:clr>
             <a:srgbClr val="A4A3A4"/>
@@ -134,7 +138,7 @@
       </p15:sldGuideLst>
     </p:ext>
     <p:ext uri="{2D200454-40CA-4A62-9FC3-DE9A4176ACB9}">
-      <p15:notesGuideLst xmlns="" xmlns:p15="http://schemas.microsoft.com/office/powerpoint/2012/main">
+      <p15:notesGuideLst xmlns:p15="http://schemas.microsoft.com/office/powerpoint/2012/main" xmlns="">
         <p15:guide id="1" orient="horz" pos="2880">
           <p15:clr>
             <a:srgbClr val="A4A3A4"/>
@@ -233,7 +237,7 @@
           <a:p>
             <a:fld id="{04C3C42E-F14B-43F4-9917-B663E421A4BC}" type="datetime1">
               <a:rPr lang="en-GB" smtClean="0"/>
-              <a:t>18/12/2020</a:t>
+              <a:t>16/04/2021</a:t>
             </a:fld>
             <a:endParaRPr lang="en-GB" dirty="0"/>
           </a:p>
@@ -555,7 +559,7 @@
           <a:p>
             <a:fld id="{66D87BF4-87F9-4694-AD8C-50CF69A6B1A5}" type="datetime1">
               <a:rPr lang="en-GB" smtClean="0"/>
-              <a:t>18/12/2020</a:t>
+              <a:t>16/04/2021</a:t>
             </a:fld>
             <a:endParaRPr lang="en-GB" dirty="0"/>
           </a:p>
@@ -931,7 +935,7 @@
           <p:cNvPr id="6" name="Frame picture 1">
             <a:extLst>
               <a:ext uri="{FF2B5EF4-FFF2-40B4-BE49-F238E27FC236}">
-                <a16:creationId xmlns="" xmlns:a16="http://schemas.microsoft.com/office/drawing/2014/main" id="{65E86301-1998-EF4F-B706-B9BC864A3BF7}"/>
+                <a16:creationId xmlns:a16="http://schemas.microsoft.com/office/drawing/2014/main" xmlns="" id="{65E86301-1998-EF4F-B706-B9BC864A3BF7}"/>
               </a:ext>
             </a:extLst>
           </p:cNvPr>
@@ -978,7 +982,7 @@
           <p:cNvPr id="2" name="Title 1">
             <a:extLst>
               <a:ext uri="{FF2B5EF4-FFF2-40B4-BE49-F238E27FC236}">
-                <a16:creationId xmlns="" xmlns:a16="http://schemas.microsoft.com/office/drawing/2014/main" id="{CF267043-749E-4CC4-95FD-6FA8F074C44A}"/>
+                <a16:creationId xmlns:a16="http://schemas.microsoft.com/office/drawing/2014/main" xmlns="" id="{CF267043-749E-4CC4-95FD-6FA8F074C44A}"/>
               </a:ext>
             </a:extLst>
           </p:cNvPr>
@@ -1073,7 +1077,7 @@
           <p:cNvPr id="5" name="Title 1">
             <a:extLst>
               <a:ext uri="{FF2B5EF4-FFF2-40B4-BE49-F238E27FC236}">
-                <a16:creationId xmlns="" xmlns:a16="http://schemas.microsoft.com/office/drawing/2014/main" id="{CAF4CD65-24E4-4A2C-9857-C8365CEDC4DA}"/>
+                <a16:creationId xmlns:a16="http://schemas.microsoft.com/office/drawing/2014/main" xmlns="" id="{CAF4CD65-24E4-4A2C-9857-C8365CEDC4DA}"/>
               </a:ext>
             </a:extLst>
           </p:cNvPr>
@@ -1118,7 +1122,7 @@
           <a:p>
             <a:fld id="{1A1F3D4D-7719-4C9C-984C-2B0A0637B460}" type="datetime1">
               <a:rPr lang="en-GB" smtClean="0"/>
-              <a:t>18/12/2020</a:t>
+              <a:t>16/04/2021</a:t>
             </a:fld>
             <a:endParaRPr lang="nl-NL" dirty="0"/>
           </a:p>
@@ -1186,7 +1190,7 @@
   </p:clrMapOvr>
   <p:extLst>
     <p:ext uri="{DCECCB84-F9BA-43D5-87BE-67443E8EF086}">
-      <p15:sldGuideLst xmlns="" xmlns:p15="http://schemas.microsoft.com/office/powerpoint/2012/main"/>
+      <p15:sldGuideLst xmlns:p15="http://schemas.microsoft.com/office/powerpoint/2012/main" xmlns=""/>
     </p:ext>
   </p:extLst>
 </p:sldLayout>
@@ -1278,7 +1282,7 @@
           <p:cNvPr id="6" name="Title 1">
             <a:extLst>
               <a:ext uri="{FF2B5EF4-FFF2-40B4-BE49-F238E27FC236}">
-                <a16:creationId xmlns="" xmlns:a16="http://schemas.microsoft.com/office/drawing/2014/main" id="{41571FD5-12B2-421F-9B07-99071A4E6161}"/>
+                <a16:creationId xmlns:a16="http://schemas.microsoft.com/office/drawing/2014/main" xmlns="" id="{41571FD5-12B2-421F-9B07-99071A4E6161}"/>
               </a:ext>
             </a:extLst>
           </p:cNvPr>
@@ -1323,7 +1327,7 @@
           <a:p>
             <a:fld id="{04464E88-4E71-4354-BE7A-174CCCF59950}" type="datetime1">
               <a:rPr lang="en-GB" smtClean="0"/>
-              <a:t>18/12/2020</a:t>
+              <a:t>16/04/2021</a:t>
             </a:fld>
             <a:endParaRPr lang="nl-NL" dirty="0"/>
           </a:p>
@@ -1414,7 +1418,7 @@
           <p:cNvPr id="6" name="Title 1">
             <a:extLst>
               <a:ext uri="{FF2B5EF4-FFF2-40B4-BE49-F238E27FC236}">
-                <a16:creationId xmlns="" xmlns:a16="http://schemas.microsoft.com/office/drawing/2014/main" id="{67AF7496-90D2-4A52-8B85-42B4E4BF71E7}"/>
+                <a16:creationId xmlns:a16="http://schemas.microsoft.com/office/drawing/2014/main" xmlns="" id="{67AF7496-90D2-4A52-8B85-42B4E4BF71E7}"/>
               </a:ext>
             </a:extLst>
           </p:cNvPr>
@@ -1459,7 +1463,7 @@
           <a:p>
             <a:fld id="{8BCE2C7E-1904-4A76-9B4D-1FA6CB4C91CD}" type="datetime1">
               <a:rPr lang="en-GB" smtClean="0"/>
-              <a:t>18/12/2020</a:t>
+              <a:t>16/04/2021</a:t>
             </a:fld>
             <a:endParaRPr lang="nl-NL" dirty="0"/>
           </a:p>
@@ -1562,7 +1566,7 @@
           <a:p>
             <a:fld id="{A4AD7718-3417-4D0A-9590-03A5DBFAF68F}" type="datetime1">
               <a:rPr lang="en-GB" smtClean="0"/>
-              <a:t>18/12/2020</a:t>
+              <a:t>16/04/2021</a:t>
             </a:fld>
             <a:endParaRPr lang="nl-NL" dirty="0"/>
           </a:p>
@@ -1804,7 +1808,7 @@
           <a:p>
             <a:fld id="{3D169808-AA3B-4028-A830-A5012111354C}" type="datetime1">
               <a:rPr lang="en-GB" smtClean="0"/>
-              <a:t>18/12/2020</a:t>
+              <a:t>16/04/2021</a:t>
             </a:fld>
             <a:endParaRPr lang="nl-NL" dirty="0"/>
           </a:p>
@@ -2191,7 +2195,7 @@
   </p:txStyles>
   <p:extLst mod="1">
     <p:ext uri="{27BBF7A9-308A-43DC-89C8-2F10F3537804}">
-      <p15:sldGuideLst xmlns="" xmlns:p15="http://schemas.microsoft.com/office/powerpoint/2012/main">
+      <p15:sldGuideLst xmlns:p15="http://schemas.microsoft.com/office/powerpoint/2012/main" xmlns="">
         <p15:guide id="1" orient="horz" pos="3103" userDrawn="1">
           <p15:clr>
             <a:srgbClr val="000000"/>
@@ -2338,6 +2342,71 @@
 </p:sld>
 </file>
 
+<file path=ppt/slides/slide10.xml><?xml version="1.0" encoding="utf-8"?>
+<p:sld xmlns:a="http://schemas.openxmlformats.org/drawingml/2006/main" xmlns:r="http://schemas.openxmlformats.org/officeDocument/2006/relationships" xmlns:p="http://schemas.openxmlformats.org/presentationml/2006/main">
+  <p:cSld>
+    <p:spTree>
+      <p:nvGrpSpPr>
+        <p:cNvPr id="1" name=""/>
+        <p:cNvGrpSpPr/>
+        <p:nvPr/>
+      </p:nvGrpSpPr>
+      <p:grpSpPr>
+        <a:xfrm>
+          <a:off x="0" y="0"/>
+          <a:ext cx="0" cy="0"/>
+          <a:chOff x="0" y="0"/>
+          <a:chExt cx="0" cy="0"/>
+        </a:xfrm>
+      </p:grpSpPr>
+      <p:sp>
+        <p:nvSpPr>
+          <p:cNvPr id="4" name="Titre 3"/>
+          <p:cNvSpPr>
+            <a:spLocks noGrp="1"/>
+          </p:cNvSpPr>
+          <p:nvPr>
+            <p:ph type="title"/>
+          </p:nvPr>
+        </p:nvSpPr>
+        <p:spPr>
+          <a:xfrm>
+            <a:off x="213122" y="339924"/>
+            <a:ext cx="8714184" cy="301621"/>
+          </a:xfrm>
+        </p:spPr>
+        <p:txBody>
+          <a:bodyPr/>
+          <a:lstStyle/>
+          <a:p>
+            <a:r>
+              <a:rPr lang="fr-FR" sz="2000" dirty="0" smtClean="0"/>
+              <a:t>Rapport de TEST</a:t>
+            </a:r>
+            <a:endParaRPr lang="fr-FR" sz="2000" dirty="0"/>
+          </a:p>
+        </p:txBody>
+      </p:sp>
+    </p:spTree>
+    <p:extLst>
+      <p:ext uri="{BB962C8B-B14F-4D97-AF65-F5344CB8AC3E}">
+        <p14:creationId xmlns:p14="http://schemas.microsoft.com/office/powerpoint/2010/main" val="355565805"/>
+      </p:ext>
+    </p:extLst>
+  </p:cSld>
+  <p:clrMapOvr>
+    <a:masterClrMapping/>
+  </p:clrMapOvr>
+  <p:timing>
+    <p:tnLst>
+      <p:par>
+        <p:cTn id="1" dur="indefinite" restart="never" nodeType="tmRoot"/>
+      </p:par>
+    </p:tnLst>
+  </p:timing>
+</p:sld>
+</file>
+
 <file path=ppt/slides/slide2.xml><?xml version="1.0" encoding="utf-8"?>
 <p:sld xmlns:a="http://schemas.openxmlformats.org/drawingml/2006/main" xmlns:r="http://schemas.openxmlformats.org/officeDocument/2006/relationships" xmlns:p="http://schemas.openxmlformats.org/presentationml/2006/main">
   <p:cSld>
@@ -2666,8 +2735,8 @@
               <a:t>écriture comptable : </a:t>
             </a:r>
             <a:r>
-              <a:rPr lang="fr-FR" sz="2000" dirty="0" err="1" smtClean="0"/>
-              <a:t>éQUILIBRE</a:t>
+              <a:rPr lang="fr-FR" sz="2000" dirty="0" smtClean="0"/>
+              <a:t>équilibré</a:t>
             </a:r>
             <a:endParaRPr lang="fr-FR" sz="2000" dirty="0"/>
           </a:p>
@@ -2731,10 +2800,13 @@
           <a:lstStyle/>
           <a:p>
             <a:r>
+              <a:rPr lang="fr-FR" sz="2000" dirty="0" smtClean="0"/>
+              <a:t>Séquence de l'écriture </a:t>
+            </a:r>
+            <a:r>
               <a:rPr lang="fr-FR" sz="2000" dirty="0"/>
-              <a:t>Ajoute une référence à l'écriture comptable</a:t>
-            </a:r>
-            <a:endParaRPr lang="fr-FR" sz="2000" dirty="0"/>
+              <a:t>comptable</a:t>
+            </a:r>
           </a:p>
         </p:txBody>
       </p:sp>
@@ -2970,6 +3042,109 @@
           </a:extLst>
         </p:spPr>
       </p:pic>
+      <p:sp>
+        <p:nvSpPr>
+          <p:cNvPr id="2" name="ZoneTexte 1"/>
+          <p:cNvSpPr txBox="1"/>
+          <p:nvPr/>
+        </p:nvSpPr>
+        <p:spPr>
+          <a:xfrm>
+            <a:off x="4943856" y="1274063"/>
+            <a:ext cx="3084576" cy="415498"/>
+          </a:xfrm>
+          <a:prstGeom prst="rect">
+            <a:avLst/>
+          </a:prstGeom>
+          <a:noFill/>
+        </p:spPr>
+        <p:txBody>
+          <a:bodyPr wrap="square" lIns="0" tIns="0" rIns="0" bIns="0" rtlCol="0">
+            <a:spAutoFit/>
+          </a:bodyPr>
+          <a:lstStyle/>
+          <a:p>
+            <a:r>
+              <a:rPr lang="fr-FR" dirty="0" smtClean="0"/>
+              <a:t>Ajout d’un attribut ‘</a:t>
+            </a:r>
+            <a:r>
+              <a:rPr lang="fr-FR" dirty="0" err="1" smtClean="0"/>
+              <a:t>journalCode</a:t>
+            </a:r>
+            <a:r>
+              <a:rPr lang="fr-FR" dirty="0" smtClean="0"/>
+              <a:t>’ (constructeur, </a:t>
+            </a:r>
+            <a:r>
+              <a:rPr lang="fr-FR" dirty="0" err="1" smtClean="0"/>
+              <a:t>getter&amp;Setter</a:t>
+            </a:r>
+            <a:r>
+              <a:rPr lang="fr-FR" dirty="0" smtClean="0"/>
+              <a:t>, </a:t>
+            </a:r>
+            <a:r>
+              <a:rPr lang="fr-FR" dirty="0" err="1" smtClean="0"/>
+              <a:t>toString</a:t>
+            </a:r>
+            <a:r>
+              <a:rPr lang="fr-FR" dirty="0" smtClean="0"/>
+              <a:t>)</a:t>
+            </a:r>
+            <a:endParaRPr lang="fr-FR" dirty="0"/>
+          </a:p>
+        </p:txBody>
+      </p:sp>
+      <p:sp>
+        <p:nvSpPr>
+          <p:cNvPr id="9" name="ZoneTexte 8"/>
+          <p:cNvSpPr txBox="1"/>
+          <p:nvPr/>
+        </p:nvSpPr>
+        <p:spPr>
+          <a:xfrm>
+            <a:off x="4943856" y="2737104"/>
+            <a:ext cx="3084576" cy="623248"/>
+          </a:xfrm>
+          <a:prstGeom prst="rect">
+            <a:avLst/>
+          </a:prstGeom>
+          <a:noFill/>
+        </p:spPr>
+        <p:txBody>
+          <a:bodyPr wrap="square" lIns="0" tIns="0" rIns="0" bIns="0" rtlCol="0">
+            <a:spAutoFit/>
+          </a:bodyPr>
+          <a:lstStyle/>
+          <a:p>
+            <a:r>
+              <a:rPr lang="fr-FR" dirty="0" smtClean="0"/>
+              <a:t>Construction de la séquence avec les valeurs transmises en paramètres</a:t>
+            </a:r>
+            <a:br>
+              <a:rPr lang="fr-FR" dirty="0" smtClean="0"/>
+            </a:br>
+            <a:r>
+              <a:rPr lang="fr-FR" dirty="0" smtClean="0"/>
+              <a:t>(</a:t>
+            </a:r>
+            <a:r>
+              <a:rPr lang="fr-FR" b="1" i="1" dirty="0" err="1" smtClean="0"/>
+              <a:t>myerp</a:t>
+            </a:r>
+            <a:r>
+              <a:rPr lang="fr-FR" b="1" i="1" dirty="0" smtClean="0"/>
+              <a:t>-business</a:t>
+            </a:r>
+            <a:r>
+              <a:rPr lang="fr-FR" dirty="0" smtClean="0"/>
+              <a:t>)</a:t>
+            </a:r>
+            <a:endParaRPr lang="fr-FR" dirty="0"/>
+          </a:p>
+        </p:txBody>
+      </p:sp>
     </p:spTree>
     <p:extLst>
       <p:ext uri="{BB962C8B-B14F-4D97-AF65-F5344CB8AC3E}">
@@ -3028,22 +3203,65 @@
           <a:lstStyle/>
           <a:p>
             <a:r>
+              <a:rPr lang="fr-FR" sz="2000" dirty="0" smtClean="0"/>
+              <a:t>Ajout d’une </a:t>
+            </a:r>
+            <a:r>
               <a:rPr lang="fr-FR" sz="2000" dirty="0"/>
-              <a:t>Ajoute une référence à l'écriture comptable</a:t>
-            </a:r>
-            <a:endParaRPr lang="fr-FR" sz="2000" dirty="0"/>
+              <a:t>référence à l'écriture comptable</a:t>
+            </a:r>
+          </a:p>
+        </p:txBody>
+      </p:sp>
+      <p:sp>
+        <p:nvSpPr>
+          <p:cNvPr id="2" name="ZoneTexte 1"/>
+          <p:cNvSpPr txBox="1"/>
+          <p:nvPr/>
+        </p:nvSpPr>
+        <p:spPr>
+          <a:xfrm>
+            <a:off x="5504688" y="1189205"/>
+            <a:ext cx="3272308" cy="623248"/>
+          </a:xfrm>
+          <a:prstGeom prst="rect">
+            <a:avLst/>
+          </a:prstGeom>
+          <a:noFill/>
+        </p:spPr>
+        <p:txBody>
+          <a:bodyPr wrap="square" lIns="0" tIns="0" rIns="0" bIns="0" rtlCol="0">
+            <a:spAutoFit/>
+          </a:bodyPr>
+          <a:lstStyle/>
+          <a:p>
+            <a:r>
+              <a:rPr lang="fr-FR" dirty="0" smtClean="0"/>
+              <a:t>Construction de la méthode d’ajout de référence à l’écriture comptable (</a:t>
+            </a:r>
+            <a:r>
+              <a:rPr lang="fr-FR" b="1" i="1" dirty="0" err="1" smtClean="0"/>
+              <a:t>myerp</a:t>
+            </a:r>
+            <a:r>
+              <a:rPr lang="fr-FR" b="1" i="1" dirty="0" smtClean="0"/>
+              <a:t>-business</a:t>
+            </a:r>
+            <a:r>
+              <a:rPr lang="fr-FR" dirty="0" smtClean="0"/>
+              <a:t>)</a:t>
+            </a:r>
+            <a:endParaRPr lang="fr-FR" dirty="0"/>
           </a:p>
         </p:txBody>
       </p:sp>
       <p:pic>
         <p:nvPicPr>
-          <p:cNvPr id="2050" name="Picture 2"/>
+          <p:cNvPr id="5122" name="Picture 2"/>
           <p:cNvPicPr>
-            <a:picLocks noGrp="1" noChangeAspect="1" noChangeArrowheads="1"/>
+            <a:picLocks noChangeAspect="1" noChangeArrowheads="1"/>
           </p:cNvPicPr>
-          <p:nvPr>
-            <p:ph sz="quarter" idx="13"/>
-          </p:nvPr>
+          <p:nvPr/>
         </p:nvPicPr>
         <p:blipFill>
           <a:blip r:embed="rId2">
@@ -3060,8 +3278,8 @@
         </p:blipFill>
         <p:spPr bwMode="auto">
           <a:xfrm>
-            <a:off x="288523" y="822960"/>
-            <a:ext cx="3966484" cy="2048114"/>
+            <a:off x="294510" y="1133856"/>
+            <a:ext cx="5007301" cy="3273552"/>
           </a:xfrm>
           <a:prstGeom prst="rect">
             <a:avLst/>
@@ -3091,16 +3309,84 @@
           </a:extLst>
         </p:spPr>
       </p:pic>
+    </p:spTree>
+    <p:extLst>
+      <p:ext uri="{BB962C8B-B14F-4D97-AF65-F5344CB8AC3E}">
+        <p14:creationId xmlns:p14="http://schemas.microsoft.com/office/powerpoint/2010/main" val="2088120194"/>
+      </p:ext>
+    </p:extLst>
+  </p:cSld>
+  <p:clrMapOvr>
+    <a:masterClrMapping/>
+  </p:clrMapOvr>
+  <p:timing>
+    <p:tnLst>
+      <p:par>
+        <p:cTn id="1" dur="indefinite" restart="never" nodeType="tmRoot"/>
+      </p:par>
+    </p:tnLst>
+  </p:timing>
+</p:sld>
+</file>
+
+<file path=ppt/slides/slide5.xml><?xml version="1.0" encoding="utf-8"?>
+<p:sld xmlns:a="http://schemas.openxmlformats.org/drawingml/2006/main" xmlns:r="http://schemas.openxmlformats.org/officeDocument/2006/relationships" xmlns:p="http://schemas.openxmlformats.org/presentationml/2006/main">
+  <p:cSld>
+    <p:spTree>
+      <p:nvGrpSpPr>
+        <p:cNvPr id="1" name=""/>
+        <p:cNvGrpSpPr/>
+        <p:nvPr/>
+      </p:nvGrpSpPr>
+      <p:grpSpPr>
+        <a:xfrm>
+          <a:off x="0" y="0"/>
+          <a:ext cx="0" cy="0"/>
+          <a:chOff x="0" y="0"/>
+          <a:chExt cx="0" cy="0"/>
+        </a:xfrm>
+      </p:grpSpPr>
+      <p:sp>
+        <p:nvSpPr>
+          <p:cNvPr id="4" name="Titre 3"/>
+          <p:cNvSpPr>
+            <a:spLocks noGrp="1"/>
+          </p:cNvSpPr>
+          <p:nvPr>
+            <p:ph type="title"/>
+          </p:nvPr>
+        </p:nvSpPr>
+        <p:spPr>
+          <a:xfrm>
+            <a:off x="213122" y="339924"/>
+            <a:ext cx="8714184" cy="301621"/>
+          </a:xfrm>
+        </p:spPr>
+        <p:txBody>
+          <a:bodyPr/>
+          <a:lstStyle/>
+          <a:p>
+            <a:r>
+              <a:rPr lang="fr-FR" sz="2000" dirty="0" smtClean="0"/>
+              <a:t>UPDATE de la séquence de l'écriture </a:t>
+            </a:r>
+            <a:r>
+              <a:rPr lang="fr-FR" sz="2000" dirty="0"/>
+              <a:t>comptable</a:t>
+            </a:r>
+          </a:p>
+        </p:txBody>
+      </p:sp>
       <p:pic>
         <p:nvPicPr>
-          <p:cNvPr id="2055" name="Picture 7"/>
+          <p:cNvPr id="2053" name="Picture 5"/>
           <p:cNvPicPr>
             <a:picLocks noChangeAspect="1" noChangeArrowheads="1"/>
           </p:cNvPicPr>
           <p:nvPr/>
         </p:nvPicPr>
         <p:blipFill>
-          <a:blip r:embed="rId3">
+          <a:blip r:embed="rId2">
             <a:extLst>
               <a:ext uri="{28A0092B-C50C-407E-A947-70E740481C1C}">
                 <a14:useLocalDpi xmlns:a14="http://schemas.microsoft.com/office/drawing/2010/main" val="0"/>
@@ -3114,8 +3400,8 @@
         </p:blipFill>
         <p:spPr bwMode="auto">
           <a:xfrm>
-            <a:off x="294511" y="2991857"/>
-            <a:ext cx="3960495" cy="1959780"/>
+            <a:off x="329926" y="698731"/>
+            <a:ext cx="3835854" cy="2026181"/>
           </a:xfrm>
           <a:prstGeom prst="rect">
             <a:avLst/>
@@ -3145,81 +3431,16 @@
           </a:extLst>
         </p:spPr>
       </p:pic>
-    </p:spTree>
-    <p:extLst>
-      <p:ext uri="{BB962C8B-B14F-4D97-AF65-F5344CB8AC3E}">
-        <p14:creationId xmlns:p14="http://schemas.microsoft.com/office/powerpoint/2010/main" val="2088120194"/>
-      </p:ext>
-    </p:extLst>
-  </p:cSld>
-  <p:clrMapOvr>
-    <a:masterClrMapping/>
-  </p:clrMapOvr>
-  <p:timing>
-    <p:tnLst>
-      <p:par>
-        <p:cTn id="1" dur="indefinite" restart="never" nodeType="tmRoot"/>
-      </p:par>
-    </p:tnLst>
-  </p:timing>
-</p:sld>
-</file>
-
-<file path=ppt/slides/slide5.xml><?xml version="1.0" encoding="utf-8"?>
-<p:sld xmlns:a="http://schemas.openxmlformats.org/drawingml/2006/main" xmlns:r="http://schemas.openxmlformats.org/officeDocument/2006/relationships" xmlns:p="http://schemas.openxmlformats.org/presentationml/2006/main">
-  <p:cSld>
-    <p:spTree>
-      <p:nvGrpSpPr>
-        <p:cNvPr id="1" name=""/>
-        <p:cNvGrpSpPr/>
-        <p:nvPr/>
-      </p:nvGrpSpPr>
-      <p:grpSpPr>
-        <a:xfrm>
-          <a:off x="0" y="0"/>
-          <a:ext cx="0" cy="0"/>
-          <a:chOff x="0" y="0"/>
-          <a:chExt cx="0" cy="0"/>
-        </a:xfrm>
-      </p:grpSpPr>
-      <p:sp>
-        <p:nvSpPr>
-          <p:cNvPr id="4" name="Titre 3"/>
-          <p:cNvSpPr>
-            <a:spLocks noGrp="1"/>
-          </p:cNvSpPr>
-          <p:nvPr>
-            <p:ph type="title"/>
-          </p:nvPr>
-        </p:nvSpPr>
-        <p:spPr>
-          <a:xfrm>
-            <a:off x="213122" y="339924"/>
-            <a:ext cx="8714184" cy="301621"/>
-          </a:xfrm>
-        </p:spPr>
-        <p:txBody>
-          <a:bodyPr/>
-          <a:lstStyle/>
-          <a:p>
-            <a:r>
-              <a:rPr lang="fr-FR" sz="2000" dirty="0"/>
-              <a:t>Ajoute une référence à l'écriture comptable</a:t>
-            </a:r>
-            <a:endParaRPr lang="fr-FR" sz="2000" dirty="0"/>
-          </a:p>
-        </p:txBody>
-      </p:sp>
       <p:pic>
         <p:nvPicPr>
-          <p:cNvPr id="2053" name="Picture 5"/>
+          <p:cNvPr id="4098" name="Picture 2"/>
           <p:cNvPicPr>
             <a:picLocks noChangeAspect="1" noChangeArrowheads="1"/>
           </p:cNvPicPr>
           <p:nvPr/>
         </p:nvPicPr>
         <p:blipFill>
-          <a:blip r:embed="rId2">
+          <a:blip r:embed="rId3">
             <a:extLst>
               <a:ext uri="{28A0092B-C50C-407E-A947-70E740481C1C}">
                 <a14:useLocalDpi xmlns:a14="http://schemas.microsoft.com/office/drawing/2010/main" val="0"/>
@@ -3233,8 +3454,8 @@
         </p:blipFill>
         <p:spPr bwMode="auto">
           <a:xfrm>
-            <a:off x="329926" y="698731"/>
-            <a:ext cx="4254266" cy="2247195"/>
+            <a:off x="4213078" y="4152191"/>
+            <a:ext cx="2199879" cy="783708"/>
           </a:xfrm>
           <a:prstGeom prst="rect">
             <a:avLst/>
@@ -3266,14 +3487,14 @@
       </p:pic>
       <p:pic>
         <p:nvPicPr>
-          <p:cNvPr id="2054" name="Picture 6"/>
+          <p:cNvPr id="4099" name="Picture 3"/>
           <p:cNvPicPr>
             <a:picLocks noChangeAspect="1" noChangeArrowheads="1"/>
           </p:cNvPicPr>
           <p:nvPr/>
         </p:nvPicPr>
         <p:blipFill>
-          <a:blip r:embed="rId3">
+          <a:blip r:embed="rId4">
             <a:extLst>
               <a:ext uri="{28A0092B-C50C-407E-A947-70E740481C1C}">
                 <a14:useLocalDpi xmlns:a14="http://schemas.microsoft.com/office/drawing/2010/main" val="0"/>
@@ -3287,8 +3508,8 @@
         </p:blipFill>
         <p:spPr bwMode="auto">
           <a:xfrm>
-            <a:off x="4713556" y="698731"/>
-            <a:ext cx="4322670" cy="2064352"/>
+            <a:off x="6485573" y="4152191"/>
+            <a:ext cx="2575868" cy="759148"/>
           </a:xfrm>
           <a:prstGeom prst="rect">
             <a:avLst/>
@@ -3318,16 +3539,91 @@
           </a:extLst>
         </p:spPr>
       </p:pic>
+      <p:sp>
+        <p:nvSpPr>
+          <p:cNvPr id="9" name="ZoneTexte 8"/>
+          <p:cNvSpPr txBox="1"/>
+          <p:nvPr/>
+        </p:nvSpPr>
+        <p:spPr>
+          <a:xfrm>
+            <a:off x="306277" y="2886713"/>
+            <a:ext cx="3859503" cy="1246495"/>
+          </a:xfrm>
+          <a:prstGeom prst="rect">
+            <a:avLst/>
+          </a:prstGeom>
+          <a:noFill/>
+        </p:spPr>
+        <p:txBody>
+          <a:bodyPr wrap="square" lIns="0" tIns="0" rIns="0" bIns="0" rtlCol="0">
+            <a:spAutoFit/>
+          </a:bodyPr>
+          <a:lstStyle/>
+          <a:p>
+            <a:r>
+              <a:rPr lang="fr-FR" dirty="0" smtClean="0"/>
+              <a:t>Construction des méthodes </a:t>
+            </a:r>
+            <a:r>
+              <a:rPr lang="fr-FR" dirty="0" err="1" smtClean="0"/>
+              <a:t>get</a:t>
+            </a:r>
+            <a:r>
+              <a:rPr lang="fr-FR" dirty="0" smtClean="0"/>
+              <a:t> et update de la </a:t>
+            </a:r>
+            <a:r>
+              <a:rPr lang="fr-FR" dirty="0" err="1" smtClean="0"/>
+              <a:t>sequence</a:t>
+            </a:r>
+            <a:r>
+              <a:rPr lang="fr-FR" dirty="0" smtClean="0"/>
+              <a:t> de l’écriture comptable (</a:t>
+            </a:r>
+            <a:r>
+              <a:rPr lang="fr-FR" b="1" i="1" dirty="0" err="1" smtClean="0"/>
+              <a:t>myerp</a:t>
+            </a:r>
+            <a:r>
+              <a:rPr lang="fr-FR" b="1" i="1" dirty="0" smtClean="0"/>
+              <a:t>-consumer</a:t>
+            </a:r>
+            <a:r>
+              <a:rPr lang="fr-FR" dirty="0" smtClean="0"/>
+              <a:t>)</a:t>
+            </a:r>
+          </a:p>
+          <a:p>
+            <a:endParaRPr lang="fr-FR" dirty="0"/>
+          </a:p>
+          <a:p>
+            <a:r>
+              <a:rPr lang="fr-FR" dirty="0" smtClean="0"/>
+              <a:t>Ajout d’un </a:t>
+            </a:r>
+            <a:r>
+              <a:rPr lang="fr-FR" dirty="0" err="1" smtClean="0"/>
+              <a:t>Boolean</a:t>
+            </a:r>
+            <a:r>
+              <a:rPr lang="fr-FR" dirty="0" smtClean="0"/>
+              <a:t> pour distinguer le cas d’update ou d’insert.</a:t>
+            </a:r>
+            <a:endParaRPr lang="fr-FR" dirty="0"/>
+          </a:p>
+        </p:txBody>
+      </p:sp>
       <p:pic>
         <p:nvPicPr>
-          <p:cNvPr id="4098" name="Picture 2"/>
+          <p:cNvPr id="2051" name="Picture 3"/>
           <p:cNvPicPr>
             <a:picLocks noChangeAspect="1" noChangeArrowheads="1"/>
           </p:cNvPicPr>
           <p:nvPr/>
         </p:nvPicPr>
         <p:blipFill>
-          <a:blip r:embed="rId4">
+          <a:blip r:embed="rId5">
             <a:extLst>
               <a:ext uri="{28A0092B-C50C-407E-A947-70E740481C1C}">
                 <a14:useLocalDpi xmlns:a14="http://schemas.microsoft.com/office/drawing/2010/main" val="0"/>
@@ -3341,8 +3637,8 @@
         </p:blipFill>
         <p:spPr bwMode="auto">
           <a:xfrm>
-            <a:off x="4713556" y="2945925"/>
-            <a:ext cx="2583356" cy="920321"/>
+            <a:off x="4213078" y="698730"/>
+            <a:ext cx="4775211" cy="3365148"/>
           </a:xfrm>
           <a:prstGeom prst="rect">
             <a:avLst/>
@@ -3374,14 +3670,14 @@
       </p:pic>
       <p:pic>
         <p:nvPicPr>
-          <p:cNvPr id="4099" name="Picture 3"/>
+          <p:cNvPr id="2052" name="Picture 4"/>
           <p:cNvPicPr>
             <a:picLocks noChangeAspect="1" noChangeArrowheads="1"/>
           </p:cNvPicPr>
           <p:nvPr/>
         </p:nvPicPr>
         <p:blipFill>
-          <a:blip r:embed="rId5">
+          <a:blip r:embed="rId6">
             <a:extLst>
               <a:ext uri="{28A0092B-C50C-407E-A947-70E740481C1C}">
                 <a14:useLocalDpi xmlns:a14="http://schemas.microsoft.com/office/drawing/2010/main" val="0"/>
@@ -3395,8 +3691,8 @@
         </p:blipFill>
         <p:spPr bwMode="auto">
           <a:xfrm>
-            <a:off x="4721044" y="3938016"/>
-            <a:ext cx="2575868" cy="759148"/>
+            <a:off x="1470613" y="4152191"/>
+            <a:ext cx="2611026" cy="783708"/>
           </a:xfrm>
           <a:prstGeom prst="rect">
             <a:avLst/>
@@ -3484,10 +3780,98 @@
           <a:lstStyle/>
           <a:p>
             <a:r>
-              <a:rPr lang="fr-FR" sz="2000" dirty="0"/>
-              <a:t>Ajoute une référence à l'écriture comptable</a:t>
+              <a:rPr lang="fr-FR" sz="2000" dirty="0" smtClean="0"/>
+              <a:t>Montant des crédits d’une ligne d'écriture</a:t>
             </a:r>
             <a:endParaRPr lang="fr-FR" sz="2000" dirty="0"/>
+          </a:p>
+        </p:txBody>
+      </p:sp>
+      <p:pic>
+        <p:nvPicPr>
+          <p:cNvPr id="1026" name="Picture 2"/>
+          <p:cNvPicPr>
+            <a:picLocks noChangeAspect="1" noChangeArrowheads="1"/>
+          </p:cNvPicPr>
+          <p:nvPr/>
+        </p:nvPicPr>
+        <p:blipFill>
+          <a:blip r:embed="rId2">
+            <a:extLst>
+              <a:ext uri="{28A0092B-C50C-407E-A947-70E740481C1C}">
+                <a14:useLocalDpi xmlns:a14="http://schemas.microsoft.com/office/drawing/2010/main" val="0"/>
+              </a:ext>
+            </a:extLst>
+          </a:blip>
+          <a:srcRect/>
+          <a:stretch>
+            <a:fillRect/>
+          </a:stretch>
+        </p:blipFill>
+        <p:spPr bwMode="auto">
+          <a:xfrm>
+            <a:off x="453962" y="1151381"/>
+            <a:ext cx="3319463" cy="1457325"/>
+          </a:xfrm>
+          <a:prstGeom prst="rect">
+            <a:avLst/>
+          </a:prstGeom>
+          <a:noFill/>
+          <a:ln>
+            <a:noFill/>
+          </a:ln>
+          <a:extLst>
+            <a:ext uri="{909E8E84-426E-40DD-AFC4-6F175D3DCCD1}">
+              <a14:hiddenFill xmlns:a14="http://schemas.microsoft.com/office/drawing/2010/main">
+                <a:solidFill>
+                  <a:schemeClr val="accent1"/>
+                </a:solidFill>
+              </a14:hiddenFill>
+            </a:ext>
+            <a:ext uri="{91240B29-F687-4F45-9708-019B960494DF}">
+              <a14:hiddenLine xmlns:a14="http://schemas.microsoft.com/office/drawing/2010/main" w="9525">
+                <a:solidFill>
+                  <a:schemeClr val="tx1"/>
+                </a:solidFill>
+                <a:miter lim="800000"/>
+                <a:headEnd/>
+                <a:tailEnd/>
+              </a14:hiddenLine>
+            </a:ext>
+          </a:extLst>
+        </p:spPr>
+      </p:pic>
+      <p:sp>
+        <p:nvSpPr>
+          <p:cNvPr id="2" name="ZoneTexte 1"/>
+          <p:cNvSpPr txBox="1"/>
+          <p:nvPr/>
+        </p:nvSpPr>
+        <p:spPr>
+          <a:xfrm>
+            <a:off x="4297680" y="1151380"/>
+            <a:ext cx="3279648" cy="207749"/>
+          </a:xfrm>
+          <a:prstGeom prst="rect">
+            <a:avLst/>
+          </a:prstGeom>
+          <a:noFill/>
+        </p:spPr>
+        <p:txBody>
+          <a:bodyPr wrap="square" lIns="0" tIns="0" rIns="0" bIns="0" rtlCol="0">
+            <a:spAutoFit/>
+          </a:bodyPr>
+          <a:lstStyle/>
+          <a:p>
+            <a:r>
+              <a:rPr lang="fr-FR" dirty="0" smtClean="0"/>
+              <a:t>Correctif de la méthode </a:t>
+            </a:r>
+            <a:r>
+              <a:rPr lang="fr-FR" dirty="0" err="1" smtClean="0"/>
+              <a:t>getTotalCredit</a:t>
+            </a:r>
+            <a:endParaRPr lang="fr-FR" dirty="0"/>
           </a:p>
         </p:txBody>
       </p:sp>
@@ -3495,6 +3879,1072 @@
     <p:extLst>
       <p:ext uri="{BB962C8B-B14F-4D97-AF65-F5344CB8AC3E}">
         <p14:creationId xmlns:p14="http://schemas.microsoft.com/office/powerpoint/2010/main" val="578192977"/>
+      </p:ext>
+    </p:extLst>
+  </p:cSld>
+  <p:clrMapOvr>
+    <a:masterClrMapping/>
+  </p:clrMapOvr>
+  <p:timing>
+    <p:tnLst>
+      <p:par>
+        <p:cTn id="1" dur="indefinite" restart="never" nodeType="tmRoot"/>
+      </p:par>
+    </p:tnLst>
+  </p:timing>
+</p:sld>
+</file>
+
+<file path=ppt/slides/slide7.xml><?xml version="1.0" encoding="utf-8"?>
+<p:sld xmlns:a="http://schemas.openxmlformats.org/drawingml/2006/main" xmlns:r="http://schemas.openxmlformats.org/officeDocument/2006/relationships" xmlns:p="http://schemas.openxmlformats.org/presentationml/2006/main">
+  <p:cSld>
+    <p:spTree>
+      <p:nvGrpSpPr>
+        <p:cNvPr id="1" name=""/>
+        <p:cNvGrpSpPr/>
+        <p:nvPr/>
+      </p:nvGrpSpPr>
+      <p:grpSpPr>
+        <a:xfrm>
+          <a:off x="0" y="0"/>
+          <a:ext cx="0" cy="0"/>
+          <a:chOff x="0" y="0"/>
+          <a:chExt cx="0" cy="0"/>
+        </a:xfrm>
+      </p:grpSpPr>
+      <p:sp>
+        <p:nvSpPr>
+          <p:cNvPr id="4" name="Titre 3"/>
+          <p:cNvSpPr>
+            <a:spLocks noGrp="1"/>
+          </p:cNvSpPr>
+          <p:nvPr>
+            <p:ph type="title"/>
+          </p:nvPr>
+        </p:nvSpPr>
+        <p:spPr>
+          <a:xfrm>
+            <a:off x="213122" y="339924"/>
+            <a:ext cx="8714184" cy="301621"/>
+          </a:xfrm>
+        </p:spPr>
+        <p:txBody>
+          <a:bodyPr/>
+          <a:lstStyle/>
+          <a:p>
+            <a:r>
+              <a:rPr lang="fr-FR" sz="2000" dirty="0"/>
+              <a:t>RG_Compta_5 : Format et contenu de la référence</a:t>
+            </a:r>
+          </a:p>
+        </p:txBody>
+      </p:sp>
+      <p:pic>
+        <p:nvPicPr>
+          <p:cNvPr id="3074" name="Picture 2"/>
+          <p:cNvPicPr>
+            <a:picLocks noChangeAspect="1" noChangeArrowheads="1"/>
+          </p:cNvPicPr>
+          <p:nvPr/>
+        </p:nvPicPr>
+        <p:blipFill>
+          <a:blip r:embed="rId2">
+            <a:extLst>
+              <a:ext uri="{28A0092B-C50C-407E-A947-70E740481C1C}">
+                <a14:useLocalDpi xmlns:a14="http://schemas.microsoft.com/office/drawing/2010/main" val="0"/>
+              </a:ext>
+            </a:extLst>
+          </a:blip>
+          <a:srcRect/>
+          <a:stretch>
+            <a:fillRect/>
+          </a:stretch>
+        </p:blipFill>
+        <p:spPr bwMode="auto">
+          <a:xfrm>
+            <a:off x="256328" y="1225418"/>
+            <a:ext cx="5980357" cy="1673292"/>
+          </a:xfrm>
+          <a:prstGeom prst="rect">
+            <a:avLst/>
+          </a:prstGeom>
+          <a:noFill/>
+          <a:ln>
+            <a:noFill/>
+          </a:ln>
+          <a:extLst>
+            <a:ext uri="{909E8E84-426E-40DD-AFC4-6F175D3DCCD1}">
+              <a14:hiddenFill xmlns:a14="http://schemas.microsoft.com/office/drawing/2010/main">
+                <a:solidFill>
+                  <a:schemeClr val="accent1"/>
+                </a:solidFill>
+              </a14:hiddenFill>
+            </a:ext>
+            <a:ext uri="{91240B29-F687-4F45-9708-019B960494DF}">
+              <a14:hiddenLine xmlns:a14="http://schemas.microsoft.com/office/drawing/2010/main" w="9525">
+                <a:solidFill>
+                  <a:schemeClr val="tx1"/>
+                </a:solidFill>
+                <a:miter lim="800000"/>
+                <a:headEnd/>
+                <a:tailEnd/>
+              </a14:hiddenLine>
+            </a:ext>
+          </a:extLst>
+        </p:spPr>
+      </p:pic>
+      <p:pic>
+        <p:nvPicPr>
+          <p:cNvPr id="3075" name="Picture 3"/>
+          <p:cNvPicPr>
+            <a:picLocks noChangeAspect="1" noChangeArrowheads="1"/>
+          </p:cNvPicPr>
+          <p:nvPr/>
+        </p:nvPicPr>
+        <p:blipFill>
+          <a:blip r:embed="rId3">
+            <a:extLst>
+              <a:ext uri="{28A0092B-C50C-407E-A947-70E740481C1C}">
+                <a14:useLocalDpi xmlns:a14="http://schemas.microsoft.com/office/drawing/2010/main" val="0"/>
+              </a:ext>
+            </a:extLst>
+          </a:blip>
+          <a:srcRect/>
+          <a:stretch>
+            <a:fillRect/>
+          </a:stretch>
+        </p:blipFill>
+        <p:spPr bwMode="auto">
+          <a:xfrm>
+            <a:off x="6305109" y="1561318"/>
+            <a:ext cx="2761746" cy="852196"/>
+          </a:xfrm>
+          <a:prstGeom prst="rect">
+            <a:avLst/>
+          </a:prstGeom>
+          <a:noFill/>
+          <a:ln>
+            <a:noFill/>
+          </a:ln>
+          <a:extLst>
+            <a:ext uri="{909E8E84-426E-40DD-AFC4-6F175D3DCCD1}">
+              <a14:hiddenFill xmlns:a14="http://schemas.microsoft.com/office/drawing/2010/main">
+                <a:solidFill>
+                  <a:schemeClr val="accent1"/>
+                </a:solidFill>
+              </a14:hiddenFill>
+            </a:ext>
+            <a:ext uri="{91240B29-F687-4F45-9708-019B960494DF}">
+              <a14:hiddenLine xmlns:a14="http://schemas.microsoft.com/office/drawing/2010/main" w="9525">
+                <a:solidFill>
+                  <a:schemeClr val="tx1"/>
+                </a:solidFill>
+                <a:miter lim="800000"/>
+                <a:headEnd/>
+                <a:tailEnd/>
+              </a14:hiddenLine>
+            </a:ext>
+          </a:extLst>
+        </p:spPr>
+      </p:pic>
+      <p:sp>
+        <p:nvSpPr>
+          <p:cNvPr id="3" name="ZoneTexte 2"/>
+          <p:cNvSpPr txBox="1"/>
+          <p:nvPr/>
+        </p:nvSpPr>
+        <p:spPr>
+          <a:xfrm>
+            <a:off x="256328" y="889516"/>
+            <a:ext cx="5399315" cy="207749"/>
+          </a:xfrm>
+          <a:prstGeom prst="rect">
+            <a:avLst/>
+          </a:prstGeom>
+          <a:noFill/>
+        </p:spPr>
+        <p:txBody>
+          <a:bodyPr wrap="square" lIns="0" tIns="0" rIns="0" bIns="0" rtlCol="0">
+            <a:spAutoFit/>
+          </a:bodyPr>
+          <a:lstStyle/>
+          <a:p>
+            <a:r>
+              <a:rPr lang="fr-FR" dirty="0" smtClean="0"/>
+              <a:t>Implémentation de la règle RG_Compta5 (</a:t>
+            </a:r>
+            <a:r>
+              <a:rPr lang="fr-FR" b="1" i="1" dirty="0" err="1" smtClean="0"/>
+              <a:t>myerp</a:t>
+            </a:r>
+            <a:r>
+              <a:rPr lang="fr-FR" b="1" i="1" dirty="0" smtClean="0"/>
+              <a:t>-business</a:t>
+            </a:r>
+            <a:r>
+              <a:rPr lang="fr-FR" dirty="0" smtClean="0"/>
+              <a:t>)</a:t>
+            </a:r>
+            <a:endParaRPr lang="fr-FR" dirty="0"/>
+          </a:p>
+        </p:txBody>
+      </p:sp>
+      <p:pic>
+        <p:nvPicPr>
+          <p:cNvPr id="3076" name="Picture 4"/>
+          <p:cNvPicPr>
+            <a:picLocks noChangeAspect="1" noChangeArrowheads="1"/>
+          </p:cNvPicPr>
+          <p:nvPr/>
+        </p:nvPicPr>
+        <p:blipFill>
+          <a:blip r:embed="rId4">
+            <a:extLst>
+              <a:ext uri="{28A0092B-C50C-407E-A947-70E740481C1C}">
+                <a14:useLocalDpi xmlns:a14="http://schemas.microsoft.com/office/drawing/2010/main" val="0"/>
+              </a:ext>
+            </a:extLst>
+          </a:blip>
+          <a:srcRect/>
+          <a:stretch>
+            <a:fillRect/>
+          </a:stretch>
+        </p:blipFill>
+        <p:spPr bwMode="auto">
+          <a:xfrm>
+            <a:off x="256328" y="3753765"/>
+            <a:ext cx="3768692" cy="465102"/>
+          </a:xfrm>
+          <a:prstGeom prst="rect">
+            <a:avLst/>
+          </a:prstGeom>
+          <a:noFill/>
+          <a:ln>
+            <a:noFill/>
+          </a:ln>
+          <a:extLst>
+            <a:ext uri="{909E8E84-426E-40DD-AFC4-6F175D3DCCD1}">
+              <a14:hiddenFill xmlns:a14="http://schemas.microsoft.com/office/drawing/2010/main">
+                <a:solidFill>
+                  <a:schemeClr val="accent1"/>
+                </a:solidFill>
+              </a14:hiddenFill>
+            </a:ext>
+            <a:ext uri="{91240B29-F687-4F45-9708-019B960494DF}">
+              <a14:hiddenLine xmlns:a14="http://schemas.microsoft.com/office/drawing/2010/main" w="9525">
+                <a:solidFill>
+                  <a:schemeClr val="tx1"/>
+                </a:solidFill>
+                <a:miter lim="800000"/>
+                <a:headEnd/>
+                <a:tailEnd/>
+              </a14:hiddenLine>
+            </a:ext>
+          </a:extLst>
+        </p:spPr>
+      </p:pic>
+      <p:sp>
+        <p:nvSpPr>
+          <p:cNvPr id="5" name="ZoneTexte 4"/>
+          <p:cNvSpPr txBox="1"/>
+          <p:nvPr/>
+        </p:nvSpPr>
+        <p:spPr>
+          <a:xfrm>
+            <a:off x="256328" y="3349055"/>
+            <a:ext cx="8701060" cy="207749"/>
+          </a:xfrm>
+          <a:prstGeom prst="rect">
+            <a:avLst/>
+          </a:prstGeom>
+          <a:noFill/>
+        </p:spPr>
+        <p:txBody>
+          <a:bodyPr wrap="square" lIns="0" tIns="0" rIns="0" bIns="0" rtlCol="0">
+            <a:spAutoFit/>
+          </a:bodyPr>
+          <a:lstStyle/>
+          <a:p>
+            <a:r>
+              <a:rPr lang="fr-FR" dirty="0" smtClean="0"/>
+              <a:t>Correctif apporté à l’expression du pattern de la référence (</a:t>
+            </a:r>
+            <a:r>
+              <a:rPr lang="fr-FR" b="1" i="1" dirty="0" err="1" smtClean="0"/>
+              <a:t>myerp</a:t>
+            </a:r>
+            <a:r>
+              <a:rPr lang="fr-FR" b="1" i="1" dirty="0" smtClean="0"/>
+              <a:t>-model</a:t>
+            </a:r>
+            <a:r>
+              <a:rPr lang="fr-FR" dirty="0" smtClean="0"/>
+              <a:t>)</a:t>
+            </a:r>
+            <a:endParaRPr lang="fr-FR" dirty="0"/>
+          </a:p>
+        </p:txBody>
+      </p:sp>
+    </p:spTree>
+    <p:extLst>
+      <p:ext uri="{BB962C8B-B14F-4D97-AF65-F5344CB8AC3E}">
+        <p14:creationId xmlns:p14="http://schemas.microsoft.com/office/powerpoint/2010/main" val="1432293612"/>
+      </p:ext>
+    </p:extLst>
+  </p:cSld>
+  <p:clrMapOvr>
+    <a:masterClrMapping/>
+  </p:clrMapOvr>
+  <p:timing>
+    <p:tnLst>
+      <p:par>
+        <p:cTn id="1" dur="indefinite" restart="never" nodeType="tmRoot"/>
+      </p:par>
+    </p:tnLst>
+  </p:timing>
+</p:sld>
+</file>
+
+<file path=ppt/slides/slide8.xml><?xml version="1.0" encoding="utf-8"?>
+<p:sld xmlns:a="http://schemas.openxmlformats.org/drawingml/2006/main" xmlns:r="http://schemas.openxmlformats.org/officeDocument/2006/relationships" xmlns:p="http://schemas.openxmlformats.org/presentationml/2006/main">
+  <p:cSld>
+    <p:spTree>
+      <p:nvGrpSpPr>
+        <p:cNvPr id="1" name=""/>
+        <p:cNvGrpSpPr/>
+        <p:nvPr/>
+      </p:nvGrpSpPr>
+      <p:grpSpPr>
+        <a:xfrm>
+          <a:off x="0" y="0"/>
+          <a:ext cx="0" cy="0"/>
+          <a:chOff x="0" y="0"/>
+          <a:chExt cx="0" cy="0"/>
+        </a:xfrm>
+      </p:grpSpPr>
+      <p:sp>
+        <p:nvSpPr>
+          <p:cNvPr id="4" name="Titre 3"/>
+          <p:cNvSpPr>
+            <a:spLocks noGrp="1"/>
+          </p:cNvSpPr>
+          <p:nvPr>
+            <p:ph type="title"/>
+          </p:nvPr>
+        </p:nvSpPr>
+        <p:spPr>
+          <a:xfrm>
+            <a:off x="213122" y="339924"/>
+            <a:ext cx="8714184" cy="301621"/>
+          </a:xfrm>
+        </p:spPr>
+        <p:txBody>
+          <a:bodyPr/>
+          <a:lstStyle/>
+          <a:p>
+            <a:r>
+              <a:rPr lang="fr-FR" sz="2000" dirty="0" smtClean="0"/>
+              <a:t>DIVERS AJUSTEMENTS</a:t>
+            </a:r>
+            <a:endParaRPr lang="fr-FR" sz="2000" dirty="0"/>
+          </a:p>
+        </p:txBody>
+      </p:sp>
+      <p:sp>
+        <p:nvSpPr>
+          <p:cNvPr id="3" name="ZoneTexte 2"/>
+          <p:cNvSpPr txBox="1"/>
+          <p:nvPr/>
+        </p:nvSpPr>
+        <p:spPr>
+          <a:xfrm>
+            <a:off x="256328" y="889516"/>
+            <a:ext cx="5399315" cy="207749"/>
+          </a:xfrm>
+          <a:prstGeom prst="rect">
+            <a:avLst/>
+          </a:prstGeom>
+          <a:noFill/>
+        </p:spPr>
+        <p:txBody>
+          <a:bodyPr wrap="square" lIns="0" tIns="0" rIns="0" bIns="0" rtlCol="0">
+            <a:spAutoFit/>
+          </a:bodyPr>
+          <a:lstStyle/>
+          <a:p>
+            <a:r>
+              <a:rPr lang="fr-FR" dirty="0" smtClean="0"/>
+              <a:t>Vérification de l’écriture comptable avant update (</a:t>
+            </a:r>
+            <a:r>
+              <a:rPr lang="fr-FR" b="1" i="1" dirty="0" err="1" smtClean="0"/>
+              <a:t>myerp</a:t>
+            </a:r>
+            <a:r>
+              <a:rPr lang="fr-FR" b="1" i="1" dirty="0" smtClean="0"/>
+              <a:t>-business</a:t>
+            </a:r>
+            <a:r>
+              <a:rPr lang="fr-FR" dirty="0" smtClean="0"/>
+              <a:t>)</a:t>
+            </a:r>
+            <a:endParaRPr lang="fr-FR" dirty="0"/>
+          </a:p>
+        </p:txBody>
+      </p:sp>
+      <p:pic>
+        <p:nvPicPr>
+          <p:cNvPr id="4098" name="Picture 2"/>
+          <p:cNvPicPr>
+            <a:picLocks noChangeAspect="1" noChangeArrowheads="1"/>
+          </p:cNvPicPr>
+          <p:nvPr/>
+        </p:nvPicPr>
+        <p:blipFill>
+          <a:blip r:embed="rId2">
+            <a:extLst>
+              <a:ext uri="{28A0092B-C50C-407E-A947-70E740481C1C}">
+                <a14:useLocalDpi xmlns:a14="http://schemas.microsoft.com/office/drawing/2010/main" val="0"/>
+              </a:ext>
+            </a:extLst>
+          </a:blip>
+          <a:srcRect/>
+          <a:stretch>
+            <a:fillRect/>
+          </a:stretch>
+        </p:blipFill>
+        <p:spPr bwMode="auto">
+          <a:xfrm>
+            <a:off x="256328" y="1139952"/>
+            <a:ext cx="3669496" cy="1474071"/>
+          </a:xfrm>
+          <a:prstGeom prst="rect">
+            <a:avLst/>
+          </a:prstGeom>
+          <a:noFill/>
+          <a:ln>
+            <a:noFill/>
+          </a:ln>
+          <a:extLst>
+            <a:ext uri="{909E8E84-426E-40DD-AFC4-6F175D3DCCD1}">
+              <a14:hiddenFill xmlns:a14="http://schemas.microsoft.com/office/drawing/2010/main">
+                <a:solidFill>
+                  <a:schemeClr val="accent1"/>
+                </a:solidFill>
+              </a14:hiddenFill>
+            </a:ext>
+            <a:ext uri="{91240B29-F687-4F45-9708-019B960494DF}">
+              <a14:hiddenLine xmlns:a14="http://schemas.microsoft.com/office/drawing/2010/main" w="9525">
+                <a:solidFill>
+                  <a:schemeClr val="tx1"/>
+                </a:solidFill>
+                <a:miter lim="800000"/>
+                <a:headEnd/>
+                <a:tailEnd/>
+              </a14:hiddenLine>
+            </a:ext>
+          </a:extLst>
+        </p:spPr>
+      </p:pic>
+      <p:sp>
+        <p:nvSpPr>
+          <p:cNvPr id="2" name="ZoneTexte 1"/>
+          <p:cNvSpPr txBox="1"/>
+          <p:nvPr/>
+        </p:nvSpPr>
+        <p:spPr>
+          <a:xfrm>
+            <a:off x="256328" y="2816352"/>
+            <a:ext cx="6632152" cy="207749"/>
+          </a:xfrm>
+          <a:prstGeom prst="rect">
+            <a:avLst/>
+          </a:prstGeom>
+          <a:noFill/>
+        </p:spPr>
+        <p:txBody>
+          <a:bodyPr wrap="square" lIns="0" tIns="0" rIns="0" bIns="0" rtlCol="0">
+            <a:spAutoFit/>
+          </a:bodyPr>
+          <a:lstStyle/>
+          <a:p>
+            <a:r>
+              <a:rPr lang="fr-FR" dirty="0" smtClean="0"/>
+              <a:t>Correctif sur le </a:t>
+            </a:r>
+            <a:r>
+              <a:rPr lang="fr-FR" dirty="0" err="1" smtClean="0"/>
+              <a:t>rowMapper</a:t>
+            </a:r>
+            <a:r>
+              <a:rPr lang="fr-FR" dirty="0" smtClean="0"/>
+              <a:t> de la séquence d’écriture comptable (</a:t>
+            </a:r>
+            <a:r>
+              <a:rPr lang="fr-FR" b="1" i="1" dirty="0" err="1" smtClean="0"/>
+              <a:t>myerp</a:t>
+            </a:r>
+            <a:r>
+              <a:rPr lang="fr-FR" b="1" i="1" dirty="0" smtClean="0"/>
+              <a:t>-consumer</a:t>
+            </a:r>
+            <a:r>
+              <a:rPr lang="fr-FR" dirty="0" smtClean="0"/>
+              <a:t>)</a:t>
+            </a:r>
+            <a:endParaRPr lang="fr-FR" dirty="0"/>
+          </a:p>
+        </p:txBody>
+      </p:sp>
+      <p:pic>
+        <p:nvPicPr>
+          <p:cNvPr id="4099" name="Picture 3"/>
+          <p:cNvPicPr>
+            <a:picLocks noChangeAspect="1" noChangeArrowheads="1"/>
+          </p:cNvPicPr>
+          <p:nvPr/>
+        </p:nvPicPr>
+        <p:blipFill>
+          <a:blip r:embed="rId3">
+            <a:extLst>
+              <a:ext uri="{28A0092B-C50C-407E-A947-70E740481C1C}">
+                <a14:useLocalDpi xmlns:a14="http://schemas.microsoft.com/office/drawing/2010/main" val="0"/>
+              </a:ext>
+            </a:extLst>
+          </a:blip>
+          <a:srcRect/>
+          <a:stretch>
+            <a:fillRect/>
+          </a:stretch>
+        </p:blipFill>
+        <p:spPr bwMode="auto">
+          <a:xfrm>
+            <a:off x="256328" y="3151632"/>
+            <a:ext cx="5432314" cy="1241870"/>
+          </a:xfrm>
+          <a:prstGeom prst="rect">
+            <a:avLst/>
+          </a:prstGeom>
+          <a:noFill/>
+          <a:ln>
+            <a:noFill/>
+          </a:ln>
+          <a:extLst>
+            <a:ext uri="{909E8E84-426E-40DD-AFC4-6F175D3DCCD1}">
+              <a14:hiddenFill xmlns:a14="http://schemas.microsoft.com/office/drawing/2010/main">
+                <a:solidFill>
+                  <a:schemeClr val="accent1"/>
+                </a:solidFill>
+              </a14:hiddenFill>
+            </a:ext>
+            <a:ext uri="{91240B29-F687-4F45-9708-019B960494DF}">
+              <a14:hiddenLine xmlns:a14="http://schemas.microsoft.com/office/drawing/2010/main" w="9525">
+                <a:solidFill>
+                  <a:schemeClr val="tx1"/>
+                </a:solidFill>
+                <a:miter lim="800000"/>
+                <a:headEnd/>
+                <a:tailEnd/>
+              </a14:hiddenLine>
+            </a:ext>
+          </a:extLst>
+        </p:spPr>
+      </p:pic>
+    </p:spTree>
+    <p:extLst>
+      <p:ext uri="{BB962C8B-B14F-4D97-AF65-F5344CB8AC3E}">
+        <p14:creationId xmlns:p14="http://schemas.microsoft.com/office/powerpoint/2010/main" val="1569621684"/>
+      </p:ext>
+    </p:extLst>
+  </p:cSld>
+  <p:clrMapOvr>
+    <a:masterClrMapping/>
+  </p:clrMapOvr>
+  <p:timing>
+    <p:tnLst>
+      <p:par>
+        <p:cTn id="1" dur="indefinite" restart="never" nodeType="tmRoot"/>
+      </p:par>
+    </p:tnLst>
+  </p:timing>
+</p:sld>
+</file>
+
+<file path=ppt/slides/slide9.xml><?xml version="1.0" encoding="utf-8"?>
+<p:sld xmlns:a="http://schemas.openxmlformats.org/drawingml/2006/main" xmlns:r="http://schemas.openxmlformats.org/officeDocument/2006/relationships" xmlns:p="http://schemas.openxmlformats.org/presentationml/2006/main">
+  <p:cSld>
+    <p:spTree>
+      <p:nvGrpSpPr>
+        <p:cNvPr id="1" name=""/>
+        <p:cNvGrpSpPr/>
+        <p:nvPr/>
+      </p:nvGrpSpPr>
+      <p:grpSpPr>
+        <a:xfrm>
+          <a:off x="0" y="0"/>
+          <a:ext cx="0" cy="0"/>
+          <a:chOff x="0" y="0"/>
+          <a:chExt cx="0" cy="0"/>
+        </a:xfrm>
+      </p:grpSpPr>
+      <p:sp>
+        <p:nvSpPr>
+          <p:cNvPr id="4" name="Titre 3"/>
+          <p:cNvSpPr>
+            <a:spLocks noGrp="1"/>
+          </p:cNvSpPr>
+          <p:nvPr>
+            <p:ph type="title"/>
+          </p:nvPr>
+        </p:nvSpPr>
+        <p:spPr>
+          <a:xfrm>
+            <a:off x="213122" y="339924"/>
+            <a:ext cx="8714184" cy="301621"/>
+          </a:xfrm>
+        </p:spPr>
+        <p:txBody>
+          <a:bodyPr/>
+          <a:lstStyle/>
+          <a:p>
+            <a:r>
+              <a:rPr lang="fr-FR" sz="2000" dirty="0" smtClean="0"/>
+              <a:t>Mise en </a:t>
+            </a:r>
+            <a:r>
+              <a:rPr lang="fr-FR" sz="2000" dirty="0" err="1" smtClean="0"/>
+              <a:t>plAce</a:t>
+            </a:r>
+            <a:r>
+              <a:rPr lang="fr-FR" sz="2000" dirty="0" smtClean="0"/>
+              <a:t> de </a:t>
+            </a:r>
+            <a:r>
+              <a:rPr lang="fr-FR" sz="2000" dirty="0" err="1" smtClean="0"/>
+              <a:t>testS</a:t>
+            </a:r>
+            <a:r>
+              <a:rPr lang="fr-FR" sz="2000" dirty="0" smtClean="0"/>
+              <a:t> UNITAIRES</a:t>
+            </a:r>
+            <a:endParaRPr lang="fr-FR" sz="2000" dirty="0"/>
+          </a:p>
+        </p:txBody>
+      </p:sp>
+      <p:sp>
+        <p:nvSpPr>
+          <p:cNvPr id="3" name="ZoneTexte 2"/>
+          <p:cNvSpPr txBox="1"/>
+          <p:nvPr/>
+        </p:nvSpPr>
+        <p:spPr>
+          <a:xfrm>
+            <a:off x="207560" y="889516"/>
+            <a:ext cx="5399315" cy="415498"/>
+          </a:xfrm>
+          <a:prstGeom prst="rect">
+            <a:avLst/>
+          </a:prstGeom>
+          <a:noFill/>
+        </p:spPr>
+        <p:txBody>
+          <a:bodyPr wrap="square" lIns="0" tIns="0" rIns="0" bIns="0" rtlCol="0">
+            <a:spAutoFit/>
+          </a:bodyPr>
+          <a:lstStyle/>
+          <a:p>
+            <a:pPr marL="285750" indent="-285750">
+              <a:buFont typeface="Wingdings" panose="05000000000000000000" pitchFamily="2" charset="2"/>
+              <a:buChar char="Ø"/>
+            </a:pPr>
+            <a:r>
+              <a:rPr lang="fr-FR" b="1" i="1" dirty="0" err="1" smtClean="0"/>
+              <a:t>myerp</a:t>
+            </a:r>
+            <a:r>
+              <a:rPr lang="fr-FR" b="1" i="1" dirty="0" smtClean="0"/>
+              <a:t>-business, </a:t>
+            </a:r>
+            <a:r>
+              <a:rPr lang="fr-FR" b="1" i="1" dirty="0" err="1" smtClean="0"/>
+              <a:t>myerp</a:t>
+            </a:r>
+            <a:r>
+              <a:rPr lang="fr-FR" b="1" i="1" dirty="0" smtClean="0"/>
+              <a:t>-consumer, </a:t>
+            </a:r>
+            <a:r>
+              <a:rPr lang="fr-FR" b="1" i="1" dirty="0" err="1" smtClean="0"/>
+              <a:t>myerp</a:t>
+            </a:r>
+            <a:r>
+              <a:rPr lang="fr-FR" b="1" i="1" dirty="0" smtClean="0"/>
+              <a:t>-model, </a:t>
+            </a:r>
+            <a:r>
+              <a:rPr lang="fr-FR" b="1" i="1" dirty="0" err="1" smtClean="0"/>
+              <a:t>myerp-technical</a:t>
+            </a:r>
+            <a:endParaRPr lang="fr-FR" dirty="0"/>
+          </a:p>
+        </p:txBody>
+      </p:sp>
+      <p:sp>
+        <p:nvSpPr>
+          <p:cNvPr id="7" name="Titre 3"/>
+          <p:cNvSpPr txBox="1">
+            <a:spLocks/>
+          </p:cNvSpPr>
+          <p:nvPr/>
+        </p:nvSpPr>
+        <p:spPr bwMode="gray">
+          <a:xfrm>
+            <a:off x="256328" y="1510493"/>
+            <a:ext cx="8714184" cy="301621"/>
+          </a:xfrm>
+          <a:prstGeom prst="rect">
+            <a:avLst/>
+          </a:prstGeom>
+          <a:noFill/>
+        </p:spPr>
+        <p:txBody>
+          <a:bodyPr vert="horz" wrap="square" lIns="0" tIns="0" rIns="0" bIns="0" rtlCol="0" anchor="ctr" anchorCtr="0">
+            <a:spAutoFit/>
+          </a:bodyPr>
+          <a:lstStyle>
+            <a:lvl1pPr algn="l" defTabSz="685800" rtl="0" eaLnBrk="1" latinLnBrk="0" hangingPunct="1">
+              <a:lnSpc>
+                <a:spcPct val="98000"/>
+              </a:lnSpc>
+              <a:spcBef>
+                <a:spcPct val="0"/>
+              </a:spcBef>
+              <a:buNone/>
+              <a:defRPr sz="2700" b="0" kern="1200" cap="all" baseline="0">
+                <a:solidFill>
+                  <a:schemeClr val="tx1"/>
+                </a:solidFill>
+                <a:latin typeface="Arial Black" panose="020B0A04020102020204" pitchFamily="34" charset="0"/>
+                <a:ea typeface="+mj-ea"/>
+                <a:cs typeface="+mj-cs"/>
+              </a:defRPr>
+            </a:lvl1pPr>
+          </a:lstStyle>
+          <a:p>
+            <a:pPr lvl="0"/>
+            <a:r>
+              <a:rPr lang="fr-FR" sz="2000" dirty="0" smtClean="0"/>
+              <a:t>Mise en </a:t>
+            </a:r>
+            <a:r>
+              <a:rPr lang="fr-FR" sz="2000" dirty="0" err="1" smtClean="0"/>
+              <a:t>plAce</a:t>
+            </a:r>
+            <a:r>
+              <a:rPr lang="fr-FR" sz="2000" dirty="0" smtClean="0"/>
+              <a:t> de </a:t>
+            </a:r>
+            <a:r>
+              <a:rPr lang="fr-FR" sz="2000" dirty="0" err="1" smtClean="0"/>
+              <a:t>testS</a:t>
+            </a:r>
+            <a:r>
+              <a:rPr lang="fr-FR" sz="2000" dirty="0" smtClean="0"/>
+              <a:t> D’intégration</a:t>
+            </a:r>
+            <a:endParaRPr lang="fr-FR" sz="2000" dirty="0"/>
+          </a:p>
+        </p:txBody>
+      </p:sp>
+      <p:sp>
+        <p:nvSpPr>
+          <p:cNvPr id="8" name="Titre 3"/>
+          <p:cNvSpPr txBox="1">
+            <a:spLocks/>
+          </p:cNvSpPr>
+          <p:nvPr/>
+        </p:nvSpPr>
+        <p:spPr bwMode="gray">
+          <a:xfrm>
+            <a:off x="256328" y="2820996"/>
+            <a:ext cx="8714184" cy="301621"/>
+          </a:xfrm>
+          <a:prstGeom prst="rect">
+            <a:avLst/>
+          </a:prstGeom>
+          <a:noFill/>
+        </p:spPr>
+        <p:txBody>
+          <a:bodyPr vert="horz" wrap="square" lIns="0" tIns="0" rIns="0" bIns="0" rtlCol="0" anchor="ctr" anchorCtr="0">
+            <a:spAutoFit/>
+          </a:bodyPr>
+          <a:lstStyle>
+            <a:lvl1pPr algn="l" defTabSz="685800" rtl="0" eaLnBrk="1" latinLnBrk="0" hangingPunct="1">
+              <a:lnSpc>
+                <a:spcPct val="98000"/>
+              </a:lnSpc>
+              <a:spcBef>
+                <a:spcPct val="0"/>
+              </a:spcBef>
+              <a:buNone/>
+              <a:defRPr sz="2700" b="0" kern="1200" cap="all" baseline="0">
+                <a:solidFill>
+                  <a:schemeClr val="tx1"/>
+                </a:solidFill>
+                <a:latin typeface="Arial Black" panose="020B0A04020102020204" pitchFamily="34" charset="0"/>
+                <a:ea typeface="+mj-ea"/>
+                <a:cs typeface="+mj-cs"/>
+              </a:defRPr>
+            </a:lvl1pPr>
+          </a:lstStyle>
+          <a:p>
+            <a:pPr lvl="0"/>
+            <a:r>
+              <a:rPr lang="fr-FR" sz="2000" dirty="0" smtClean="0"/>
+              <a:t>Mise en </a:t>
+            </a:r>
+            <a:r>
+              <a:rPr lang="fr-FR" sz="2000" dirty="0" err="1" smtClean="0"/>
+              <a:t>plAce</a:t>
+            </a:r>
+            <a:r>
+              <a:rPr lang="fr-FR" sz="2000" dirty="0" smtClean="0"/>
+              <a:t> d’un OUTIL d’intégration continue</a:t>
+            </a:r>
+            <a:endParaRPr lang="fr-FR" sz="2000" dirty="0"/>
+          </a:p>
+        </p:txBody>
+      </p:sp>
+      <p:sp>
+        <p:nvSpPr>
+          <p:cNvPr id="9" name="Titre 3"/>
+          <p:cNvSpPr txBox="1">
+            <a:spLocks/>
+          </p:cNvSpPr>
+          <p:nvPr/>
+        </p:nvSpPr>
+        <p:spPr bwMode="gray">
+          <a:xfrm>
+            <a:off x="256328" y="3717245"/>
+            <a:ext cx="8714184" cy="301621"/>
+          </a:xfrm>
+          <a:prstGeom prst="rect">
+            <a:avLst/>
+          </a:prstGeom>
+          <a:noFill/>
+        </p:spPr>
+        <p:txBody>
+          <a:bodyPr vert="horz" wrap="square" lIns="0" tIns="0" rIns="0" bIns="0" rtlCol="0" anchor="ctr" anchorCtr="0">
+            <a:spAutoFit/>
+          </a:bodyPr>
+          <a:lstStyle>
+            <a:lvl1pPr algn="l" defTabSz="685800" rtl="0" eaLnBrk="1" latinLnBrk="0" hangingPunct="1">
+              <a:lnSpc>
+                <a:spcPct val="98000"/>
+              </a:lnSpc>
+              <a:spcBef>
+                <a:spcPct val="0"/>
+              </a:spcBef>
+              <a:buNone/>
+              <a:defRPr sz="2700" b="0" kern="1200" cap="all" baseline="0">
+                <a:solidFill>
+                  <a:schemeClr val="tx1"/>
+                </a:solidFill>
+                <a:latin typeface="Arial Black" panose="020B0A04020102020204" pitchFamily="34" charset="0"/>
+                <a:ea typeface="+mj-ea"/>
+                <a:cs typeface="+mj-cs"/>
+              </a:defRPr>
+            </a:lvl1pPr>
+          </a:lstStyle>
+          <a:p>
+            <a:pPr lvl="0"/>
+            <a:r>
+              <a:rPr lang="fr-FR" sz="2000" dirty="0" smtClean="0"/>
+              <a:t>Mise en </a:t>
+            </a:r>
+            <a:r>
+              <a:rPr lang="fr-FR" sz="2000" dirty="0" err="1" smtClean="0"/>
+              <a:t>plAce</a:t>
+            </a:r>
+            <a:r>
+              <a:rPr lang="fr-FR" sz="2000" dirty="0" smtClean="0"/>
+              <a:t> de RAPPORTS de </a:t>
+            </a:r>
+            <a:r>
+              <a:rPr lang="fr-FR" sz="2000" dirty="0" err="1" smtClean="0"/>
+              <a:t>testS</a:t>
+            </a:r>
+            <a:endParaRPr lang="fr-FR" sz="2000" dirty="0"/>
+          </a:p>
+        </p:txBody>
+      </p:sp>
+      <p:sp>
+        <p:nvSpPr>
+          <p:cNvPr id="10" name="ZoneTexte 9"/>
+          <p:cNvSpPr txBox="1"/>
+          <p:nvPr/>
+        </p:nvSpPr>
+        <p:spPr>
+          <a:xfrm>
+            <a:off x="256328" y="1938028"/>
+            <a:ext cx="5399315" cy="623248"/>
+          </a:xfrm>
+          <a:prstGeom prst="rect">
+            <a:avLst/>
+          </a:prstGeom>
+          <a:noFill/>
+        </p:spPr>
+        <p:txBody>
+          <a:bodyPr wrap="square" lIns="0" tIns="0" rIns="0" bIns="0" rtlCol="0">
+            <a:spAutoFit/>
+          </a:bodyPr>
+          <a:lstStyle/>
+          <a:p>
+            <a:r>
+              <a:rPr lang="fr-FR" b="1" i="1" dirty="0" smtClean="0"/>
+              <a:t>Cas nominaux et cas d’</a:t>
+            </a:r>
+            <a:r>
+              <a:rPr lang="fr-FR" b="1" i="1" dirty="0" err="1" smtClean="0"/>
+              <a:t>érreur</a:t>
+            </a:r>
+            <a:endParaRPr lang="fr-FR" b="1" i="1" dirty="0" smtClean="0"/>
+          </a:p>
+          <a:p>
+            <a:pPr marL="285750" indent="-285750">
+              <a:buFont typeface="Wingdings" panose="05000000000000000000" pitchFamily="2" charset="2"/>
+              <a:buChar char="Ø"/>
+            </a:pPr>
+            <a:r>
+              <a:rPr lang="fr-FR" b="1" i="1" dirty="0" err="1" smtClean="0"/>
+              <a:t>myerp</a:t>
+            </a:r>
+            <a:r>
+              <a:rPr lang="fr-FR" b="1" i="1" dirty="0" smtClean="0"/>
+              <a:t>-business : </a:t>
+            </a:r>
+            <a:r>
+              <a:rPr lang="fr-FR" b="1" i="1" dirty="0" err="1" smtClean="0"/>
+              <a:t>BusinessIT</a:t>
+            </a:r>
+            <a:endParaRPr lang="fr-FR" b="1" i="1" dirty="0" smtClean="0"/>
+          </a:p>
+          <a:p>
+            <a:pPr marL="285750" indent="-285750">
+              <a:buFont typeface="Wingdings" panose="05000000000000000000" pitchFamily="2" charset="2"/>
+              <a:buChar char="Ø"/>
+            </a:pPr>
+            <a:r>
+              <a:rPr lang="fr-FR" b="1" i="1" dirty="0" err="1" smtClean="0"/>
+              <a:t>myerp</a:t>
+            </a:r>
+            <a:r>
+              <a:rPr lang="fr-FR" b="1" i="1" dirty="0" smtClean="0"/>
+              <a:t>-consumer : </a:t>
+            </a:r>
+            <a:r>
+              <a:rPr lang="fr-FR" b="1" i="1" dirty="0" err="1" smtClean="0"/>
+              <a:t>ConsumerIT</a:t>
+            </a:r>
+            <a:endParaRPr lang="fr-FR" dirty="0"/>
+          </a:p>
+        </p:txBody>
+      </p:sp>
+      <p:sp>
+        <p:nvSpPr>
+          <p:cNvPr id="5" name="ZoneTexte 4"/>
+          <p:cNvSpPr txBox="1"/>
+          <p:nvPr/>
+        </p:nvSpPr>
+        <p:spPr>
+          <a:xfrm>
+            <a:off x="256328" y="3255263"/>
+            <a:ext cx="5126736" cy="207749"/>
+          </a:xfrm>
+          <a:prstGeom prst="rect">
+            <a:avLst/>
+          </a:prstGeom>
+          <a:noFill/>
+        </p:spPr>
+        <p:txBody>
+          <a:bodyPr wrap="square" lIns="0" tIns="0" rIns="0" bIns="0" rtlCol="0">
+            <a:spAutoFit/>
+          </a:bodyPr>
+          <a:lstStyle/>
+          <a:p>
+            <a:r>
+              <a:rPr lang="fr-FR" dirty="0" smtClean="0"/>
+              <a:t>Lancement des tests à partir d’un push sur </a:t>
+            </a:r>
+            <a:r>
+              <a:rPr lang="fr-FR" dirty="0" err="1" smtClean="0"/>
+              <a:t>github</a:t>
+            </a:r>
+            <a:r>
+              <a:rPr lang="fr-FR" dirty="0" smtClean="0"/>
+              <a:t> via </a:t>
+            </a:r>
+            <a:r>
+              <a:rPr lang="fr-FR" dirty="0" err="1" smtClean="0"/>
+              <a:t>Travis</a:t>
+            </a:r>
+            <a:r>
+              <a:rPr lang="fr-FR" dirty="0" smtClean="0"/>
+              <a:t>-CI</a:t>
+            </a:r>
+            <a:endParaRPr lang="fr-FR" dirty="0"/>
+          </a:p>
+        </p:txBody>
+      </p:sp>
+      <p:sp>
+        <p:nvSpPr>
+          <p:cNvPr id="6" name="ZoneTexte 5"/>
+          <p:cNvSpPr txBox="1"/>
+          <p:nvPr/>
+        </p:nvSpPr>
+        <p:spPr>
+          <a:xfrm>
+            <a:off x="256328" y="4181613"/>
+            <a:ext cx="7815072" cy="415498"/>
+          </a:xfrm>
+          <a:prstGeom prst="rect">
+            <a:avLst/>
+          </a:prstGeom>
+          <a:noFill/>
+        </p:spPr>
+        <p:txBody>
+          <a:bodyPr wrap="square" lIns="0" tIns="0" rIns="0" bIns="0" rtlCol="0">
+            <a:spAutoFit/>
+          </a:bodyPr>
+          <a:lstStyle/>
+          <a:p>
+            <a:r>
+              <a:rPr lang="fr-FR" dirty="0" smtClean="0"/>
+              <a:t>Génération d’un rapport de tests sur la couverture et la qualité de code via </a:t>
+            </a:r>
+            <a:r>
+              <a:rPr lang="fr-FR" dirty="0" err="1" smtClean="0"/>
+              <a:t>SonarCloud</a:t>
+            </a:r>
+            <a:r>
+              <a:rPr lang="fr-FR" dirty="0"/>
+              <a:t> </a:t>
+            </a:r>
+            <a:br>
+              <a:rPr lang="fr-FR" dirty="0"/>
+            </a:br>
+            <a:r>
+              <a:rPr lang="fr-FR" dirty="0"/>
+              <a:t>https://sonarcloud.io/dashboard?id=rvallet_ocp9-projetB4</a:t>
+            </a:r>
+            <a:endParaRPr lang="fr-FR" dirty="0"/>
+          </a:p>
+        </p:txBody>
+      </p:sp>
+    </p:spTree>
+    <p:extLst>
+      <p:ext uri="{BB962C8B-B14F-4D97-AF65-F5344CB8AC3E}">
+        <p14:creationId xmlns:p14="http://schemas.microsoft.com/office/powerpoint/2010/main" val="2253049589"/>
       </p:ext>
     </p:extLst>
   </p:cSld>
@@ -3828,7 +5278,7 @@
   </a:custClrLst>
   <a:extLst>
     <a:ext uri="{05A4C25C-085E-4340-85A3-A5531E510DB2}">
-      <thm15:themeFamily xmlns="" xmlns:thm15="http://schemas.microsoft.com/office/thememl/2012/main" name="Blank.potx" id="{D8CCFB3A-CA66-4E30-A885-EFBD64A1E9D9}" vid="{BF2D768E-DF08-4D64-BCAB-8216E154572B}"/>
+      <thm15:themeFamily xmlns:thm15="http://schemas.microsoft.com/office/thememl/2012/main" xmlns="" name="Blank.potx" id="{D8CCFB3A-CA66-4E30-A885-EFBD64A1E9D9}" vid="{BF2D768E-DF08-4D64-BCAB-8216E154572B}"/>
     </a:ext>
   </a:extLst>
 </a:theme>
@@ -4417,6 +5867,62 @@
 </file>
 
 <file path=customXml/itemProps1.xml><?xml version="1.0" encoding="utf-8"?>
+<ds:datastoreItem xmlns:ds="http://schemas.openxmlformats.org/officeDocument/2006/customXml" ds:itemID="{BA388501-9B54-4C94-A6D2-E2FCF940976D}">
+  <ds:schemaRefs>
+    <ds:schemaRef ds:uri="http://www.joulesunlimited.com/juid"/>
+  </ds:schemaRefs>
+</ds:datastoreItem>
+</file>
+
+<file path=customXml/itemProps10.xml><?xml version="1.0" encoding="utf-8"?>
+<ds:datastoreItem xmlns:ds="http://schemas.openxmlformats.org/officeDocument/2006/customXml" ds:itemID="{E5A43A96-145C-4051-B26F-63E30B16E14A}">
+  <ds:schemaRefs>
+    <ds:schemaRef ds:uri="http://www.joulesunlimited.com/juid"/>
+  </ds:schemaRefs>
+</ds:datastoreItem>
+</file>
+
+<file path=customXml/itemProps11.xml><?xml version="1.0" encoding="utf-8"?>
+<ds:datastoreItem xmlns:ds="http://schemas.openxmlformats.org/officeDocument/2006/customXml" ds:itemID="{BF8CBE15-079F-4675-BF63-5D820EEC8C03}">
+  <ds:schemaRefs>
+    <ds:schemaRef ds:uri="http://www.joulesunlimited.com/juid"/>
+  </ds:schemaRefs>
+</ds:datastoreItem>
+</file>
+
+<file path=customXml/itemProps12.xml><?xml version="1.0" encoding="utf-8"?>
+<ds:datastoreItem xmlns:ds="http://schemas.openxmlformats.org/officeDocument/2006/customXml" ds:itemID="{1371732C-77C3-47EE-BF45-4B66918F92B9}">
+  <ds:schemaRefs>
+    <ds:schemaRef ds:uri="http://www.joulesunlimited.com/juid"/>
+  </ds:schemaRefs>
+</ds:datastoreItem>
+</file>
+
+<file path=customXml/itemProps13.xml><?xml version="1.0" encoding="utf-8"?>
+<ds:datastoreItem xmlns:ds="http://schemas.openxmlformats.org/officeDocument/2006/customXml" ds:itemID="{272EBBDC-D360-4348-913A-50BDC586F769}">
+  <ds:schemaRefs>
+    <ds:schemaRef ds:uri="http://www.joulesunlimited.com/juid"/>
+  </ds:schemaRefs>
+</ds:datastoreItem>
+</file>
+
+<file path=customXml/itemProps14.xml><?xml version="1.0" encoding="utf-8"?>
+<ds:datastoreItem xmlns:ds="http://schemas.openxmlformats.org/officeDocument/2006/customXml" ds:itemID="{C1AD6AC2-B36E-4A8B-8C05-EC93DE0FE4C6}">
+  <ds:schemaRefs>
+    <ds:schemaRef ds:uri="http://www.joulesunlimited.com/juid"/>
+  </ds:schemaRefs>
+</ds:datastoreItem>
+</file>
+
+<file path=customXml/itemProps15.xml><?xml version="1.0" encoding="utf-8"?>
+<ds:datastoreItem xmlns:ds="http://schemas.openxmlformats.org/officeDocument/2006/customXml" ds:itemID="{14822298-B9D8-4DDA-9A59-C2A813037319}">
+  <ds:schemaRefs>
+    <ds:schemaRef ds:uri="http://www.joulesunlimited.com/juid"/>
+  </ds:schemaRefs>
+</ds:datastoreItem>
+</file>
+
+<file path=customXml/itemProps16.xml><?xml version="1.0" encoding="utf-8"?>
 <ds:datastoreItem xmlns:ds="http://schemas.openxmlformats.org/officeDocument/2006/customXml" ds:itemID="{13100955-99DD-4F1D-B284-562F25173232}">
   <ds:schemaRefs>
     <ds:schemaRef ds:uri="http://www.joulesunlimited.com/juid"/>
@@ -4424,15 +5930,15 @@
 </ds:datastoreItem>
 </file>
 
-<file path=customXml/itemProps10.xml><?xml version="1.0" encoding="utf-8"?>
-<ds:datastoreItem xmlns:ds="http://schemas.openxmlformats.org/officeDocument/2006/customXml" ds:itemID="{4FCC20A6-1F8E-4FD8-A432-F84132A3DB86}">
+<file path=customXml/itemProps17.xml><?xml version="1.0" encoding="utf-8"?>
+<ds:datastoreItem xmlns:ds="http://schemas.openxmlformats.org/officeDocument/2006/customXml" ds:itemID="{7AB8C431-82F7-4495-9402-9D5736F47226}">
   <ds:schemaRefs>
     <ds:schemaRef ds:uri="http://www.joulesunlimited.com/juid"/>
   </ds:schemaRefs>
 </ds:datastoreItem>
 </file>
 
-<file path=customXml/itemProps11.xml><?xml version="1.0" encoding="utf-8"?>
+<file path=customXml/itemProps18.xml><?xml version="1.0" encoding="utf-8"?>
 <ds:datastoreItem xmlns:ds="http://schemas.openxmlformats.org/officeDocument/2006/customXml" ds:itemID="{0553E0E7-1207-467A-862E-153EF903819B}">
   <ds:schemaRefs>
     <ds:schemaRef ds:uri="http://www.joulesunlimited.com/juid"/>
@@ -4440,15 +5946,15 @@
 </ds:datastoreItem>
 </file>
 
-<file path=customXml/itemProps12.xml><?xml version="1.0" encoding="utf-8"?>
-<ds:datastoreItem xmlns:ds="http://schemas.openxmlformats.org/officeDocument/2006/customXml" ds:itemID="{0A116FEA-2A43-4A18-8ADE-FE586D59B1F4}">
+<file path=customXml/itemProps19.xml><?xml version="1.0" encoding="utf-8"?>
+<ds:datastoreItem xmlns:ds="http://schemas.openxmlformats.org/officeDocument/2006/customXml" ds:itemID="{66B75566-FAB0-45AB-9D05-98BB04F94002}">
   <ds:schemaRefs>
     <ds:schemaRef ds:uri="http://www.joulesunlimited.com/juid"/>
   </ds:schemaRefs>
 </ds:datastoreItem>
 </file>
 
-<file path=customXml/itemProps13.xml><?xml version="1.0" encoding="utf-8"?>
+<file path=customXml/itemProps2.xml><?xml version="1.0" encoding="utf-8"?>
 <ds:datastoreItem xmlns:ds="http://schemas.openxmlformats.org/officeDocument/2006/customXml" ds:itemID="{8B6D617A-0FB1-4CA1-BA4C-BE06DE77381F}">
   <ds:schemaRefs>
     <ds:schemaRef ds:uri="http://www.joulesunlimited.com/juid"/>
@@ -4456,80 +5962,24 @@
 </ds:datastoreItem>
 </file>
 
-<file path=customXml/itemProps14.xml><?xml version="1.0" encoding="utf-8"?>
-<ds:datastoreItem xmlns:ds="http://schemas.openxmlformats.org/officeDocument/2006/customXml" ds:itemID="{0407DC00-3AD9-4765-9ECD-EC27EC34C724}">
+<file path=customXml/itemProps20.xml><?xml version="1.0" encoding="utf-8"?>
+<ds:datastoreItem xmlns:ds="http://schemas.openxmlformats.org/officeDocument/2006/customXml" ds:itemID="{365D0148-12F0-478B-A755-985DA728D1A5}">
   <ds:schemaRefs>
     <ds:schemaRef ds:uri="http://www.joulesunlimited.com/juid"/>
   </ds:schemaRefs>
 </ds:datastoreItem>
 </file>
 
-<file path=customXml/itemProps15.xml><?xml version="1.0" encoding="utf-8"?>
-<ds:datastoreItem xmlns:ds="http://schemas.openxmlformats.org/officeDocument/2006/customXml" ds:itemID="{3D3EEC19-198B-4DBF-968B-617470FE52A3}">
+<file path=customXml/itemProps21.xml><?xml version="1.0" encoding="utf-8"?>
+<ds:datastoreItem xmlns:ds="http://schemas.openxmlformats.org/officeDocument/2006/customXml" ds:itemID="{7BB09290-3589-4182-ADD1-CA2E3C0F771D}">
   <ds:schemaRefs>
     <ds:schemaRef ds:uri="http://www.joulesunlimited.com/juid"/>
   </ds:schemaRefs>
 </ds:datastoreItem>
 </file>
 
-<file path=customXml/itemProps16.xml><?xml version="1.0" encoding="utf-8"?>
-<ds:datastoreItem xmlns:ds="http://schemas.openxmlformats.org/officeDocument/2006/customXml" ds:itemID="{272EBBDC-D360-4348-913A-50BDC586F769}">
-  <ds:schemaRefs>
-    <ds:schemaRef ds:uri="http://www.joulesunlimited.com/juid"/>
-  </ds:schemaRefs>
-</ds:datastoreItem>
-</file>
-
-<file path=customXml/itemProps17.xml><?xml version="1.0" encoding="utf-8"?>
-<ds:datastoreItem xmlns:ds="http://schemas.openxmlformats.org/officeDocument/2006/customXml" ds:itemID="{6A900602-4AA5-4175-B192-210836D17189}">
-  <ds:schemaRefs>
-    <ds:schemaRef ds:uri="http://www.joulesunlimited.com/juid"/>
-  </ds:schemaRefs>
-</ds:datastoreItem>
-</file>
-
-<file path=customXml/itemProps18.xml><?xml version="1.0" encoding="utf-8"?>
-<ds:datastoreItem xmlns:ds="http://schemas.openxmlformats.org/officeDocument/2006/customXml" ds:itemID="{CE178A92-2A4A-4337-B7B7-67EB322B5A46}">
-  <ds:schemaRefs>
-    <ds:schemaRef ds:uri="http://www.joulesunlimited.com/juid"/>
-  </ds:schemaRefs>
-</ds:datastoreItem>
-</file>
-
-<file path=customXml/itemProps19.xml><?xml version="1.0" encoding="utf-8"?>
-<ds:datastoreItem xmlns:ds="http://schemas.openxmlformats.org/officeDocument/2006/customXml" ds:itemID="{4A602AE2-C421-49AA-A620-FC4F38415B84}">
-  <ds:schemaRefs>
-    <ds:schemaRef ds:uri="http://www.joulesunlimited.com/juid"/>
-  </ds:schemaRefs>
-</ds:datastoreItem>
-</file>
-
-<file path=customXml/itemProps2.xml><?xml version="1.0" encoding="utf-8"?>
-<ds:datastoreItem xmlns:ds="http://schemas.openxmlformats.org/officeDocument/2006/customXml" ds:itemID="{1371732C-77C3-47EE-BF45-4B66918F92B9}">
-  <ds:schemaRefs>
-    <ds:schemaRef ds:uri="http://www.joulesunlimited.com/juid"/>
-  </ds:schemaRefs>
-</ds:datastoreItem>
-</file>
-
-<file path=customXml/itemProps20.xml><?xml version="1.0" encoding="utf-8"?>
-<ds:datastoreItem xmlns:ds="http://schemas.openxmlformats.org/officeDocument/2006/customXml" ds:itemID="{C1AD6AC2-B36E-4A8B-8C05-EC93DE0FE4C6}">
-  <ds:schemaRefs>
-    <ds:schemaRef ds:uri="http://www.joulesunlimited.com/juid"/>
-  </ds:schemaRefs>
-</ds:datastoreItem>
-</file>
-
-<file path=customXml/itemProps21.xml><?xml version="1.0" encoding="utf-8"?>
-<ds:datastoreItem xmlns:ds="http://schemas.openxmlformats.org/officeDocument/2006/customXml" ds:itemID="{7FFB0592-BE29-41E9-B07C-3E9066368DA2}">
-  <ds:schemaRefs>
-    <ds:schemaRef ds:uri="http://www.joulesunlimited.com/juid"/>
-  </ds:schemaRefs>
-</ds:datastoreItem>
-</file>
-
 <file path=customXml/itemProps22.xml><?xml version="1.0" encoding="utf-8"?>
-<ds:datastoreItem xmlns:ds="http://schemas.openxmlformats.org/officeDocument/2006/customXml" ds:itemID="{05108CB9-601D-4FD5-B851-23F5FECD446A}">
+<ds:datastoreItem xmlns:ds="http://schemas.openxmlformats.org/officeDocument/2006/customXml" ds:itemID="{3D3EEC19-198B-4DBF-968B-617470FE52A3}">
   <ds:schemaRefs>
     <ds:schemaRef ds:uri="http://www.joulesunlimited.com/juid"/>
   </ds:schemaRefs>
@@ -4545,7 +5995,7 @@
 </file>
 
 <file path=customXml/itemProps24.xml><?xml version="1.0" encoding="utf-8"?>
-<ds:datastoreItem xmlns:ds="http://schemas.openxmlformats.org/officeDocument/2006/customXml" ds:itemID="{66B75566-FAB0-45AB-9D05-98BB04F94002}">
+<ds:datastoreItem xmlns:ds="http://schemas.openxmlformats.org/officeDocument/2006/customXml" ds:itemID="{C1699E6A-38C6-446F-9665-D4128549273D}">
   <ds:schemaRefs>
     <ds:schemaRef ds:uri="http://www.joulesunlimited.com/juid"/>
   </ds:schemaRefs>
@@ -4553,7 +6003,7 @@
 </file>
 
 <file path=customXml/itemProps25.xml><?xml version="1.0" encoding="utf-8"?>
-<ds:datastoreItem xmlns:ds="http://schemas.openxmlformats.org/officeDocument/2006/customXml" ds:itemID="{E5A43A96-145C-4051-B26F-63E30B16E14A}">
+<ds:datastoreItem xmlns:ds="http://schemas.openxmlformats.org/officeDocument/2006/customXml" ds:itemID="{4FCC20A6-1F8E-4FD8-A432-F84132A3DB86}">
   <ds:schemaRefs>
     <ds:schemaRef ds:uri="http://www.joulesunlimited.com/juid"/>
   </ds:schemaRefs>
@@ -4561,6 +6011,78 @@
 </file>
 
 <file path=customXml/itemProps26.xml><?xml version="1.0" encoding="utf-8"?>
+<ds:datastoreItem xmlns:ds="http://schemas.openxmlformats.org/officeDocument/2006/customXml" ds:itemID="{4A602AE2-C421-49AA-A620-FC4F38415B84}">
+  <ds:schemaRefs>
+    <ds:schemaRef ds:uri="http://www.joulesunlimited.com/juid"/>
+  </ds:schemaRefs>
+</ds:datastoreItem>
+</file>
+
+<file path=customXml/itemProps27.xml><?xml version="1.0" encoding="utf-8"?>
+<ds:datastoreItem xmlns:ds="http://schemas.openxmlformats.org/officeDocument/2006/customXml" ds:itemID="{EB4C4CD1-ABD9-48E9-9E69-815A9A096DE0}">
+  <ds:schemaRefs>
+    <ds:schemaRef ds:uri="http://www.joulesunlimited.com/juid"/>
+  </ds:schemaRefs>
+</ds:datastoreItem>
+</file>
+
+<file path=customXml/itemProps28.xml><?xml version="1.0" encoding="utf-8"?>
+<ds:datastoreItem xmlns:ds="http://schemas.openxmlformats.org/officeDocument/2006/customXml" ds:itemID="{D5C1DE85-FEE5-4CD5-BEAB-32B31BACBCFE}">
+  <ds:schemaRefs>
+    <ds:schemaRef ds:uri="http://www.joulesunlimited.com/juid"/>
+  </ds:schemaRefs>
+</ds:datastoreItem>
+</file>
+
+<file path=customXml/itemProps29.xml><?xml version="1.0" encoding="utf-8"?>
+<ds:datastoreItem xmlns:ds="http://schemas.openxmlformats.org/officeDocument/2006/customXml" ds:itemID="{5211BA7A-995F-4966-ADEE-20903C05C84B}">
+  <ds:schemaRefs>
+    <ds:schemaRef ds:uri="http://www.joulesunlimited.com/juid"/>
+  </ds:schemaRefs>
+</ds:datastoreItem>
+</file>
+
+<file path=customXml/itemProps3.xml><?xml version="1.0" encoding="utf-8"?>
+<ds:datastoreItem xmlns:ds="http://schemas.openxmlformats.org/officeDocument/2006/customXml" ds:itemID="{CE178A92-2A4A-4337-B7B7-67EB322B5A46}">
+  <ds:schemaRefs>
+    <ds:schemaRef ds:uri="http://www.joulesunlimited.com/juid"/>
+  </ds:schemaRefs>
+</ds:datastoreItem>
+</file>
+
+<file path=customXml/itemProps30.xml><?xml version="1.0" encoding="utf-8"?>
+<ds:datastoreItem xmlns:ds="http://schemas.openxmlformats.org/officeDocument/2006/customXml" ds:itemID="{0407DC00-3AD9-4765-9ECD-EC27EC34C724}">
+  <ds:schemaRefs>
+    <ds:schemaRef ds:uri="http://www.joulesunlimited.com/juid"/>
+  </ds:schemaRefs>
+</ds:datastoreItem>
+</file>
+
+<file path=customXml/itemProps31.xml><?xml version="1.0" encoding="utf-8"?>
+<ds:datastoreItem xmlns:ds="http://schemas.openxmlformats.org/officeDocument/2006/customXml" ds:itemID="{05108CB9-601D-4FD5-B851-23F5FECD446A}">
+  <ds:schemaRefs>
+    <ds:schemaRef ds:uri="http://www.joulesunlimited.com/juid"/>
+  </ds:schemaRefs>
+</ds:datastoreItem>
+</file>
+
+<file path=customXml/itemProps32.xml><?xml version="1.0" encoding="utf-8"?>
+<ds:datastoreItem xmlns:ds="http://schemas.openxmlformats.org/officeDocument/2006/customXml" ds:itemID="{6F9F3F13-4916-4C3E-9C5A-30ECD36B9B9A}">
+  <ds:schemaRefs>
+    <ds:schemaRef ds:uri="http://www.joulesunlimited.com/juid"/>
+  </ds:schemaRefs>
+</ds:datastoreItem>
+</file>
+
+<file path=customXml/itemProps33.xml><?xml version="1.0" encoding="utf-8"?>
+<ds:datastoreItem xmlns:ds="http://schemas.openxmlformats.org/officeDocument/2006/customXml" ds:itemID="{12A90D42-96F5-4AA3-8B57-0B593BA25485}">
+  <ds:schemaRefs>
+    <ds:schemaRef ds:uri="http://www.joulesunlimited.com/juid"/>
+  </ds:schemaRefs>
+</ds:datastoreItem>
+</file>
+
+<file path=customXml/itemProps4.xml><?xml version="1.0" encoding="utf-8"?>
 <ds:datastoreItem xmlns:ds="http://schemas.openxmlformats.org/officeDocument/2006/customXml" ds:itemID="{5FA85E9C-490F-4B8F-B50A-9DBF8145A93B}">
   <ds:schemaRefs>
     <ds:schemaRef ds:uri="http://www.joulesunlimited.com/juid"/>
@@ -4568,31 +6090,7 @@
 </ds:datastoreItem>
 </file>
 
-<file path=customXml/itemProps27.xml><?xml version="1.0" encoding="utf-8"?>
-<ds:datastoreItem xmlns:ds="http://schemas.openxmlformats.org/officeDocument/2006/customXml" ds:itemID="{6F9F3F13-4916-4C3E-9C5A-30ECD36B9B9A}">
-  <ds:schemaRefs>
-    <ds:schemaRef ds:uri="http://www.joulesunlimited.com/juid"/>
-  </ds:schemaRefs>
-</ds:datastoreItem>
-</file>
-
-<file path=customXml/itemProps28.xml><?xml version="1.0" encoding="utf-8"?>
-<ds:datastoreItem xmlns:ds="http://schemas.openxmlformats.org/officeDocument/2006/customXml" ds:itemID="{C1699E6A-38C6-446F-9665-D4128549273D}">
-  <ds:schemaRefs>
-    <ds:schemaRef ds:uri="http://www.joulesunlimited.com/juid"/>
-  </ds:schemaRefs>
-</ds:datastoreItem>
-</file>
-
-<file path=customXml/itemProps29.xml><?xml version="1.0" encoding="utf-8"?>
-<ds:datastoreItem xmlns:ds="http://schemas.openxmlformats.org/officeDocument/2006/customXml" ds:itemID="{14822298-B9D8-4DDA-9A59-C2A813037319}">
-  <ds:schemaRefs>
-    <ds:schemaRef ds:uri="http://www.joulesunlimited.com/juid"/>
-  </ds:schemaRefs>
-</ds:datastoreItem>
-</file>
-
-<file path=customXml/itemProps3.xml><?xml version="1.0" encoding="utf-8"?>
+<file path=customXml/itemProps5.xml><?xml version="1.0" encoding="utf-8"?>
 <ds:datastoreItem xmlns:ds="http://schemas.openxmlformats.org/officeDocument/2006/customXml" ds:itemID="{4B36BCBD-AAD7-45FB-A384-6F9B19D98E94}">
   <ds:schemaRefs>
     <ds:schemaRef ds:uri="http://www.joulesunlimited.com/juid"/>
@@ -4600,56 +6098,8 @@
 </ds:datastoreItem>
 </file>
 
-<file path=customXml/itemProps30.xml><?xml version="1.0" encoding="utf-8"?>
-<ds:datastoreItem xmlns:ds="http://schemas.openxmlformats.org/officeDocument/2006/customXml" ds:itemID="{12A90D42-96F5-4AA3-8B57-0B593BA25485}">
-  <ds:schemaRefs>
-    <ds:schemaRef ds:uri="http://www.joulesunlimited.com/juid"/>
-  </ds:schemaRefs>
-</ds:datastoreItem>
-</file>
-
-<file path=customXml/itemProps31.xml><?xml version="1.0" encoding="utf-8"?>
-<ds:datastoreItem xmlns:ds="http://schemas.openxmlformats.org/officeDocument/2006/customXml" ds:itemID="{EB4C4CD1-ABD9-48E9-9E69-815A9A096DE0}">
-  <ds:schemaRefs>
-    <ds:schemaRef ds:uri="http://www.joulesunlimited.com/juid"/>
-  </ds:schemaRefs>
-</ds:datastoreItem>
-</file>
-
-<file path=customXml/itemProps32.xml><?xml version="1.0" encoding="utf-8"?>
-<ds:datastoreItem xmlns:ds="http://schemas.openxmlformats.org/officeDocument/2006/customXml" ds:itemID="{365D0148-12F0-478B-A755-985DA728D1A5}">
-  <ds:schemaRefs>
-    <ds:schemaRef ds:uri="http://www.joulesunlimited.com/juid"/>
-  </ds:schemaRefs>
-</ds:datastoreItem>
-</file>
-
-<file path=customXml/itemProps33.xml><?xml version="1.0" encoding="utf-8"?>
-<ds:datastoreItem xmlns:ds="http://schemas.openxmlformats.org/officeDocument/2006/customXml" ds:itemID="{BF8CBE15-079F-4675-BF63-5D820EEC8C03}">
-  <ds:schemaRefs>
-    <ds:schemaRef ds:uri="http://www.joulesunlimited.com/juid"/>
-  </ds:schemaRefs>
-</ds:datastoreItem>
-</file>
-
-<file path=customXml/itemProps4.xml><?xml version="1.0" encoding="utf-8"?>
-<ds:datastoreItem xmlns:ds="http://schemas.openxmlformats.org/officeDocument/2006/customXml" ds:itemID="{D5C1DE85-FEE5-4CD5-BEAB-32B31BACBCFE}">
-  <ds:schemaRefs>
-    <ds:schemaRef ds:uri="http://www.joulesunlimited.com/juid"/>
-  </ds:schemaRefs>
-</ds:datastoreItem>
-</file>
-
-<file path=customXml/itemProps5.xml><?xml version="1.0" encoding="utf-8"?>
-<ds:datastoreItem xmlns:ds="http://schemas.openxmlformats.org/officeDocument/2006/customXml" ds:itemID="{7BB09290-3589-4182-ADD1-CA2E3C0F771D}">
-  <ds:schemaRefs>
-    <ds:schemaRef ds:uri="http://www.joulesunlimited.com/juid"/>
-  </ds:schemaRefs>
-</ds:datastoreItem>
-</file>
-
 <file path=customXml/itemProps6.xml><?xml version="1.0" encoding="utf-8"?>
-<ds:datastoreItem xmlns:ds="http://schemas.openxmlformats.org/officeDocument/2006/customXml" ds:itemID="{7AB8C431-82F7-4495-9402-9D5736F47226}">
+<ds:datastoreItem xmlns:ds="http://schemas.openxmlformats.org/officeDocument/2006/customXml" ds:itemID="{7FFB0592-BE29-41E9-B07C-3E9066368DA2}">
   <ds:schemaRefs>
     <ds:schemaRef ds:uri="http://www.joulesunlimited.com/juid"/>
   </ds:schemaRefs>
@@ -4665,7 +6115,7 @@
 </file>
 
 <file path=customXml/itemProps8.xml><?xml version="1.0" encoding="utf-8"?>
-<ds:datastoreItem xmlns:ds="http://schemas.openxmlformats.org/officeDocument/2006/customXml" ds:itemID="{BA388501-9B54-4C94-A6D2-E2FCF940976D}">
+<ds:datastoreItem xmlns:ds="http://schemas.openxmlformats.org/officeDocument/2006/customXml" ds:itemID="{0A116FEA-2A43-4A18-8ADE-FE586D59B1F4}">
   <ds:schemaRefs>
     <ds:schemaRef ds:uri="http://www.joulesunlimited.com/juid"/>
   </ds:schemaRefs>
@@ -4673,7 +6123,7 @@
 </file>
 
 <file path=customXml/itemProps9.xml><?xml version="1.0" encoding="utf-8"?>
-<ds:datastoreItem xmlns:ds="http://schemas.openxmlformats.org/officeDocument/2006/customXml" ds:itemID="{5211BA7A-995F-4966-ADEE-20903C05C84B}">
+<ds:datastoreItem xmlns:ds="http://schemas.openxmlformats.org/officeDocument/2006/customXml" ds:itemID="{6A900602-4AA5-4175-B192-210836D17189}">
   <ds:schemaRefs>
     <ds:schemaRef ds:uri="http://www.joulesunlimited.com/juid"/>
   </ds:schemaRefs>

</xml_diff>

<commit_message>
test openjdk11 - clean POM (remove config TI)
</commit_message>
<xml_diff>
--- a/doc/Présentation_OCP9_projetB4.pptx
+++ b/doc/Présentation_OCP9_projetB4.pptx
@@ -5,10 +5,10 @@
     <p:sldMasterId id="2147483790" r:id="rId34"/>
   </p:sldMasterIdLst>
   <p:notesMasterIdLst>
-    <p:notesMasterId r:id="rId45"/>
+    <p:notesMasterId r:id="rId47"/>
   </p:notesMasterIdLst>
   <p:handoutMasterIdLst>
-    <p:handoutMasterId r:id="rId46"/>
+    <p:handoutMasterId r:id="rId48"/>
   </p:handoutMasterIdLst>
   <p:sldIdLst>
     <p:sldId id="256" r:id="rId35"/>
@@ -19,13 +19,15 @@
     <p:sldId id="261" r:id="rId40"/>
     <p:sldId id="262" r:id="rId41"/>
     <p:sldId id="263" r:id="rId42"/>
-    <p:sldId id="264" r:id="rId43"/>
-    <p:sldId id="265" r:id="rId44"/>
+    <p:sldId id="266" r:id="rId43"/>
+    <p:sldId id="267" r:id="rId44"/>
+    <p:sldId id="264" r:id="rId45"/>
+    <p:sldId id="265" r:id="rId46"/>
   </p:sldIdLst>
   <p:sldSz cx="9144000" cy="5143500" type="screen16x9"/>
   <p:notesSz cx="6858000" cy="9144000"/>
   <p:custDataLst>
-    <p:tags r:id="rId47"/>
+    <p:tags r:id="rId49"/>
   </p:custDataLst>
   <p:defaultTextStyle>
     <a:defPPr lvl="0">
@@ -124,7 +126,7 @@
   </p:defaultTextStyle>
   <p:extLst>
     <p:ext uri="{EFAFB233-063F-42B5-8137-9DF3F51BA10A}">
-      <p15:sldGuideLst xmlns:p15="http://schemas.microsoft.com/office/powerpoint/2012/main" xmlns="">
+      <p15:sldGuideLst xmlns="" xmlns:p15="http://schemas.microsoft.com/office/powerpoint/2012/main">
         <p15:guide id="1" orient="horz" pos="1620" userDrawn="1">
           <p15:clr>
             <a:srgbClr val="A4A3A4"/>
@@ -138,7 +140,7 @@
       </p15:sldGuideLst>
     </p:ext>
     <p:ext uri="{2D200454-40CA-4A62-9FC3-DE9A4176ACB9}">
-      <p15:notesGuideLst xmlns:p15="http://schemas.microsoft.com/office/powerpoint/2012/main" xmlns="">
+      <p15:notesGuideLst xmlns="" xmlns:p15="http://schemas.microsoft.com/office/powerpoint/2012/main">
         <p15:guide id="1" orient="horz" pos="2880">
           <p15:clr>
             <a:srgbClr val="A4A3A4"/>
@@ -935,7 +937,7 @@
           <p:cNvPr id="6" name="Frame picture 1">
             <a:extLst>
               <a:ext uri="{FF2B5EF4-FFF2-40B4-BE49-F238E27FC236}">
-                <a16:creationId xmlns:a16="http://schemas.microsoft.com/office/drawing/2014/main" xmlns="" id="{65E86301-1998-EF4F-B706-B9BC864A3BF7}"/>
+                <a16:creationId xmlns="" xmlns:a16="http://schemas.microsoft.com/office/drawing/2014/main" id="{65E86301-1998-EF4F-B706-B9BC864A3BF7}"/>
               </a:ext>
             </a:extLst>
           </p:cNvPr>
@@ -982,7 +984,7 @@
           <p:cNvPr id="2" name="Title 1">
             <a:extLst>
               <a:ext uri="{FF2B5EF4-FFF2-40B4-BE49-F238E27FC236}">
-                <a16:creationId xmlns:a16="http://schemas.microsoft.com/office/drawing/2014/main" xmlns="" id="{CF267043-749E-4CC4-95FD-6FA8F074C44A}"/>
+                <a16:creationId xmlns="" xmlns:a16="http://schemas.microsoft.com/office/drawing/2014/main" id="{CF267043-749E-4CC4-95FD-6FA8F074C44A}"/>
               </a:ext>
             </a:extLst>
           </p:cNvPr>
@@ -1077,7 +1079,7 @@
           <p:cNvPr id="5" name="Title 1">
             <a:extLst>
               <a:ext uri="{FF2B5EF4-FFF2-40B4-BE49-F238E27FC236}">
-                <a16:creationId xmlns:a16="http://schemas.microsoft.com/office/drawing/2014/main" xmlns="" id="{CAF4CD65-24E4-4A2C-9857-C8365CEDC4DA}"/>
+                <a16:creationId xmlns="" xmlns:a16="http://schemas.microsoft.com/office/drawing/2014/main" id="{CAF4CD65-24E4-4A2C-9857-C8365CEDC4DA}"/>
               </a:ext>
             </a:extLst>
           </p:cNvPr>
@@ -1190,7 +1192,7 @@
   </p:clrMapOvr>
   <p:extLst>
     <p:ext uri="{DCECCB84-F9BA-43D5-87BE-67443E8EF086}">
-      <p15:sldGuideLst xmlns:p15="http://schemas.microsoft.com/office/powerpoint/2012/main" xmlns=""/>
+      <p15:sldGuideLst xmlns="" xmlns:p15="http://schemas.microsoft.com/office/powerpoint/2012/main"/>
     </p:ext>
   </p:extLst>
 </p:sldLayout>
@@ -1282,7 +1284,7 @@
           <p:cNvPr id="6" name="Title 1">
             <a:extLst>
               <a:ext uri="{FF2B5EF4-FFF2-40B4-BE49-F238E27FC236}">
-                <a16:creationId xmlns:a16="http://schemas.microsoft.com/office/drawing/2014/main" xmlns="" id="{41571FD5-12B2-421F-9B07-99071A4E6161}"/>
+                <a16:creationId xmlns="" xmlns:a16="http://schemas.microsoft.com/office/drawing/2014/main" id="{41571FD5-12B2-421F-9B07-99071A4E6161}"/>
               </a:ext>
             </a:extLst>
           </p:cNvPr>
@@ -1418,7 +1420,7 @@
           <p:cNvPr id="6" name="Title 1">
             <a:extLst>
               <a:ext uri="{FF2B5EF4-FFF2-40B4-BE49-F238E27FC236}">
-                <a16:creationId xmlns:a16="http://schemas.microsoft.com/office/drawing/2014/main" xmlns="" id="{67AF7496-90D2-4A52-8B85-42B4E4BF71E7}"/>
+                <a16:creationId xmlns="" xmlns:a16="http://schemas.microsoft.com/office/drawing/2014/main" id="{67AF7496-90D2-4A52-8B85-42B4E4BF71E7}"/>
               </a:ext>
             </a:extLst>
           </p:cNvPr>
@@ -2195,7 +2197,7 @@
   </p:txStyles>
   <p:extLst mod="1">
     <p:ext uri="{27BBF7A9-308A-43DC-89C8-2F10F3537804}">
-      <p15:sldGuideLst xmlns:p15="http://schemas.microsoft.com/office/powerpoint/2012/main" xmlns="">
+      <p15:sldGuideLst xmlns="" xmlns:p15="http://schemas.microsoft.com/office/powerpoint/2012/main">
         <p15:guide id="1" orient="horz" pos="3103" userDrawn="1">
           <p15:clr>
             <a:srgbClr val="000000"/>
@@ -2381,7 +2383,773 @@
           <a:p>
             <a:r>
               <a:rPr lang="fr-FR" sz="2000" dirty="0" smtClean="0"/>
+              <a:t>STRATEGIE DE TEST</a:t>
+            </a:r>
+            <a:endParaRPr lang="fr-FR" sz="2000" dirty="0"/>
+          </a:p>
+        </p:txBody>
+      </p:sp>
+      <p:sp>
+        <p:nvSpPr>
+          <p:cNvPr id="3" name="ZoneTexte 2"/>
+          <p:cNvSpPr txBox="1"/>
+          <p:nvPr/>
+        </p:nvSpPr>
+        <p:spPr>
+          <a:xfrm>
+            <a:off x="201465" y="761982"/>
+            <a:ext cx="8582871" cy="830997"/>
+          </a:xfrm>
+          <a:prstGeom prst="rect">
+            <a:avLst/>
+          </a:prstGeom>
+          <a:noFill/>
+        </p:spPr>
+        <p:txBody>
+          <a:bodyPr wrap="square" lIns="0" tIns="0" rIns="0" bIns="0" rtlCol="0">
+            <a:spAutoFit/>
+          </a:bodyPr>
+          <a:lstStyle/>
+          <a:p>
+            <a:r>
+              <a:rPr lang="fr-FR" dirty="0" smtClean="0"/>
+              <a:t>TU : (</a:t>
+            </a:r>
+            <a:r>
+              <a:rPr lang="fr-FR" dirty="0" err="1" smtClean="0"/>
+              <a:t>junit</a:t>
+            </a:r>
+            <a:r>
+              <a:rPr lang="fr-FR" dirty="0" smtClean="0"/>
+              <a:t> etc…)</a:t>
+            </a:r>
+            <a:br>
+              <a:rPr lang="fr-FR" dirty="0" smtClean="0"/>
+            </a:br>
+            <a:r>
+              <a:rPr lang="fr-FR" dirty="0" smtClean="0"/>
+              <a:t/>
+            </a:r>
+            <a:br>
+              <a:rPr lang="fr-FR" dirty="0" smtClean="0"/>
+            </a:br>
+            <a:r>
+              <a:rPr lang="fr-FR" dirty="0" smtClean="0"/>
+              <a:t>TI : (</a:t>
+            </a:r>
+            <a:r>
+              <a:rPr lang="fr-FR" dirty="0" err="1" smtClean="0"/>
+              <a:t>mockito</a:t>
+            </a:r>
+            <a:r>
+              <a:rPr lang="fr-FR" dirty="0" smtClean="0"/>
+              <a:t>, </a:t>
+            </a:r>
+            <a:r>
+              <a:rPr lang="fr-FR" dirty="0" err="1" smtClean="0"/>
+              <a:t>bdd</a:t>
+            </a:r>
+            <a:r>
+              <a:rPr lang="fr-FR" dirty="0" smtClean="0"/>
+              <a:t> externe)… problèmes rencontrés etc..</a:t>
+            </a:r>
+            <a:endParaRPr lang="fr-FR" dirty="0"/>
+          </a:p>
+          <a:p>
+            <a:endParaRPr lang="fr-FR" dirty="0"/>
+          </a:p>
+        </p:txBody>
+      </p:sp>
+    </p:spTree>
+    <p:extLst>
+      <p:ext uri="{BB962C8B-B14F-4D97-AF65-F5344CB8AC3E}">
+        <p14:creationId xmlns:p14="http://schemas.microsoft.com/office/powerpoint/2010/main" val="849346230"/>
+      </p:ext>
+    </p:extLst>
+  </p:cSld>
+  <p:clrMapOvr>
+    <a:masterClrMapping/>
+  </p:clrMapOvr>
+  <p:timing>
+    <p:tnLst>
+      <p:par>
+        <p:cTn id="1" dur="indefinite" restart="never" nodeType="tmRoot"/>
+      </p:par>
+    </p:tnLst>
+  </p:timing>
+</p:sld>
+</file>
+
+<file path=ppt/slides/slide11.xml><?xml version="1.0" encoding="utf-8"?>
+<p:sld xmlns:a="http://schemas.openxmlformats.org/drawingml/2006/main" xmlns:r="http://schemas.openxmlformats.org/officeDocument/2006/relationships" xmlns:p="http://schemas.openxmlformats.org/presentationml/2006/main">
+  <p:cSld>
+    <p:spTree>
+      <p:nvGrpSpPr>
+        <p:cNvPr id="1" name=""/>
+        <p:cNvGrpSpPr/>
+        <p:nvPr/>
+      </p:nvGrpSpPr>
+      <p:grpSpPr>
+        <a:xfrm>
+          <a:off x="0" y="0"/>
+          <a:ext cx="0" cy="0"/>
+          <a:chOff x="0" y="0"/>
+          <a:chExt cx="0" cy="0"/>
+        </a:xfrm>
+      </p:grpSpPr>
+      <p:sp>
+        <p:nvSpPr>
+          <p:cNvPr id="4" name="Titre 3"/>
+          <p:cNvSpPr>
+            <a:spLocks noGrp="1"/>
+          </p:cNvSpPr>
+          <p:nvPr>
+            <p:ph type="title"/>
+          </p:nvPr>
+        </p:nvSpPr>
+        <p:spPr>
+          <a:xfrm>
+            <a:off x="213122" y="339924"/>
+            <a:ext cx="8714184" cy="301621"/>
+          </a:xfrm>
+        </p:spPr>
+        <p:txBody>
+          <a:bodyPr/>
+          <a:lstStyle/>
+          <a:p>
+            <a:r>
+              <a:rPr lang="fr-FR" sz="2000" dirty="0" smtClean="0"/>
+              <a:t>Mise en </a:t>
+            </a:r>
+            <a:r>
+              <a:rPr lang="fr-FR" sz="2000" dirty="0" err="1" smtClean="0"/>
+              <a:t>plAce</a:t>
+            </a:r>
+            <a:r>
+              <a:rPr lang="fr-FR" sz="2000" dirty="0" smtClean="0"/>
+              <a:t> de </a:t>
+            </a:r>
+            <a:r>
+              <a:rPr lang="fr-FR" sz="2000" dirty="0" err="1" smtClean="0"/>
+              <a:t>testS</a:t>
+            </a:r>
+            <a:r>
+              <a:rPr lang="fr-FR" sz="2000" dirty="0" smtClean="0"/>
+              <a:t> UNITAIRES</a:t>
+            </a:r>
+            <a:endParaRPr lang="fr-FR" sz="2000" dirty="0"/>
+          </a:p>
+        </p:txBody>
+      </p:sp>
+      <p:sp>
+        <p:nvSpPr>
+          <p:cNvPr id="3" name="ZoneTexte 2"/>
+          <p:cNvSpPr txBox="1"/>
+          <p:nvPr/>
+        </p:nvSpPr>
+        <p:spPr>
+          <a:xfrm>
+            <a:off x="207560" y="773692"/>
+            <a:ext cx="5399315" cy="415498"/>
+          </a:xfrm>
+          <a:prstGeom prst="rect">
+            <a:avLst/>
+          </a:prstGeom>
+          <a:noFill/>
+        </p:spPr>
+        <p:txBody>
+          <a:bodyPr wrap="square" lIns="0" tIns="0" rIns="0" bIns="0" rtlCol="0">
+            <a:spAutoFit/>
+          </a:bodyPr>
+          <a:lstStyle/>
+          <a:p>
+            <a:pPr marL="285750" indent="-285750">
+              <a:buFont typeface="Wingdings" panose="05000000000000000000" pitchFamily="2" charset="2"/>
+              <a:buChar char="Ø"/>
+            </a:pPr>
+            <a:r>
+              <a:rPr lang="fr-FR" b="1" i="1" dirty="0" err="1" smtClean="0"/>
+              <a:t>myerp</a:t>
+            </a:r>
+            <a:r>
+              <a:rPr lang="fr-FR" b="1" i="1" dirty="0" smtClean="0"/>
+              <a:t>-business, </a:t>
+            </a:r>
+            <a:r>
+              <a:rPr lang="fr-FR" b="1" i="1" dirty="0" err="1" smtClean="0"/>
+              <a:t>myerp</a:t>
+            </a:r>
+            <a:r>
+              <a:rPr lang="fr-FR" b="1" i="1" dirty="0" smtClean="0"/>
+              <a:t>-consumer, </a:t>
+            </a:r>
+            <a:r>
+              <a:rPr lang="fr-FR" b="1" i="1" dirty="0" err="1" smtClean="0"/>
+              <a:t>myerp</a:t>
+            </a:r>
+            <a:r>
+              <a:rPr lang="fr-FR" b="1" i="1" dirty="0" smtClean="0"/>
+              <a:t>-model, </a:t>
+            </a:r>
+            <a:r>
+              <a:rPr lang="fr-FR" b="1" i="1" dirty="0" err="1" smtClean="0"/>
+              <a:t>myerp-technical</a:t>
+            </a:r>
+            <a:endParaRPr lang="fr-FR" dirty="0"/>
+          </a:p>
+        </p:txBody>
+      </p:sp>
+      <p:sp>
+        <p:nvSpPr>
+          <p:cNvPr id="7" name="Titre 3"/>
+          <p:cNvSpPr txBox="1">
+            <a:spLocks/>
+          </p:cNvSpPr>
+          <p:nvPr/>
+        </p:nvSpPr>
+        <p:spPr bwMode="gray">
+          <a:xfrm>
+            <a:off x="256328" y="1510493"/>
+            <a:ext cx="8714184" cy="301621"/>
+          </a:xfrm>
+          <a:prstGeom prst="rect">
+            <a:avLst/>
+          </a:prstGeom>
+          <a:noFill/>
+        </p:spPr>
+        <p:txBody>
+          <a:bodyPr vert="horz" wrap="square" lIns="0" tIns="0" rIns="0" bIns="0" rtlCol="0" anchor="ctr" anchorCtr="0">
+            <a:spAutoFit/>
+          </a:bodyPr>
+          <a:lstStyle>
+            <a:lvl1pPr algn="l" defTabSz="685800" rtl="0" eaLnBrk="1" latinLnBrk="0" hangingPunct="1">
+              <a:lnSpc>
+                <a:spcPct val="98000"/>
+              </a:lnSpc>
+              <a:spcBef>
+                <a:spcPct val="0"/>
+              </a:spcBef>
+              <a:buNone/>
+              <a:defRPr sz="2700" b="0" kern="1200" cap="all" baseline="0">
+                <a:solidFill>
+                  <a:schemeClr val="tx1"/>
+                </a:solidFill>
+                <a:latin typeface="Arial Black" panose="020B0A04020102020204" pitchFamily="34" charset="0"/>
+                <a:ea typeface="+mj-ea"/>
+                <a:cs typeface="+mj-cs"/>
+              </a:defRPr>
+            </a:lvl1pPr>
+          </a:lstStyle>
+          <a:p>
+            <a:pPr lvl="0"/>
+            <a:r>
+              <a:rPr lang="fr-FR" sz="2000" dirty="0" smtClean="0"/>
+              <a:t>Mise en </a:t>
+            </a:r>
+            <a:r>
+              <a:rPr lang="fr-FR" sz="2000" dirty="0" err="1" smtClean="0"/>
+              <a:t>plAce</a:t>
+            </a:r>
+            <a:r>
+              <a:rPr lang="fr-FR" sz="2000" dirty="0" smtClean="0"/>
+              <a:t> de </a:t>
+            </a:r>
+            <a:r>
+              <a:rPr lang="fr-FR" sz="2000" dirty="0" err="1" smtClean="0"/>
+              <a:t>testS</a:t>
+            </a:r>
+            <a:r>
+              <a:rPr lang="fr-FR" sz="2000" dirty="0" smtClean="0"/>
+              <a:t> D’intégration</a:t>
+            </a:r>
+            <a:endParaRPr lang="fr-FR" sz="2000" dirty="0"/>
+          </a:p>
+        </p:txBody>
+      </p:sp>
+      <p:sp>
+        <p:nvSpPr>
+          <p:cNvPr id="8" name="Titre 3"/>
+          <p:cNvSpPr txBox="1">
+            <a:spLocks/>
+          </p:cNvSpPr>
+          <p:nvPr/>
+        </p:nvSpPr>
+        <p:spPr bwMode="gray">
+          <a:xfrm>
+            <a:off x="256328" y="2820996"/>
+            <a:ext cx="8714184" cy="301621"/>
+          </a:xfrm>
+          <a:prstGeom prst="rect">
+            <a:avLst/>
+          </a:prstGeom>
+          <a:noFill/>
+        </p:spPr>
+        <p:txBody>
+          <a:bodyPr vert="horz" wrap="square" lIns="0" tIns="0" rIns="0" bIns="0" rtlCol="0" anchor="ctr" anchorCtr="0">
+            <a:spAutoFit/>
+          </a:bodyPr>
+          <a:lstStyle>
+            <a:lvl1pPr algn="l" defTabSz="685800" rtl="0" eaLnBrk="1" latinLnBrk="0" hangingPunct="1">
+              <a:lnSpc>
+                <a:spcPct val="98000"/>
+              </a:lnSpc>
+              <a:spcBef>
+                <a:spcPct val="0"/>
+              </a:spcBef>
+              <a:buNone/>
+              <a:defRPr sz="2700" b="0" kern="1200" cap="all" baseline="0">
+                <a:solidFill>
+                  <a:schemeClr val="tx1"/>
+                </a:solidFill>
+                <a:latin typeface="Arial Black" panose="020B0A04020102020204" pitchFamily="34" charset="0"/>
+                <a:ea typeface="+mj-ea"/>
+                <a:cs typeface="+mj-cs"/>
+              </a:defRPr>
+            </a:lvl1pPr>
+          </a:lstStyle>
+          <a:p>
+            <a:pPr lvl="0"/>
+            <a:r>
+              <a:rPr lang="fr-FR" sz="2000" dirty="0" smtClean="0"/>
+              <a:t>Mise en </a:t>
+            </a:r>
+            <a:r>
+              <a:rPr lang="fr-FR" sz="2000" dirty="0" err="1" smtClean="0"/>
+              <a:t>plAce</a:t>
+            </a:r>
+            <a:r>
+              <a:rPr lang="fr-FR" sz="2000" dirty="0" smtClean="0"/>
+              <a:t> d’un OUTIL d’intégration continue</a:t>
+            </a:r>
+            <a:endParaRPr lang="fr-FR" sz="2000" dirty="0"/>
+          </a:p>
+        </p:txBody>
+      </p:sp>
+      <p:sp>
+        <p:nvSpPr>
+          <p:cNvPr id="9" name="Titre 3"/>
+          <p:cNvSpPr txBox="1">
+            <a:spLocks/>
+          </p:cNvSpPr>
+          <p:nvPr/>
+        </p:nvSpPr>
+        <p:spPr bwMode="gray">
+          <a:xfrm>
+            <a:off x="256328" y="3808685"/>
+            <a:ext cx="8714184" cy="301621"/>
+          </a:xfrm>
+          <a:prstGeom prst="rect">
+            <a:avLst/>
+          </a:prstGeom>
+          <a:noFill/>
+        </p:spPr>
+        <p:txBody>
+          <a:bodyPr vert="horz" wrap="square" lIns="0" tIns="0" rIns="0" bIns="0" rtlCol="0" anchor="ctr" anchorCtr="0">
+            <a:spAutoFit/>
+          </a:bodyPr>
+          <a:lstStyle>
+            <a:lvl1pPr algn="l" defTabSz="685800" rtl="0" eaLnBrk="1" latinLnBrk="0" hangingPunct="1">
+              <a:lnSpc>
+                <a:spcPct val="98000"/>
+              </a:lnSpc>
+              <a:spcBef>
+                <a:spcPct val="0"/>
+              </a:spcBef>
+              <a:buNone/>
+              <a:defRPr sz="2700" b="0" kern="1200" cap="all" baseline="0">
+                <a:solidFill>
+                  <a:schemeClr val="tx1"/>
+                </a:solidFill>
+                <a:latin typeface="Arial Black" panose="020B0A04020102020204" pitchFamily="34" charset="0"/>
+                <a:ea typeface="+mj-ea"/>
+                <a:cs typeface="+mj-cs"/>
+              </a:defRPr>
+            </a:lvl1pPr>
+          </a:lstStyle>
+          <a:p>
+            <a:pPr lvl="0"/>
+            <a:r>
+              <a:rPr lang="fr-FR" sz="2000" dirty="0" smtClean="0"/>
+              <a:t>Mise en </a:t>
+            </a:r>
+            <a:r>
+              <a:rPr lang="fr-FR" sz="2000" dirty="0" err="1" smtClean="0"/>
+              <a:t>plAce</a:t>
+            </a:r>
+            <a:r>
+              <a:rPr lang="fr-FR" sz="2000" dirty="0" smtClean="0"/>
+              <a:t> de RAPPORTS de </a:t>
+            </a:r>
+            <a:r>
+              <a:rPr lang="fr-FR" sz="2000" dirty="0" err="1" smtClean="0"/>
+              <a:t>testS</a:t>
+            </a:r>
+            <a:endParaRPr lang="fr-FR" sz="2000" dirty="0"/>
+          </a:p>
+        </p:txBody>
+      </p:sp>
+      <p:sp>
+        <p:nvSpPr>
+          <p:cNvPr id="10" name="ZoneTexte 9"/>
+          <p:cNvSpPr txBox="1"/>
+          <p:nvPr/>
+        </p:nvSpPr>
+        <p:spPr>
+          <a:xfrm>
+            <a:off x="256328" y="1823806"/>
+            <a:ext cx="5399315" cy="623248"/>
+          </a:xfrm>
+          <a:prstGeom prst="rect">
+            <a:avLst/>
+          </a:prstGeom>
+          <a:noFill/>
+        </p:spPr>
+        <p:txBody>
+          <a:bodyPr wrap="square" lIns="0" tIns="0" rIns="0" bIns="0" rtlCol="0">
+            <a:spAutoFit/>
+          </a:bodyPr>
+          <a:lstStyle/>
+          <a:p>
+            <a:r>
+              <a:rPr lang="fr-FR" b="1" i="1" dirty="0" smtClean="0"/>
+              <a:t>Cas nominaux et cas d’</a:t>
+            </a:r>
+            <a:r>
+              <a:rPr lang="fr-FR" b="1" i="1" dirty="0" err="1" smtClean="0"/>
+              <a:t>érreur</a:t>
+            </a:r>
+            <a:endParaRPr lang="fr-FR" b="1" i="1" dirty="0" smtClean="0"/>
+          </a:p>
+          <a:p>
+            <a:pPr marL="285750" indent="-285750">
+              <a:buFont typeface="Wingdings" panose="05000000000000000000" pitchFamily="2" charset="2"/>
+              <a:buChar char="Ø"/>
+            </a:pPr>
+            <a:r>
+              <a:rPr lang="fr-FR" b="1" i="1" dirty="0" err="1" smtClean="0"/>
+              <a:t>myerp</a:t>
+            </a:r>
+            <a:r>
+              <a:rPr lang="fr-FR" b="1" i="1" dirty="0" smtClean="0"/>
+              <a:t>-business : </a:t>
+            </a:r>
+            <a:r>
+              <a:rPr lang="fr-FR" b="1" i="1" dirty="0" err="1" smtClean="0"/>
+              <a:t>BusinessIT</a:t>
+            </a:r>
+            <a:endParaRPr lang="fr-FR" b="1" i="1" dirty="0" smtClean="0"/>
+          </a:p>
+          <a:p>
+            <a:pPr marL="285750" indent="-285750">
+              <a:buFont typeface="Wingdings" panose="05000000000000000000" pitchFamily="2" charset="2"/>
+              <a:buChar char="Ø"/>
+            </a:pPr>
+            <a:r>
+              <a:rPr lang="fr-FR" b="1" i="1" dirty="0" err="1" smtClean="0"/>
+              <a:t>myerp</a:t>
+            </a:r>
+            <a:r>
+              <a:rPr lang="fr-FR" b="1" i="1" dirty="0" smtClean="0"/>
+              <a:t>-consumer : </a:t>
+            </a:r>
+            <a:r>
+              <a:rPr lang="fr-FR" b="1" i="1" dirty="0" err="1" smtClean="0"/>
+              <a:t>ConsumerIT</a:t>
+            </a:r>
+            <a:endParaRPr lang="fr-FR" dirty="0"/>
+          </a:p>
+        </p:txBody>
+      </p:sp>
+      <p:sp>
+        <p:nvSpPr>
+          <p:cNvPr id="5" name="ZoneTexte 4"/>
+          <p:cNvSpPr txBox="1"/>
+          <p:nvPr/>
+        </p:nvSpPr>
+        <p:spPr>
+          <a:xfrm>
+            <a:off x="256328" y="3200399"/>
+            <a:ext cx="5126736" cy="415498"/>
+          </a:xfrm>
+          <a:prstGeom prst="rect">
+            <a:avLst/>
+          </a:prstGeom>
+          <a:noFill/>
+        </p:spPr>
+        <p:txBody>
+          <a:bodyPr wrap="square" lIns="0" tIns="0" rIns="0" bIns="0" rtlCol="0">
+            <a:spAutoFit/>
+          </a:bodyPr>
+          <a:lstStyle/>
+          <a:p>
+            <a:r>
+              <a:rPr lang="fr-FR" dirty="0" smtClean="0"/>
+              <a:t>Lancement des tests à partir d’un push sur </a:t>
+            </a:r>
+            <a:r>
+              <a:rPr lang="fr-FR" dirty="0" err="1" smtClean="0"/>
+              <a:t>github</a:t>
+            </a:r>
+            <a:r>
+              <a:rPr lang="fr-FR" dirty="0" smtClean="0"/>
+              <a:t> via </a:t>
+            </a:r>
+            <a:r>
+              <a:rPr lang="fr-FR" dirty="0" err="1" smtClean="0"/>
+              <a:t>Travis</a:t>
+            </a:r>
+            <a:r>
+              <a:rPr lang="fr-FR" dirty="0"/>
+              <a:t>-CI</a:t>
+            </a:r>
+            <a:br>
+              <a:rPr lang="fr-FR" dirty="0"/>
+            </a:br>
+            <a:r>
+              <a:rPr lang="fr-FR" dirty="0"/>
+              <a:t>https://travis-ci.org/github/rvallet/ocp9-projetB4</a:t>
+            </a:r>
+            <a:endParaRPr lang="fr-FR" dirty="0"/>
+          </a:p>
+        </p:txBody>
+      </p:sp>
+      <p:sp>
+        <p:nvSpPr>
+          <p:cNvPr id="6" name="ZoneTexte 5"/>
+          <p:cNvSpPr txBox="1"/>
+          <p:nvPr/>
+        </p:nvSpPr>
+        <p:spPr>
+          <a:xfrm>
+            <a:off x="256328" y="4181613"/>
+            <a:ext cx="7815072" cy="415498"/>
+          </a:xfrm>
+          <a:prstGeom prst="rect">
+            <a:avLst/>
+          </a:prstGeom>
+          <a:noFill/>
+        </p:spPr>
+        <p:txBody>
+          <a:bodyPr wrap="square" lIns="0" tIns="0" rIns="0" bIns="0" rtlCol="0">
+            <a:spAutoFit/>
+          </a:bodyPr>
+          <a:lstStyle/>
+          <a:p>
+            <a:r>
+              <a:rPr lang="fr-FR" dirty="0" smtClean="0"/>
+              <a:t>Génération d’un rapport de tests sur la couverture et la qualité de code via </a:t>
+            </a:r>
+            <a:r>
+              <a:rPr lang="fr-FR" dirty="0" err="1" smtClean="0"/>
+              <a:t>SonarCloud</a:t>
+            </a:r>
+            <a:r>
+              <a:rPr lang="fr-FR" dirty="0"/>
+              <a:t> </a:t>
+            </a:r>
+            <a:br>
+              <a:rPr lang="fr-FR" dirty="0"/>
+            </a:br>
+            <a:r>
+              <a:rPr lang="fr-FR" dirty="0"/>
+              <a:t>https://sonarcloud.io/dashboard?id=rvallet_ocp9-projetB4</a:t>
+            </a:r>
+          </a:p>
+        </p:txBody>
+      </p:sp>
+    </p:spTree>
+    <p:extLst>
+      <p:ext uri="{BB962C8B-B14F-4D97-AF65-F5344CB8AC3E}">
+        <p14:creationId xmlns:p14="http://schemas.microsoft.com/office/powerpoint/2010/main" val="2253049589"/>
+      </p:ext>
+    </p:extLst>
+  </p:cSld>
+  <p:clrMapOvr>
+    <a:masterClrMapping/>
+  </p:clrMapOvr>
+  <p:timing>
+    <p:tnLst>
+      <p:par>
+        <p:cTn id="1" dur="indefinite" restart="never" nodeType="tmRoot"/>
+      </p:par>
+    </p:tnLst>
+  </p:timing>
+</p:sld>
+</file>
+
+<file path=ppt/slides/slide12.xml><?xml version="1.0" encoding="utf-8"?>
+<p:sld xmlns:a="http://schemas.openxmlformats.org/drawingml/2006/main" xmlns:r="http://schemas.openxmlformats.org/officeDocument/2006/relationships" xmlns:p="http://schemas.openxmlformats.org/presentationml/2006/main">
+  <p:cSld>
+    <p:spTree>
+      <p:nvGrpSpPr>
+        <p:cNvPr id="1" name=""/>
+        <p:cNvGrpSpPr/>
+        <p:nvPr/>
+      </p:nvGrpSpPr>
+      <p:grpSpPr>
+        <a:xfrm>
+          <a:off x="0" y="0"/>
+          <a:ext cx="0" cy="0"/>
+          <a:chOff x="0" y="0"/>
+          <a:chExt cx="0" cy="0"/>
+        </a:xfrm>
+      </p:grpSpPr>
+      <p:sp>
+        <p:nvSpPr>
+          <p:cNvPr id="4" name="Titre 3"/>
+          <p:cNvSpPr>
+            <a:spLocks noGrp="1"/>
+          </p:cNvSpPr>
+          <p:nvPr>
+            <p:ph type="title"/>
+          </p:nvPr>
+        </p:nvSpPr>
+        <p:spPr>
+          <a:xfrm>
+            <a:off x="213122" y="339924"/>
+            <a:ext cx="8714184" cy="301621"/>
+          </a:xfrm>
+        </p:spPr>
+        <p:txBody>
+          <a:bodyPr/>
+          <a:lstStyle/>
+          <a:p>
+            <a:r>
+              <a:rPr lang="fr-FR" sz="2000" dirty="0" smtClean="0"/>
               <a:t>Rapport de TEST</a:t>
+            </a:r>
+            <a:endParaRPr lang="fr-FR" sz="2000" dirty="0"/>
+          </a:p>
+        </p:txBody>
+      </p:sp>
+      <p:pic>
+        <p:nvPicPr>
+          <p:cNvPr id="1027" name="Picture 3" descr="C:\Utilisateurs\A762211\Desktop\PackagesCoverage.JPG"/>
+          <p:cNvPicPr>
+            <a:picLocks noChangeAspect="1" noChangeArrowheads="1"/>
+          </p:cNvPicPr>
+          <p:nvPr/>
+        </p:nvPicPr>
+        <p:blipFill>
+          <a:blip r:embed="rId2">
+            <a:extLst>
+              <a:ext uri="{28A0092B-C50C-407E-A947-70E740481C1C}">
+                <a14:useLocalDpi xmlns:a14="http://schemas.microsoft.com/office/drawing/2010/main" val="0"/>
+              </a:ext>
+            </a:extLst>
+          </a:blip>
+          <a:srcRect/>
+          <a:stretch>
+            <a:fillRect/>
+          </a:stretch>
+        </p:blipFill>
+        <p:spPr bwMode="auto">
+          <a:xfrm>
+            <a:off x="216435" y="3635640"/>
+            <a:ext cx="5964306" cy="1038225"/>
+          </a:xfrm>
+          <a:prstGeom prst="rect">
+            <a:avLst/>
+          </a:prstGeom>
+          <a:noFill/>
+          <a:extLst>
+            <a:ext uri="{909E8E84-426E-40DD-AFC4-6F175D3DCCD1}">
+              <a14:hiddenFill xmlns:a14="http://schemas.microsoft.com/office/drawing/2010/main">
+                <a:solidFill>
+                  <a:srgbClr val="FFFFFF"/>
+                </a:solidFill>
+              </a14:hiddenFill>
+            </a:ext>
+          </a:extLst>
+        </p:spPr>
+      </p:pic>
+      <p:pic>
+        <p:nvPicPr>
+          <p:cNvPr id="1028" name="Picture 4" descr="C:\Utilisateurs\A762211\Desktop\ProjetCoverage.JPG"/>
+          <p:cNvPicPr>
+            <a:picLocks noChangeAspect="1" noChangeArrowheads="1"/>
+          </p:cNvPicPr>
+          <p:nvPr/>
+        </p:nvPicPr>
+        <p:blipFill>
+          <a:blip r:embed="rId3">
+            <a:extLst>
+              <a:ext uri="{28A0092B-C50C-407E-A947-70E740481C1C}">
+                <a14:useLocalDpi xmlns:a14="http://schemas.microsoft.com/office/drawing/2010/main" val="0"/>
+              </a:ext>
+            </a:extLst>
+          </a:blip>
+          <a:srcRect/>
+          <a:stretch>
+            <a:fillRect/>
+          </a:stretch>
+        </p:blipFill>
+        <p:spPr bwMode="auto">
+          <a:xfrm>
+            <a:off x="216435" y="2978680"/>
+            <a:ext cx="5964306" cy="466725"/>
+          </a:xfrm>
+          <a:prstGeom prst="rect">
+            <a:avLst/>
+          </a:prstGeom>
+          <a:noFill/>
+          <a:extLst>
+            <a:ext uri="{909E8E84-426E-40DD-AFC4-6F175D3DCCD1}">
+              <a14:hiddenFill xmlns:a14="http://schemas.microsoft.com/office/drawing/2010/main">
+                <a:solidFill>
+                  <a:srgbClr val="FFFFFF"/>
+                </a:solidFill>
+              </a14:hiddenFill>
+            </a:ext>
+          </a:extLst>
+        </p:spPr>
+      </p:pic>
+      <p:sp>
+        <p:nvSpPr>
+          <p:cNvPr id="6" name="Titre 3"/>
+          <p:cNvSpPr txBox="1">
+            <a:spLocks/>
+          </p:cNvSpPr>
+          <p:nvPr/>
+        </p:nvSpPr>
+        <p:spPr bwMode="gray">
+          <a:xfrm>
+            <a:off x="216435" y="2580212"/>
+            <a:ext cx="8714184" cy="301621"/>
+          </a:xfrm>
+          <a:prstGeom prst="rect">
+            <a:avLst/>
+          </a:prstGeom>
+          <a:noFill/>
+        </p:spPr>
+        <p:txBody>
+          <a:bodyPr vert="horz" wrap="square" lIns="0" tIns="0" rIns="0" bIns="0" rtlCol="0" anchor="ctr" anchorCtr="0">
+            <a:spAutoFit/>
+          </a:bodyPr>
+          <a:lstStyle>
+            <a:lvl1pPr algn="l" defTabSz="685800" rtl="0" eaLnBrk="1" latinLnBrk="0" hangingPunct="1">
+              <a:lnSpc>
+                <a:spcPct val="98000"/>
+              </a:lnSpc>
+              <a:spcBef>
+                <a:spcPct val="0"/>
+              </a:spcBef>
+              <a:buNone/>
+              <a:defRPr sz="2700" b="0" kern="1200" cap="all" baseline="0">
+                <a:solidFill>
+                  <a:schemeClr val="tx1"/>
+                </a:solidFill>
+                <a:latin typeface="Arial Black" panose="020B0A04020102020204" pitchFamily="34" charset="0"/>
+                <a:ea typeface="+mj-ea"/>
+                <a:cs typeface="+mj-cs"/>
+              </a:defRPr>
+            </a:lvl1pPr>
+          </a:lstStyle>
+          <a:p>
+            <a:pPr lvl="0"/>
+            <a:r>
+              <a:rPr lang="fr-FR" sz="2000" dirty="0" smtClean="0"/>
+              <a:t>Couverture de code</a:t>
             </a:r>
             <a:endParaRPr lang="fr-FR" sz="2000" dirty="0"/>
           </a:p>
@@ -2704,7 +3472,15 @@
             </a:r>
             <a:r>
               <a:rPr lang="fr-FR" dirty="0" smtClean="0"/>
-              <a:t>() appropriée à notre besoin.</a:t>
+              <a:t>() appropriée à notre besoin</a:t>
+            </a:r>
+            <a:r>
+              <a:rPr lang="fr-FR" dirty="0"/>
+              <a:t>. &lt;&lt;Erreur #</a:t>
+            </a:r>
+            <a:r>
+              <a:rPr lang="fr-FR" dirty="0" smtClean="0"/>
+              <a:t>01&gt;&gt;</a:t>
             </a:r>
             <a:endParaRPr lang="fr-FR" dirty="0"/>
           </a:p>
@@ -2732,11 +3508,7 @@
           <a:p>
             <a:r>
               <a:rPr lang="fr-FR" sz="2000" dirty="0" smtClean="0"/>
-              <a:t>écriture comptable : </a:t>
-            </a:r>
-            <a:r>
-              <a:rPr lang="fr-FR" sz="2000" dirty="0" smtClean="0"/>
-              <a:t>équilibré</a:t>
+              <a:t>écriture comptable : équilibré</a:t>
             </a:r>
             <a:endParaRPr lang="fr-FR" sz="2000" dirty="0"/>
           </a:p>
@@ -3051,7 +3823,7 @@
         <p:spPr>
           <a:xfrm>
             <a:off x="4943856" y="1274063"/>
-            <a:ext cx="3084576" cy="415498"/>
+            <a:ext cx="3084576" cy="830997"/>
           </a:xfrm>
           <a:prstGeom prst="rect">
             <a:avLst/>
@@ -3089,9 +3861,31 @@
               <a:t>toString</a:t>
             </a:r>
             <a:r>
+              <a:rPr lang="fr-FR" dirty="0"/>
+              <a:t>)</a:t>
+            </a:r>
+            <a:br>
+              <a:rPr lang="fr-FR" dirty="0"/>
+            </a:br>
+            <a:r>
+              <a:rPr lang="fr-FR" dirty="0"/>
+              <a:t> </a:t>
+            </a:r>
+            <a:r>
               <a:rPr lang="fr-FR" dirty="0" smtClean="0"/>
-              <a:t>)</a:t>
-            </a:r>
+              <a:t>&lt;&lt;Erreur </a:t>
+            </a:r>
+            <a:r>
+              <a:rPr lang="fr-FR" dirty="0"/>
+              <a:t>#</a:t>
+            </a:r>
+            <a:r>
+              <a:rPr lang="fr-FR" dirty="0" smtClean="0"/>
+              <a:t>02&gt;&gt;</a:t>
+            </a:r>
+            <a:endParaRPr lang="fr-FR" dirty="0"/>
+          </a:p>
+          <a:p>
             <a:endParaRPr lang="fr-FR" dirty="0"/>
           </a:p>
         </p:txBody>
@@ -3850,7 +4644,7 @@
         <p:spPr>
           <a:xfrm>
             <a:off x="4297680" y="1151380"/>
-            <a:ext cx="3279648" cy="207749"/>
+            <a:ext cx="3279648" cy="623248"/>
           </a:xfrm>
           <a:prstGeom prst="rect">
             <a:avLst/>
@@ -3871,6 +4665,17 @@
               <a:rPr lang="fr-FR" dirty="0" err="1" smtClean="0"/>
               <a:t>getTotalCredit</a:t>
             </a:r>
+            <a:r>
+              <a:rPr lang="fr-FR" dirty="0"/>
+              <a:t> &lt;&lt;Erreur #</a:t>
+            </a:r>
+            <a:r>
+              <a:rPr lang="fr-FR" dirty="0" smtClean="0"/>
+              <a:t>03&gt;&gt;</a:t>
+            </a:r>
+            <a:endParaRPr lang="fr-FR" dirty="0"/>
+          </a:p>
+          <a:p>
             <a:endParaRPr lang="fr-FR" dirty="0"/>
           </a:p>
         </p:txBody>
@@ -4112,7 +4917,7 @@
         </p:blipFill>
         <p:spPr bwMode="auto">
           <a:xfrm>
-            <a:off x="256328" y="3753765"/>
+            <a:off x="256328" y="3972303"/>
             <a:ext cx="3768692" cy="465102"/>
           </a:xfrm>
           <a:prstGeom prst="rect">
@@ -4152,7 +4957,7 @@
         <p:spPr>
           <a:xfrm>
             <a:off x="256328" y="3349055"/>
-            <a:ext cx="8701060" cy="207749"/>
+            <a:ext cx="8701060" cy="623248"/>
           </a:xfrm>
           <a:prstGeom prst="rect">
             <a:avLst/>
@@ -4178,9 +4983,23 @@
               <a:t>-model</a:t>
             </a:r>
             <a:r>
+              <a:rPr lang="fr-FR" dirty="0"/>
+              <a:t>)</a:t>
+            </a:r>
+            <a:br>
+              <a:rPr lang="fr-FR" dirty="0"/>
+            </a:br>
+            <a:r>
+              <a:rPr lang="fr-FR" dirty="0"/>
+              <a:t>&lt;&lt;Erreur #</a:t>
+            </a:r>
+            <a:r>
               <a:rPr lang="fr-FR" dirty="0" smtClean="0"/>
-              <a:t>)</a:t>
-            </a:r>
+              <a:t>04&gt;&gt;</a:t>
+            </a:r>
+            <a:endParaRPr lang="fr-FR" dirty="0"/>
+          </a:p>
+          <a:p>
             <a:endParaRPr lang="fr-FR" dirty="0"/>
           </a:p>
         </p:txBody>
@@ -4259,7 +5078,7 @@
         <p:spPr>
           <a:xfrm>
             <a:off x="256328" y="889516"/>
-            <a:ext cx="5399315" cy="207749"/>
+            <a:ext cx="8643832" cy="415498"/>
           </a:xfrm>
           <a:prstGeom prst="rect">
             <a:avLst/>
@@ -4285,9 +5104,16 @@
               <a:t>-business</a:t>
             </a:r>
             <a:r>
+              <a:rPr lang="fr-FR" dirty="0"/>
+              <a:t>) &lt;&lt;Erreur #</a:t>
+            </a:r>
+            <a:r>
               <a:rPr lang="fr-FR" dirty="0" smtClean="0"/>
-              <a:t>)</a:t>
-            </a:r>
+              <a:t>05&gt;&gt;</a:t>
+            </a:r>
+            <a:endParaRPr lang="fr-FR" dirty="0"/>
+          </a:p>
+          <a:p>
             <a:endParaRPr lang="fr-FR" dirty="0"/>
           </a:p>
         </p:txBody>
@@ -4355,7 +5181,7 @@
         <p:spPr>
           <a:xfrm>
             <a:off x="256328" y="2816352"/>
-            <a:ext cx="6632152" cy="207749"/>
+            <a:ext cx="8515816" cy="415498"/>
           </a:xfrm>
           <a:prstGeom prst="rect">
             <a:avLst/>
@@ -4389,9 +5215,16 @@
               <a:t>-consumer</a:t>
             </a:r>
             <a:r>
+              <a:rPr lang="fr-FR" dirty="0"/>
+              <a:t>) &lt;&lt;Erreur #</a:t>
+            </a:r>
+            <a:r>
               <a:rPr lang="fr-FR" dirty="0" smtClean="0"/>
-              <a:t>)</a:t>
-            </a:r>
+              <a:t>06&gt;&gt;</a:t>
+            </a:r>
+            <a:endParaRPr lang="fr-FR" dirty="0"/>
+          </a:p>
+          <a:p>
             <a:endParaRPr lang="fr-FR" dirty="0"/>
           </a:p>
         </p:txBody>
@@ -4508,24 +5341,12 @@
           <a:lstStyle/>
           <a:p>
             <a:r>
+              <a:rPr lang="fr-FR" sz="2000" dirty="0" err="1" smtClean="0"/>
+              <a:t>Todo</a:t>
+            </a:r>
+            <a:r>
               <a:rPr lang="fr-FR" sz="2000" dirty="0" smtClean="0"/>
-              <a:t>Mise en </a:t>
-            </a:r>
-            <a:r>
-              <a:rPr lang="fr-FR" sz="2000" dirty="0" err="1" smtClean="0"/>
-              <a:t>plAce</a:t>
-            </a:r>
-            <a:r>
-              <a:rPr lang="fr-FR" sz="2000" dirty="0" smtClean="0"/>
-              <a:t> de </a:t>
-            </a:r>
-            <a:r>
-              <a:rPr lang="fr-FR" sz="2000" dirty="0" err="1" smtClean="0"/>
-              <a:t>testS</a:t>
-            </a:r>
-            <a:r>
-              <a:rPr lang="fr-FR" sz="2000" dirty="0" smtClean="0"/>
-              <a:t> UNITAIRES</a:t>
+              <a:t> &amp; BUGS</a:t>
             </a:r>
             <a:endParaRPr lang="fr-FR" sz="2000" dirty="0"/>
           </a:p>
@@ -4539,8 +5360,8 @@
         </p:nvSpPr>
         <p:spPr>
           <a:xfrm>
-            <a:off x="207560" y="889516"/>
-            <a:ext cx="5399315" cy="415498"/>
+            <a:off x="256329" y="761983"/>
+            <a:ext cx="8643832" cy="415498"/>
           </a:xfrm>
           <a:prstGeom prst="rect">
             <a:avLst/>
@@ -4553,121 +5374,81 @@
           </a:bodyPr>
           <a:lstStyle/>
           <a:p>
-            <a:pPr marL="285750" indent="-285750">
-              <a:buFont typeface="Wingdings" panose="05000000000000000000" pitchFamily="2" charset="2"/>
-              <a:buChar char="Ø"/>
-            </a:pPr>
-            <a:r>
-              <a:rPr lang="fr-FR" b="1" i="1" dirty="0" err="1" smtClean="0"/>
-              <a:t>myerp</a:t>
-            </a:r>
-            <a:r>
-              <a:rPr lang="fr-FR" b="1" i="1" dirty="0" smtClean="0"/>
-              <a:t>-business, </a:t>
-            </a:r>
-            <a:r>
-              <a:rPr lang="fr-FR" b="1" i="1" dirty="0" err="1" smtClean="0"/>
-              <a:t>myerp</a:t>
-            </a:r>
-            <a:r>
-              <a:rPr lang="fr-FR" b="1" i="1" dirty="0" smtClean="0"/>
-              <a:t>-consumer, </a:t>
-            </a:r>
-            <a:r>
-              <a:rPr lang="fr-FR" b="1" i="1" dirty="0" err="1" smtClean="0"/>
-              <a:t>myerp</a:t>
-            </a:r>
-            <a:r>
-              <a:rPr lang="fr-FR" b="1" i="1" dirty="0" smtClean="0"/>
-              <a:t>-model, </a:t>
-            </a:r>
-            <a:r>
-              <a:rPr lang="fr-FR" b="1" i="1" dirty="0" err="1" smtClean="0"/>
-              <a:t>myerp-technical</a:t>
+            <a:r>
+              <a:rPr lang="fr-FR" dirty="0" smtClean="0"/>
+              <a:t>TODO traités :</a:t>
             </a:r>
             <a:endParaRPr lang="fr-FR" dirty="0"/>
           </a:p>
-        </p:txBody>
-      </p:sp>
-      <p:sp>
-        <p:nvSpPr>
-          <p:cNvPr id="7" name="Titre 3"/>
-          <p:cNvSpPr txBox="1">
-            <a:spLocks/>
-          </p:cNvSpPr>
+          <a:p>
+            <a:endParaRPr lang="fr-FR" dirty="0"/>
+          </a:p>
+        </p:txBody>
+      </p:sp>
+      <p:pic>
+        <p:nvPicPr>
+          <p:cNvPr id="2050" name="Picture 2"/>
+          <p:cNvPicPr>
+            <a:picLocks noChangeAspect="1" noChangeArrowheads="1"/>
+          </p:cNvPicPr>
           <p:nvPr/>
-        </p:nvSpPr>
-        <p:spPr bwMode="gray">
-          <a:xfrm>
-            <a:off x="256328" y="1510493"/>
-            <a:ext cx="8714184" cy="301621"/>
+        </p:nvPicPr>
+        <p:blipFill>
+          <a:blip r:embed="rId2">
+            <a:extLst>
+              <a:ext uri="{28A0092B-C50C-407E-A947-70E740481C1C}">
+                <a14:useLocalDpi xmlns:a14="http://schemas.microsoft.com/office/drawing/2010/main" val="0"/>
+              </a:ext>
+            </a:extLst>
+          </a:blip>
+          <a:srcRect/>
+          <a:stretch>
+            <a:fillRect/>
+          </a:stretch>
+        </p:blipFill>
+        <p:spPr bwMode="auto">
+          <a:xfrm>
+            <a:off x="256329" y="1079945"/>
+            <a:ext cx="3943816" cy="1476257"/>
           </a:xfrm>
           <a:prstGeom prst="rect">
             <a:avLst/>
           </a:prstGeom>
           <a:noFill/>
-        </p:spPr>
-        <p:txBody>
-          <a:bodyPr vert="horz" wrap="square" lIns="0" tIns="0" rIns="0" bIns="0" rtlCol="0" anchor="ctr" anchorCtr="0">
-            <a:spAutoFit/>
-          </a:bodyPr>
-          <a:lstStyle>
-            <a:lvl1pPr algn="l" defTabSz="685800" rtl="0" eaLnBrk="1" latinLnBrk="0" hangingPunct="1">
-              <a:lnSpc>
-                <a:spcPct val="98000"/>
-              </a:lnSpc>
-              <a:spcBef>
-                <a:spcPct val="0"/>
-              </a:spcBef>
-              <a:buNone/>
-              <a:defRPr sz="2700" b="0" kern="1200" cap="all" baseline="0">
+          <a:ln>
+            <a:noFill/>
+          </a:ln>
+          <a:extLst>
+            <a:ext uri="{909E8E84-426E-40DD-AFC4-6F175D3DCCD1}">
+              <a14:hiddenFill xmlns:a14="http://schemas.microsoft.com/office/drawing/2010/main">
+                <a:solidFill>
+                  <a:schemeClr val="accent1"/>
+                </a:solidFill>
+              </a14:hiddenFill>
+            </a:ext>
+            <a:ext uri="{91240B29-F687-4F45-9708-019B960494DF}">
+              <a14:hiddenLine xmlns:a14="http://schemas.microsoft.com/office/drawing/2010/main" w="9525">
                 <a:solidFill>
                   <a:schemeClr val="tx1"/>
                 </a:solidFill>
-                <a:latin typeface="Arial Black" panose="020B0A04020102020204" pitchFamily="34" charset="0"/>
-                <a:ea typeface="+mj-ea"/>
-                <a:cs typeface="+mj-cs"/>
-              </a:defRPr>
-            </a:lvl1pPr>
-          </a:lstStyle>
-          <a:p>
-            <a:pPr lvl="0"/>
-            <a:r>
-              <a:rPr lang="fr-FR" sz="2000" dirty="0" smtClean="0"/>
-              <a:t>Mise en </a:t>
-            </a:r>
-            <a:r>
-              <a:rPr lang="fr-FR" sz="2000" dirty="0" err="1" smtClean="0"/>
-              <a:t>plAce</a:t>
-            </a:r>
-            <a:r>
-              <a:rPr lang="fr-FR" sz="2000" dirty="0" smtClean="0"/>
-              <a:t> de </a:t>
-            </a:r>
-            <a:r>
-              <a:rPr lang="fr-FR" sz="2000" dirty="0" err="1" smtClean="0"/>
-              <a:t>testS</a:t>
-            </a:r>
-            <a:r>
-              <a:rPr lang="fr-FR" sz="2000" dirty="0" smtClean="0"/>
-              <a:t> D’intégration</a:t>
-            </a:r>
-            <a:endParaRPr lang="fr-FR" sz="2000" dirty="0"/>
-          </a:p>
-        </p:txBody>
-      </p:sp>
-      <p:sp>
-        <p:nvSpPr>
-          <p:cNvPr id="8" name="Titre 3"/>
-          <p:cNvSpPr txBox="1">
-            <a:spLocks/>
-          </p:cNvSpPr>
+                <a:miter lim="800000"/>
+                <a:headEnd/>
+                <a:tailEnd/>
+              </a14:hiddenLine>
+            </a:ext>
+          </a:extLst>
+        </p:spPr>
+      </p:pic>
+      <p:sp>
+        <p:nvSpPr>
+          <p:cNvPr id="8" name="ZoneTexte 7"/>
+          <p:cNvSpPr txBox="1"/>
           <p:nvPr/>
         </p:nvSpPr>
-        <p:spPr bwMode="gray">
-          <a:xfrm>
-            <a:off x="256328" y="2820996"/>
-            <a:ext cx="8714184" cy="301621"/>
+        <p:spPr>
+          <a:xfrm>
+            <a:off x="256329" y="2834140"/>
+            <a:ext cx="8643832" cy="1869743"/>
           </a:xfrm>
           <a:prstGeom prst="rect">
             <a:avLst/>
@@ -4675,268 +5456,80 @@
           <a:noFill/>
         </p:spPr>
         <p:txBody>
-          <a:bodyPr vert="horz" wrap="square" lIns="0" tIns="0" rIns="0" bIns="0" rtlCol="0" anchor="ctr" anchorCtr="0">
-            <a:spAutoFit/>
-          </a:bodyPr>
-          <a:lstStyle>
-            <a:lvl1pPr algn="l" defTabSz="685800" rtl="0" eaLnBrk="1" latinLnBrk="0" hangingPunct="1">
-              <a:lnSpc>
-                <a:spcPct val="98000"/>
-              </a:lnSpc>
-              <a:spcBef>
-                <a:spcPct val="0"/>
-              </a:spcBef>
-              <a:buNone/>
-              <a:defRPr sz="2700" b="0" kern="1200" cap="all" baseline="0">
-                <a:solidFill>
-                  <a:schemeClr val="tx1"/>
-                </a:solidFill>
-                <a:latin typeface="Arial Black" panose="020B0A04020102020204" pitchFamily="34" charset="0"/>
-                <a:ea typeface="+mj-ea"/>
-                <a:cs typeface="+mj-cs"/>
-              </a:defRPr>
-            </a:lvl1pPr>
-          </a:lstStyle>
-          <a:p>
-            <a:pPr lvl="0"/>
-            <a:r>
-              <a:rPr lang="fr-FR" sz="2000" dirty="0" smtClean="0"/>
-              <a:t>Mise en </a:t>
-            </a:r>
-            <a:r>
-              <a:rPr lang="fr-FR" sz="2000" dirty="0" err="1" smtClean="0"/>
-              <a:t>plAce</a:t>
-            </a:r>
-            <a:r>
-              <a:rPr lang="fr-FR" sz="2000" dirty="0" smtClean="0"/>
-              <a:t> d’un OUTIL d’intégration continue</a:t>
-            </a:r>
-            <a:endParaRPr lang="fr-FR" sz="2000" dirty="0"/>
-          </a:p>
-        </p:txBody>
-      </p:sp>
-      <p:sp>
-        <p:nvSpPr>
-          <p:cNvPr id="9" name="Titre 3"/>
-          <p:cNvSpPr txBox="1">
-            <a:spLocks/>
-          </p:cNvSpPr>
-          <p:nvPr/>
-        </p:nvSpPr>
-        <p:spPr bwMode="gray">
-          <a:xfrm>
-            <a:off x="256328" y="3717245"/>
-            <a:ext cx="8714184" cy="301621"/>
-          </a:xfrm>
-          <a:prstGeom prst="rect">
-            <a:avLst/>
-          </a:prstGeom>
-          <a:noFill/>
-        </p:spPr>
-        <p:txBody>
-          <a:bodyPr vert="horz" wrap="square" lIns="0" tIns="0" rIns="0" bIns="0" rtlCol="0" anchor="ctr" anchorCtr="0">
-            <a:spAutoFit/>
-          </a:bodyPr>
-          <a:lstStyle>
-            <a:lvl1pPr algn="l" defTabSz="685800" rtl="0" eaLnBrk="1" latinLnBrk="0" hangingPunct="1">
-              <a:lnSpc>
-                <a:spcPct val="98000"/>
-              </a:lnSpc>
-              <a:spcBef>
-                <a:spcPct val="0"/>
-              </a:spcBef>
-              <a:buNone/>
-              <a:defRPr sz="2700" b="0" kern="1200" cap="all" baseline="0">
-                <a:solidFill>
-                  <a:schemeClr val="tx1"/>
-                </a:solidFill>
-                <a:latin typeface="Arial Black" panose="020B0A04020102020204" pitchFamily="34" charset="0"/>
-                <a:ea typeface="+mj-ea"/>
-                <a:cs typeface="+mj-cs"/>
-              </a:defRPr>
-            </a:lvl1pPr>
-          </a:lstStyle>
-          <a:p>
-            <a:pPr lvl="0"/>
-            <a:r>
-              <a:rPr lang="fr-FR" sz="2000" dirty="0" smtClean="0"/>
-              <a:t>Mise en </a:t>
-            </a:r>
-            <a:r>
-              <a:rPr lang="fr-FR" sz="2000" dirty="0" err="1" smtClean="0"/>
-              <a:t>plAce</a:t>
-            </a:r>
-            <a:r>
-              <a:rPr lang="fr-FR" sz="2000" dirty="0" smtClean="0"/>
-              <a:t> de RAPPORTS de </a:t>
-            </a:r>
-            <a:r>
-              <a:rPr lang="fr-FR" sz="2000" dirty="0" err="1" smtClean="0"/>
-              <a:t>testS</a:t>
-            </a:r>
-            <a:endParaRPr lang="fr-FR" sz="2000" dirty="0"/>
-          </a:p>
-        </p:txBody>
-      </p:sp>
-      <p:sp>
-        <p:nvSpPr>
-          <p:cNvPr id="10" name="ZoneTexte 9"/>
-          <p:cNvSpPr txBox="1"/>
-          <p:nvPr/>
-        </p:nvSpPr>
-        <p:spPr>
-          <a:xfrm>
-            <a:off x="256328" y="1938028"/>
-            <a:ext cx="5399315" cy="623248"/>
-          </a:xfrm>
-          <a:prstGeom prst="rect">
-            <a:avLst/>
-          </a:prstGeom>
-          <a:noFill/>
-        </p:spPr>
-        <p:txBody>
           <a:bodyPr wrap="square" lIns="0" tIns="0" rIns="0" bIns="0" rtlCol="0">
             <a:spAutoFit/>
           </a:bodyPr>
           <a:lstStyle/>
           <a:p>
             <a:r>
-              <a:rPr lang="fr-FR" b="1" i="1" dirty="0" smtClean="0"/>
-              <a:t>Cas nominaux et cas d’</a:t>
-            </a:r>
-            <a:r>
-              <a:rPr lang="fr-FR" b="1" i="1" dirty="0" err="1" smtClean="0"/>
-              <a:t>érreur</a:t>
-            </a:r>
-            <a:endParaRPr lang="fr-FR" b="1" i="1" dirty="0" smtClean="0"/>
+              <a:rPr lang="fr-FR" dirty="0" smtClean="0"/>
+              <a:t>ERREURS traités :</a:t>
+            </a:r>
           </a:p>
           <a:p>
             <a:pPr marL="285750" indent="-285750">
               <a:buFont typeface="Wingdings" panose="05000000000000000000" pitchFamily="2" charset="2"/>
-              <a:buChar char="Ø"/>
+              <a:buChar char="ü"/>
             </a:pPr>
             <a:r>
-              <a:rPr lang="fr-FR" b="1" i="1" dirty="0" err="1" smtClean="0"/>
-              <a:t>myerp</a:t>
-            </a:r>
-            <a:r>
-              <a:rPr lang="fr-FR" b="1" i="1" dirty="0" smtClean="0"/>
-              <a:t>-business : </a:t>
-            </a:r>
-            <a:r>
-              <a:rPr lang="fr-FR" b="1" i="1" dirty="0" err="1" smtClean="0"/>
-              <a:t>BusinessIT</a:t>
-            </a:r>
-            <a:endParaRPr lang="fr-FR" b="1" i="1" dirty="0" smtClean="0"/>
+              <a:rPr lang="fr-FR" dirty="0" smtClean="0"/>
+              <a:t>1</a:t>
+            </a:r>
           </a:p>
           <a:p>
             <a:pPr marL="285750" indent="-285750">
               <a:buFont typeface="Wingdings" panose="05000000000000000000" pitchFamily="2" charset="2"/>
-              <a:buChar char="Ø"/>
+              <a:buChar char="ü"/>
             </a:pPr>
             <a:r>
-              <a:rPr lang="fr-FR" b="1" i="1" dirty="0" err="1" smtClean="0"/>
-              <a:t>myerp</a:t>
-            </a:r>
-            <a:r>
-              <a:rPr lang="fr-FR" b="1" i="1" dirty="0" smtClean="0"/>
-              <a:t>-consumer : </a:t>
-            </a:r>
-            <a:r>
-              <a:rPr lang="fr-FR" b="1" i="1" dirty="0" err="1" smtClean="0"/>
-              <a:t>ConsumerIT</a:t>
-            </a:r>
+              <a:rPr lang="fr-FR" dirty="0" smtClean="0"/>
+              <a:t>2</a:t>
+            </a:r>
+          </a:p>
+          <a:p>
+            <a:pPr marL="285750" indent="-285750">
+              <a:buFont typeface="Wingdings" panose="05000000000000000000" pitchFamily="2" charset="2"/>
+              <a:buChar char="ü"/>
+            </a:pPr>
+            <a:r>
+              <a:rPr lang="fr-FR" dirty="0" smtClean="0"/>
+              <a:t>3</a:t>
+            </a:r>
+          </a:p>
+          <a:p>
+            <a:pPr marL="285750" indent="-285750">
+              <a:buFont typeface="Wingdings" panose="05000000000000000000" pitchFamily="2" charset="2"/>
+              <a:buChar char="ü"/>
+            </a:pPr>
+            <a:r>
+              <a:rPr lang="fr-FR" dirty="0" smtClean="0"/>
+              <a:t>4</a:t>
+            </a:r>
+          </a:p>
+          <a:p>
+            <a:pPr marL="285750" indent="-285750">
+              <a:buFont typeface="Wingdings" panose="05000000000000000000" pitchFamily="2" charset="2"/>
+              <a:buChar char="ü"/>
+            </a:pPr>
+            <a:r>
+              <a:rPr lang="fr-FR" dirty="0" smtClean="0"/>
+              <a:t>5</a:t>
+            </a:r>
+          </a:p>
+          <a:p>
+            <a:pPr marL="285750" indent="-285750">
+              <a:buFont typeface="Wingdings" panose="05000000000000000000" pitchFamily="2" charset="2"/>
+              <a:buChar char="ü"/>
+            </a:pPr>
+            <a:r>
+              <a:rPr lang="fr-FR" dirty="0" smtClean="0"/>
+              <a:t>6</a:t>
+            </a:r>
+          </a:p>
+          <a:p>
             <a:endParaRPr lang="fr-FR" dirty="0"/>
           </a:p>
-        </p:txBody>
-      </p:sp>
-      <p:sp>
-        <p:nvSpPr>
-          <p:cNvPr id="5" name="ZoneTexte 4"/>
-          <p:cNvSpPr txBox="1"/>
-          <p:nvPr/>
-        </p:nvSpPr>
-        <p:spPr>
-          <a:xfrm>
-            <a:off x="256328" y="3255263"/>
-            <a:ext cx="5126736" cy="207749"/>
-          </a:xfrm>
-          <a:prstGeom prst="rect">
-            <a:avLst/>
-          </a:prstGeom>
-          <a:noFill/>
-        </p:spPr>
-        <p:txBody>
-          <a:bodyPr wrap="square" lIns="0" tIns="0" rIns="0" bIns="0" rtlCol="0">
-            <a:spAutoFit/>
-          </a:bodyPr>
-          <a:lstStyle/>
-          <a:p>
-            <a:r>
-              <a:rPr lang="fr-FR" dirty="0" smtClean="0"/>
-              <a:t>Lancement des tests à partir d’un push sur </a:t>
-            </a:r>
-            <a:r>
-              <a:rPr lang="fr-FR" dirty="0" err="1" smtClean="0"/>
-              <a:t>github</a:t>
-            </a:r>
-            <a:r>
-              <a:rPr lang="fr-FR" dirty="0" smtClean="0"/>
-              <a:t> via </a:t>
-            </a:r>
-            <a:r>
-              <a:rPr lang="fr-FR" dirty="0" err="1" smtClean="0"/>
-              <a:t>Travis</a:t>
-            </a:r>
-            <a:r>
-              <a:rPr lang="fr-FR" dirty="0" smtClean="0"/>
-              <a:t>-CI</a:t>
-            </a:r>
-            <a:endParaRPr lang="fr-FR" dirty="0"/>
-          </a:p>
-        </p:txBody>
-      </p:sp>
-      <p:sp>
-        <p:nvSpPr>
-          <p:cNvPr id="6" name="ZoneTexte 5"/>
-          <p:cNvSpPr txBox="1"/>
-          <p:nvPr/>
-        </p:nvSpPr>
-        <p:spPr>
-          <a:xfrm>
-            <a:off x="256328" y="4181613"/>
-            <a:ext cx="7815072" cy="415498"/>
-          </a:xfrm>
-          <a:prstGeom prst="rect">
-            <a:avLst/>
-          </a:prstGeom>
-          <a:noFill/>
-        </p:spPr>
-        <p:txBody>
-          <a:bodyPr wrap="square" lIns="0" tIns="0" rIns="0" bIns="0" rtlCol="0">
-            <a:spAutoFit/>
-          </a:bodyPr>
-          <a:lstStyle/>
-          <a:p>
-            <a:r>
-              <a:rPr lang="fr-FR" dirty="0" smtClean="0"/>
-              <a:t>Génération d’un rapport de tests sur la couverture et la qualité de code via </a:t>
-            </a:r>
-            <a:r>
-              <a:rPr lang="fr-FR" dirty="0" err="1" smtClean="0"/>
-              <a:t>SonarCloud</a:t>
-            </a:r>
-            <a:r>
-              <a:rPr lang="fr-FR" dirty="0"/>
-              <a:t> </a:t>
-            </a:r>
-            <a:br>
-              <a:rPr lang="fr-FR" dirty="0"/>
-            </a:br>
-            <a:r>
-              <a:rPr lang="fr-FR" dirty="0"/>
-              <a:t>https://sonarcloud.io/dashboard?id=rvallet_ocp9-projetB4</a:t>
-            </a:r>
+          <a:p>
             <a:endParaRPr lang="fr-FR" dirty="0"/>
           </a:p>
         </p:txBody>
@@ -4944,7 +5537,7 @@
     </p:spTree>
     <p:extLst>
       <p:ext uri="{BB962C8B-B14F-4D97-AF65-F5344CB8AC3E}">
-        <p14:creationId xmlns:p14="http://schemas.microsoft.com/office/powerpoint/2010/main" val="2253049589"/>
+        <p14:creationId xmlns:p14="http://schemas.microsoft.com/office/powerpoint/2010/main" val="3909974680"/>
       </p:ext>
     </p:extLst>
   </p:cSld>
@@ -5278,7 +5871,7 @@
   </a:custClrLst>
   <a:extLst>
     <a:ext uri="{05A4C25C-085E-4340-85A3-A5531E510DB2}">
-      <thm15:themeFamily xmlns:thm15="http://schemas.microsoft.com/office/thememl/2012/main" xmlns="" name="Blank.potx" id="{D8CCFB3A-CA66-4E30-A885-EFBD64A1E9D9}" vid="{BF2D768E-DF08-4D64-BCAB-8216E154572B}"/>
+      <thm15:themeFamily xmlns="" xmlns:thm15="http://schemas.microsoft.com/office/thememl/2012/main" name="Blank.potx" id="{D8CCFB3A-CA66-4E30-A885-EFBD64A1E9D9}" vid="{BF2D768E-DF08-4D64-BCAB-8216E154572B}"/>
     </a:ext>
   </a:extLst>
 </a:theme>
@@ -5867,6 +6460,54 @@
 </file>
 
 <file path=customXml/itemProps1.xml><?xml version="1.0" encoding="utf-8"?>
+<ds:datastoreItem xmlns:ds="http://schemas.openxmlformats.org/officeDocument/2006/customXml" ds:itemID="{272EBBDC-D360-4348-913A-50BDC586F769}">
+  <ds:schemaRefs>
+    <ds:schemaRef ds:uri="http://www.joulesunlimited.com/juid"/>
+  </ds:schemaRefs>
+</ds:datastoreItem>
+</file>
+
+<file path=customXml/itemProps10.xml><?xml version="1.0" encoding="utf-8"?>
+<ds:datastoreItem xmlns:ds="http://schemas.openxmlformats.org/officeDocument/2006/customXml" ds:itemID="{12A90D42-96F5-4AA3-8B57-0B593BA25485}">
+  <ds:schemaRefs>
+    <ds:schemaRef ds:uri="http://www.joulesunlimited.com/juid"/>
+  </ds:schemaRefs>
+</ds:datastoreItem>
+</file>
+
+<file path=customXml/itemProps11.xml><?xml version="1.0" encoding="utf-8"?>
+<ds:datastoreItem xmlns:ds="http://schemas.openxmlformats.org/officeDocument/2006/customXml" ds:itemID="{8B6D617A-0FB1-4CA1-BA4C-BE06DE77381F}">
+  <ds:schemaRefs>
+    <ds:schemaRef ds:uri="http://www.joulesunlimited.com/juid"/>
+  </ds:schemaRefs>
+</ds:datastoreItem>
+</file>
+
+<file path=customXml/itemProps12.xml><?xml version="1.0" encoding="utf-8"?>
+<ds:datastoreItem xmlns:ds="http://schemas.openxmlformats.org/officeDocument/2006/customXml" ds:itemID="{13100955-99DD-4F1D-B284-562F25173232}">
+  <ds:schemaRefs>
+    <ds:schemaRef ds:uri="http://www.joulesunlimited.com/juid"/>
+  </ds:schemaRefs>
+</ds:datastoreItem>
+</file>
+
+<file path=customXml/itemProps13.xml><?xml version="1.0" encoding="utf-8"?>
+<ds:datastoreItem xmlns:ds="http://schemas.openxmlformats.org/officeDocument/2006/customXml" ds:itemID="{365D0148-12F0-478B-A755-985DA728D1A5}">
+  <ds:schemaRefs>
+    <ds:schemaRef ds:uri="http://www.joulesunlimited.com/juid"/>
+  </ds:schemaRefs>
+</ds:datastoreItem>
+</file>
+
+<file path=customXml/itemProps14.xml><?xml version="1.0" encoding="utf-8"?>
+<ds:datastoreItem xmlns:ds="http://schemas.openxmlformats.org/officeDocument/2006/customXml" ds:itemID="{5211BA7A-995F-4966-ADEE-20903C05C84B}">
+  <ds:schemaRefs>
+    <ds:schemaRef ds:uri="http://www.joulesunlimited.com/juid"/>
+  </ds:schemaRefs>
+</ds:datastoreItem>
+</file>
+
+<file path=customXml/itemProps15.xml><?xml version="1.0" encoding="utf-8"?>
 <ds:datastoreItem xmlns:ds="http://schemas.openxmlformats.org/officeDocument/2006/customXml" ds:itemID="{BA388501-9B54-4C94-A6D2-E2FCF940976D}">
   <ds:schemaRefs>
     <ds:schemaRef ds:uri="http://www.joulesunlimited.com/juid"/>
@@ -5874,7 +6515,79 @@
 </ds:datastoreItem>
 </file>
 
-<file path=customXml/itemProps10.xml><?xml version="1.0" encoding="utf-8"?>
+<file path=customXml/itemProps16.xml><?xml version="1.0" encoding="utf-8"?>
+<ds:datastoreItem xmlns:ds="http://schemas.openxmlformats.org/officeDocument/2006/customXml" ds:itemID="{7FFB0592-BE29-41E9-B07C-3E9066368DA2}">
+  <ds:schemaRefs>
+    <ds:schemaRef ds:uri="http://www.joulesunlimited.com/juid"/>
+  </ds:schemaRefs>
+</ds:datastoreItem>
+</file>
+
+<file path=customXml/itemProps17.xml><?xml version="1.0" encoding="utf-8"?>
+<ds:datastoreItem xmlns:ds="http://schemas.openxmlformats.org/officeDocument/2006/customXml" ds:itemID="{BF8CBE15-079F-4675-BF63-5D820EEC8C03}">
+  <ds:schemaRefs>
+    <ds:schemaRef ds:uri="http://www.joulesunlimited.com/juid"/>
+  </ds:schemaRefs>
+</ds:datastoreItem>
+</file>
+
+<file path=customXml/itemProps18.xml><?xml version="1.0" encoding="utf-8"?>
+<ds:datastoreItem xmlns:ds="http://schemas.openxmlformats.org/officeDocument/2006/customXml" ds:itemID="{C1699E6A-38C6-446F-9665-D4128549273D}">
+  <ds:schemaRefs>
+    <ds:schemaRef ds:uri="http://www.joulesunlimited.com/juid"/>
+  </ds:schemaRefs>
+</ds:datastoreItem>
+</file>
+
+<file path=customXml/itemProps19.xml><?xml version="1.0" encoding="utf-8"?>
+<ds:datastoreItem xmlns:ds="http://schemas.openxmlformats.org/officeDocument/2006/customXml" ds:itemID="{6F9F3F13-4916-4C3E-9C5A-30ECD36B9B9A}">
+  <ds:schemaRefs>
+    <ds:schemaRef ds:uri="http://www.joulesunlimited.com/juid"/>
+  </ds:schemaRefs>
+</ds:datastoreItem>
+</file>
+
+<file path=customXml/itemProps2.xml><?xml version="1.0" encoding="utf-8"?>
+<ds:datastoreItem xmlns:ds="http://schemas.openxmlformats.org/officeDocument/2006/customXml" ds:itemID="{0553E0E7-1207-467A-862E-153EF903819B}">
+  <ds:schemaRefs>
+    <ds:schemaRef ds:uri="http://www.joulesunlimited.com/juid"/>
+  </ds:schemaRefs>
+</ds:datastoreItem>
+</file>
+
+<file path=customXml/itemProps20.xml><?xml version="1.0" encoding="utf-8"?>
+<ds:datastoreItem xmlns:ds="http://schemas.openxmlformats.org/officeDocument/2006/customXml" ds:itemID="{4B36BCBD-AAD7-45FB-A384-6F9B19D98E94}">
+  <ds:schemaRefs>
+    <ds:schemaRef ds:uri="http://www.joulesunlimited.com/juid"/>
+  </ds:schemaRefs>
+</ds:datastoreItem>
+</file>
+
+<file path=customXml/itemProps21.xml><?xml version="1.0" encoding="utf-8"?>
+<ds:datastoreItem xmlns:ds="http://schemas.openxmlformats.org/officeDocument/2006/customXml" ds:itemID="{14822298-B9D8-4DDA-9A59-C2A813037319}">
+  <ds:schemaRefs>
+    <ds:schemaRef ds:uri="http://www.joulesunlimited.com/juid"/>
+  </ds:schemaRefs>
+</ds:datastoreItem>
+</file>
+
+<file path=customXml/itemProps22.xml><?xml version="1.0" encoding="utf-8"?>
+<ds:datastoreItem xmlns:ds="http://schemas.openxmlformats.org/officeDocument/2006/customXml" ds:itemID="{DB048453-F4DA-4209-B099-19684C39F0DB}">
+  <ds:schemaRefs>
+    <ds:schemaRef ds:uri="http://www.joulesunlimited.com/juid"/>
+  </ds:schemaRefs>
+</ds:datastoreItem>
+</file>
+
+<file path=customXml/itemProps23.xml><?xml version="1.0" encoding="utf-8"?>
+<ds:datastoreItem xmlns:ds="http://schemas.openxmlformats.org/officeDocument/2006/customXml" ds:itemID="{D5C1DE85-FEE5-4CD5-BEAB-32B31BACBCFE}">
+  <ds:schemaRefs>
+    <ds:schemaRef ds:uri="http://www.joulesunlimited.com/juid"/>
+  </ds:schemaRefs>
+</ds:datastoreItem>
+</file>
+
+<file path=customXml/itemProps24.xml><?xml version="1.0" encoding="utf-8"?>
 <ds:datastoreItem xmlns:ds="http://schemas.openxmlformats.org/officeDocument/2006/customXml" ds:itemID="{E5A43A96-145C-4051-B26F-63E30B16E14A}">
   <ds:schemaRefs>
     <ds:schemaRef ds:uri="http://www.joulesunlimited.com/juid"/>
@@ -5882,15 +6595,111 @@
 </ds:datastoreItem>
 </file>
 
-<file path=customXml/itemProps11.xml><?xml version="1.0" encoding="utf-8"?>
-<ds:datastoreItem xmlns:ds="http://schemas.openxmlformats.org/officeDocument/2006/customXml" ds:itemID="{BF8CBE15-079F-4675-BF63-5D820EEC8C03}">
+<file path=customXml/itemProps25.xml><?xml version="1.0" encoding="utf-8"?>
+<ds:datastoreItem xmlns:ds="http://schemas.openxmlformats.org/officeDocument/2006/customXml" ds:itemID="{66B75566-FAB0-45AB-9D05-98BB04F94002}">
   <ds:schemaRefs>
     <ds:schemaRef ds:uri="http://www.joulesunlimited.com/juid"/>
   </ds:schemaRefs>
 </ds:datastoreItem>
 </file>
 
-<file path=customXml/itemProps12.xml><?xml version="1.0" encoding="utf-8"?>
+<file path=customXml/itemProps26.xml><?xml version="1.0" encoding="utf-8"?>
+<ds:datastoreItem xmlns:ds="http://schemas.openxmlformats.org/officeDocument/2006/customXml" ds:itemID="{05108CB9-601D-4FD5-B851-23F5FECD446A}">
+  <ds:schemaRefs>
+    <ds:schemaRef ds:uri="http://www.joulesunlimited.com/juid"/>
+  </ds:schemaRefs>
+</ds:datastoreItem>
+</file>
+
+<file path=customXml/itemProps27.xml><?xml version="1.0" encoding="utf-8"?>
+<ds:datastoreItem xmlns:ds="http://schemas.openxmlformats.org/officeDocument/2006/customXml" ds:itemID="{5FA85E9C-490F-4B8F-B50A-9DBF8145A93B}">
+  <ds:schemaRefs>
+    <ds:schemaRef ds:uri="http://www.joulesunlimited.com/juid"/>
+  </ds:schemaRefs>
+</ds:datastoreItem>
+</file>
+
+<file path=customXml/itemProps28.xml><?xml version="1.0" encoding="utf-8"?>
+<ds:datastoreItem xmlns:ds="http://schemas.openxmlformats.org/officeDocument/2006/customXml" ds:itemID="{6A900602-4AA5-4175-B192-210836D17189}">
+  <ds:schemaRefs>
+    <ds:schemaRef ds:uri="http://www.joulesunlimited.com/juid"/>
+  </ds:schemaRefs>
+</ds:datastoreItem>
+</file>
+
+<file path=customXml/itemProps29.xml><?xml version="1.0" encoding="utf-8"?>
+<ds:datastoreItem xmlns:ds="http://schemas.openxmlformats.org/officeDocument/2006/customXml" ds:itemID="{C1AD6AC2-B36E-4A8B-8C05-EC93DE0FE4C6}">
+  <ds:schemaRefs>
+    <ds:schemaRef ds:uri="http://www.joulesunlimited.com/juid"/>
+  </ds:schemaRefs>
+</ds:datastoreItem>
+</file>
+
+<file path=customXml/itemProps3.xml><?xml version="1.0" encoding="utf-8"?>
+<ds:datastoreItem xmlns:ds="http://schemas.openxmlformats.org/officeDocument/2006/customXml" ds:itemID="{4A602AE2-C421-49AA-A620-FC4F38415B84}">
+  <ds:schemaRefs>
+    <ds:schemaRef ds:uri="http://www.joulesunlimited.com/juid"/>
+  </ds:schemaRefs>
+</ds:datastoreItem>
+</file>
+
+<file path=customXml/itemProps30.xml><?xml version="1.0" encoding="utf-8"?>
+<ds:datastoreItem xmlns:ds="http://schemas.openxmlformats.org/officeDocument/2006/customXml" ds:itemID="{3D3EEC19-198B-4DBF-968B-617470FE52A3}">
+  <ds:schemaRefs>
+    <ds:schemaRef ds:uri="http://www.joulesunlimited.com/juid"/>
+  </ds:schemaRefs>
+</ds:datastoreItem>
+</file>
+
+<file path=customXml/itemProps31.xml><?xml version="1.0" encoding="utf-8"?>
+<ds:datastoreItem xmlns:ds="http://schemas.openxmlformats.org/officeDocument/2006/customXml" ds:itemID="{EB4C4CD1-ABD9-48E9-9E69-815A9A096DE0}">
+  <ds:schemaRefs>
+    <ds:schemaRef ds:uri="http://www.joulesunlimited.com/juid"/>
+  </ds:schemaRefs>
+</ds:datastoreItem>
+</file>
+
+<file path=customXml/itemProps32.xml><?xml version="1.0" encoding="utf-8"?>
+<ds:datastoreItem xmlns:ds="http://schemas.openxmlformats.org/officeDocument/2006/customXml" ds:itemID="{0407DC00-3AD9-4765-9ECD-EC27EC34C724}">
+  <ds:schemaRefs>
+    <ds:schemaRef ds:uri="http://www.joulesunlimited.com/juid"/>
+  </ds:schemaRefs>
+</ds:datastoreItem>
+</file>
+
+<file path=customXml/itemProps33.xml><?xml version="1.0" encoding="utf-8"?>
+<ds:datastoreItem xmlns:ds="http://schemas.openxmlformats.org/officeDocument/2006/customXml" ds:itemID="{0A116FEA-2A43-4A18-8ADE-FE586D59B1F4}">
+  <ds:schemaRefs>
+    <ds:schemaRef ds:uri="http://www.joulesunlimited.com/juid"/>
+  </ds:schemaRefs>
+</ds:datastoreItem>
+</file>
+
+<file path=customXml/itemProps4.xml><?xml version="1.0" encoding="utf-8"?>
+<ds:datastoreItem xmlns:ds="http://schemas.openxmlformats.org/officeDocument/2006/customXml" ds:itemID="{CE178A92-2A4A-4337-B7B7-67EB322B5A46}">
+  <ds:schemaRefs>
+    <ds:schemaRef ds:uri="http://www.joulesunlimited.com/juid"/>
+  </ds:schemaRefs>
+</ds:datastoreItem>
+</file>
+
+<file path=customXml/itemProps5.xml><?xml version="1.0" encoding="utf-8"?>
+<ds:datastoreItem xmlns:ds="http://schemas.openxmlformats.org/officeDocument/2006/customXml" ds:itemID="{7BB09290-3589-4182-ADD1-CA2E3C0F771D}">
+  <ds:schemaRefs>
+    <ds:schemaRef ds:uri="http://www.joulesunlimited.com/juid"/>
+  </ds:schemaRefs>
+</ds:datastoreItem>
+</file>
+
+<file path=customXml/itemProps6.xml><?xml version="1.0" encoding="utf-8"?>
+<ds:datastoreItem xmlns:ds="http://schemas.openxmlformats.org/officeDocument/2006/customXml" ds:itemID="{21B56ADA-EAA5-4575-ADE9-DE594485FA0E}">
+  <ds:schemaRefs>
+    <ds:schemaRef ds:uri="http://www.joulesunlimited.com/juid"/>
+  </ds:schemaRefs>
+</ds:datastoreItem>
+</file>
+
+<file path=customXml/itemProps7.xml><?xml version="1.0" encoding="utf-8"?>
 <ds:datastoreItem xmlns:ds="http://schemas.openxmlformats.org/officeDocument/2006/customXml" ds:itemID="{1371732C-77C3-47EE-BF45-4B66918F92B9}">
   <ds:schemaRefs>
     <ds:schemaRef ds:uri="http://www.joulesunlimited.com/juid"/>
@@ -5898,39 +6707,7 @@
 </ds:datastoreItem>
 </file>
 
-<file path=customXml/itemProps13.xml><?xml version="1.0" encoding="utf-8"?>
-<ds:datastoreItem xmlns:ds="http://schemas.openxmlformats.org/officeDocument/2006/customXml" ds:itemID="{272EBBDC-D360-4348-913A-50BDC586F769}">
-  <ds:schemaRefs>
-    <ds:schemaRef ds:uri="http://www.joulesunlimited.com/juid"/>
-  </ds:schemaRefs>
-</ds:datastoreItem>
-</file>
-
-<file path=customXml/itemProps14.xml><?xml version="1.0" encoding="utf-8"?>
-<ds:datastoreItem xmlns:ds="http://schemas.openxmlformats.org/officeDocument/2006/customXml" ds:itemID="{C1AD6AC2-B36E-4A8B-8C05-EC93DE0FE4C6}">
-  <ds:schemaRefs>
-    <ds:schemaRef ds:uri="http://www.joulesunlimited.com/juid"/>
-  </ds:schemaRefs>
-</ds:datastoreItem>
-</file>
-
-<file path=customXml/itemProps15.xml><?xml version="1.0" encoding="utf-8"?>
-<ds:datastoreItem xmlns:ds="http://schemas.openxmlformats.org/officeDocument/2006/customXml" ds:itemID="{14822298-B9D8-4DDA-9A59-C2A813037319}">
-  <ds:schemaRefs>
-    <ds:schemaRef ds:uri="http://www.joulesunlimited.com/juid"/>
-  </ds:schemaRefs>
-</ds:datastoreItem>
-</file>
-
-<file path=customXml/itemProps16.xml><?xml version="1.0" encoding="utf-8"?>
-<ds:datastoreItem xmlns:ds="http://schemas.openxmlformats.org/officeDocument/2006/customXml" ds:itemID="{13100955-99DD-4F1D-B284-562F25173232}">
-  <ds:schemaRefs>
-    <ds:schemaRef ds:uri="http://www.joulesunlimited.com/juid"/>
-  </ds:schemaRefs>
-</ds:datastoreItem>
-</file>
-
-<file path=customXml/itemProps17.xml><?xml version="1.0" encoding="utf-8"?>
+<file path=customXml/itemProps8.xml><?xml version="1.0" encoding="utf-8"?>
 <ds:datastoreItem xmlns:ds="http://schemas.openxmlformats.org/officeDocument/2006/customXml" ds:itemID="{7AB8C431-82F7-4495-9402-9D5736F47226}">
   <ds:schemaRefs>
     <ds:schemaRef ds:uri="http://www.joulesunlimited.com/juid"/>
@@ -5938,194 +6715,10 @@
 </ds:datastoreItem>
 </file>
 
-<file path=customXml/itemProps18.xml><?xml version="1.0" encoding="utf-8"?>
-<ds:datastoreItem xmlns:ds="http://schemas.openxmlformats.org/officeDocument/2006/customXml" ds:itemID="{0553E0E7-1207-467A-862E-153EF903819B}">
-  <ds:schemaRefs>
-    <ds:schemaRef ds:uri="http://www.joulesunlimited.com/juid"/>
-  </ds:schemaRefs>
-</ds:datastoreItem>
-</file>
-
-<file path=customXml/itemProps19.xml><?xml version="1.0" encoding="utf-8"?>
-<ds:datastoreItem xmlns:ds="http://schemas.openxmlformats.org/officeDocument/2006/customXml" ds:itemID="{66B75566-FAB0-45AB-9D05-98BB04F94002}">
-  <ds:schemaRefs>
-    <ds:schemaRef ds:uri="http://www.joulesunlimited.com/juid"/>
-  </ds:schemaRefs>
-</ds:datastoreItem>
-</file>
-
-<file path=customXml/itemProps2.xml><?xml version="1.0" encoding="utf-8"?>
-<ds:datastoreItem xmlns:ds="http://schemas.openxmlformats.org/officeDocument/2006/customXml" ds:itemID="{8B6D617A-0FB1-4CA1-BA4C-BE06DE77381F}">
-  <ds:schemaRefs>
-    <ds:schemaRef ds:uri="http://www.joulesunlimited.com/juid"/>
-  </ds:schemaRefs>
-</ds:datastoreItem>
-</file>
-
-<file path=customXml/itemProps20.xml><?xml version="1.0" encoding="utf-8"?>
-<ds:datastoreItem xmlns:ds="http://schemas.openxmlformats.org/officeDocument/2006/customXml" ds:itemID="{365D0148-12F0-478B-A755-985DA728D1A5}">
-  <ds:schemaRefs>
-    <ds:schemaRef ds:uri="http://www.joulesunlimited.com/juid"/>
-  </ds:schemaRefs>
-</ds:datastoreItem>
-</file>
-
-<file path=customXml/itemProps21.xml><?xml version="1.0" encoding="utf-8"?>
-<ds:datastoreItem xmlns:ds="http://schemas.openxmlformats.org/officeDocument/2006/customXml" ds:itemID="{7BB09290-3589-4182-ADD1-CA2E3C0F771D}">
-  <ds:schemaRefs>
-    <ds:schemaRef ds:uri="http://www.joulesunlimited.com/juid"/>
-  </ds:schemaRefs>
-</ds:datastoreItem>
-</file>
-
-<file path=customXml/itemProps22.xml><?xml version="1.0" encoding="utf-8"?>
-<ds:datastoreItem xmlns:ds="http://schemas.openxmlformats.org/officeDocument/2006/customXml" ds:itemID="{3D3EEC19-198B-4DBF-968B-617470FE52A3}">
-  <ds:schemaRefs>
-    <ds:schemaRef ds:uri="http://www.joulesunlimited.com/juid"/>
-  </ds:schemaRefs>
-</ds:datastoreItem>
-</file>
-
-<file path=customXml/itemProps23.xml><?xml version="1.0" encoding="utf-8"?>
-<ds:datastoreItem xmlns:ds="http://schemas.openxmlformats.org/officeDocument/2006/customXml" ds:itemID="{DB048453-F4DA-4209-B099-19684C39F0DB}">
-  <ds:schemaRefs>
-    <ds:schemaRef ds:uri="http://www.joulesunlimited.com/juid"/>
-  </ds:schemaRefs>
-</ds:datastoreItem>
-</file>
-
-<file path=customXml/itemProps24.xml><?xml version="1.0" encoding="utf-8"?>
-<ds:datastoreItem xmlns:ds="http://schemas.openxmlformats.org/officeDocument/2006/customXml" ds:itemID="{C1699E6A-38C6-446F-9665-D4128549273D}">
-  <ds:schemaRefs>
-    <ds:schemaRef ds:uri="http://www.joulesunlimited.com/juid"/>
-  </ds:schemaRefs>
-</ds:datastoreItem>
-</file>
-
-<file path=customXml/itemProps25.xml><?xml version="1.0" encoding="utf-8"?>
+<file path=customXml/itemProps9.xml><?xml version="1.0" encoding="utf-8"?>
 <ds:datastoreItem xmlns:ds="http://schemas.openxmlformats.org/officeDocument/2006/customXml" ds:itemID="{4FCC20A6-1F8E-4FD8-A432-F84132A3DB86}">
   <ds:schemaRefs>
     <ds:schemaRef ds:uri="http://www.joulesunlimited.com/juid"/>
   </ds:schemaRefs>
 </ds:datastoreItem>
-</file>
-
-<file path=customXml/itemProps26.xml><?xml version="1.0" encoding="utf-8"?>
-<ds:datastoreItem xmlns:ds="http://schemas.openxmlformats.org/officeDocument/2006/customXml" ds:itemID="{4A602AE2-C421-49AA-A620-FC4F38415B84}">
-  <ds:schemaRefs>
-    <ds:schemaRef ds:uri="http://www.joulesunlimited.com/juid"/>
-  </ds:schemaRefs>
-</ds:datastoreItem>
-</file>
-
-<file path=customXml/itemProps27.xml><?xml version="1.0" encoding="utf-8"?>
-<ds:datastoreItem xmlns:ds="http://schemas.openxmlformats.org/officeDocument/2006/customXml" ds:itemID="{EB4C4CD1-ABD9-48E9-9E69-815A9A096DE0}">
-  <ds:schemaRefs>
-    <ds:schemaRef ds:uri="http://www.joulesunlimited.com/juid"/>
-  </ds:schemaRefs>
-</ds:datastoreItem>
-</file>
-
-<file path=customXml/itemProps28.xml><?xml version="1.0" encoding="utf-8"?>
-<ds:datastoreItem xmlns:ds="http://schemas.openxmlformats.org/officeDocument/2006/customXml" ds:itemID="{D5C1DE85-FEE5-4CD5-BEAB-32B31BACBCFE}">
-  <ds:schemaRefs>
-    <ds:schemaRef ds:uri="http://www.joulesunlimited.com/juid"/>
-  </ds:schemaRefs>
-</ds:datastoreItem>
-</file>
-
-<file path=customXml/itemProps29.xml><?xml version="1.0" encoding="utf-8"?>
-<ds:datastoreItem xmlns:ds="http://schemas.openxmlformats.org/officeDocument/2006/customXml" ds:itemID="{5211BA7A-995F-4966-ADEE-20903C05C84B}">
-  <ds:schemaRefs>
-    <ds:schemaRef ds:uri="http://www.joulesunlimited.com/juid"/>
-  </ds:schemaRefs>
-</ds:datastoreItem>
-</file>
-
-<file path=customXml/itemProps3.xml><?xml version="1.0" encoding="utf-8"?>
-<ds:datastoreItem xmlns:ds="http://schemas.openxmlformats.org/officeDocument/2006/customXml" ds:itemID="{CE178A92-2A4A-4337-B7B7-67EB322B5A46}">
-  <ds:schemaRefs>
-    <ds:schemaRef ds:uri="http://www.joulesunlimited.com/juid"/>
-  </ds:schemaRefs>
-</ds:datastoreItem>
-</file>
-
-<file path=customXml/itemProps30.xml><?xml version="1.0" encoding="utf-8"?>
-<ds:datastoreItem xmlns:ds="http://schemas.openxmlformats.org/officeDocument/2006/customXml" ds:itemID="{0407DC00-3AD9-4765-9ECD-EC27EC34C724}">
-  <ds:schemaRefs>
-    <ds:schemaRef ds:uri="http://www.joulesunlimited.com/juid"/>
-  </ds:schemaRefs>
-</ds:datastoreItem>
-</file>
-
-<file path=customXml/itemProps31.xml><?xml version="1.0" encoding="utf-8"?>
-<ds:datastoreItem xmlns:ds="http://schemas.openxmlformats.org/officeDocument/2006/customXml" ds:itemID="{05108CB9-601D-4FD5-B851-23F5FECD446A}">
-  <ds:schemaRefs>
-    <ds:schemaRef ds:uri="http://www.joulesunlimited.com/juid"/>
-  </ds:schemaRefs>
-</ds:datastoreItem>
-</file>
-
-<file path=customXml/itemProps32.xml><?xml version="1.0" encoding="utf-8"?>
-<ds:datastoreItem xmlns:ds="http://schemas.openxmlformats.org/officeDocument/2006/customXml" ds:itemID="{6F9F3F13-4916-4C3E-9C5A-30ECD36B9B9A}">
-  <ds:schemaRefs>
-    <ds:schemaRef ds:uri="http://www.joulesunlimited.com/juid"/>
-  </ds:schemaRefs>
-</ds:datastoreItem>
-</file>
-
-<file path=customXml/itemProps33.xml><?xml version="1.0" encoding="utf-8"?>
-<ds:datastoreItem xmlns:ds="http://schemas.openxmlformats.org/officeDocument/2006/customXml" ds:itemID="{12A90D42-96F5-4AA3-8B57-0B593BA25485}">
-  <ds:schemaRefs>
-    <ds:schemaRef ds:uri="http://www.joulesunlimited.com/juid"/>
-  </ds:schemaRefs>
-</ds:datastoreItem>
-</file>
-
-<file path=customXml/itemProps4.xml><?xml version="1.0" encoding="utf-8"?>
-<ds:datastoreItem xmlns:ds="http://schemas.openxmlformats.org/officeDocument/2006/customXml" ds:itemID="{5FA85E9C-490F-4B8F-B50A-9DBF8145A93B}">
-  <ds:schemaRefs>
-    <ds:schemaRef ds:uri="http://www.joulesunlimited.com/juid"/>
-  </ds:schemaRefs>
-</ds:datastoreItem>
-</file>
-
-<file path=customXml/itemProps5.xml><?xml version="1.0" encoding="utf-8"?>
-<ds:datastoreItem xmlns:ds="http://schemas.openxmlformats.org/officeDocument/2006/customXml" ds:itemID="{4B36BCBD-AAD7-45FB-A384-6F9B19D98E94}">
-  <ds:schemaRefs>
-    <ds:schemaRef ds:uri="http://www.joulesunlimited.com/juid"/>
-  </ds:schemaRefs>
-</ds:datastoreItem>
-</file>
-
-<file path=customXml/itemProps6.xml><?xml version="1.0" encoding="utf-8"?>
-<ds:datastoreItem xmlns:ds="http://schemas.openxmlformats.org/officeDocument/2006/customXml" ds:itemID="{7FFB0592-BE29-41E9-B07C-3E9066368DA2}">
-  <ds:schemaRefs>
-    <ds:schemaRef ds:uri="http://www.joulesunlimited.com/juid"/>
-  </ds:schemaRefs>
-</ds:datastoreItem>
-</file>
-
-<file path=customXml/itemProps7.xml><?xml version="1.0" encoding="utf-8"?>
-<ds:datastoreItem xmlns:ds="http://schemas.openxmlformats.org/officeDocument/2006/customXml" ds:itemID="{21B56ADA-EAA5-4575-ADE9-DE594485FA0E}">
-  <ds:schemaRefs>
-    <ds:schemaRef ds:uri="http://www.joulesunlimited.com/juid"/>
-  </ds:schemaRefs>
-</ds:datastoreItem>
-</file>
-
-<file path=customXml/itemProps8.xml><?xml version="1.0" encoding="utf-8"?>
-<ds:datastoreItem xmlns:ds="http://schemas.openxmlformats.org/officeDocument/2006/customXml" ds:itemID="{0A116FEA-2A43-4A18-8ADE-FE586D59B1F4}">
-  <ds:schemaRefs>
-    <ds:schemaRef ds:uri="http://www.joulesunlimited.com/juid"/>
-  </ds:schemaRefs>
-</ds:datastoreItem>
-</file>
-
-<file path=customXml/itemProps9.xml><?xml version="1.0" encoding="utf-8"?>
-<ds:datastoreItem xmlns:ds="http://schemas.openxmlformats.org/officeDocument/2006/customXml" ds:itemID="{6A900602-4AA5-4175-B192-210836D17189}">
-  <ds:schemaRefs>
-    <ds:schemaRef ds:uri="http://www.joulesunlimited.com/juid"/>
-  </ds:schemaRefs>
-</ds:datastoreItem>
 </file>
</xml_diff>

<commit_message>
test report @phase prepare-package
</commit_message>
<xml_diff>
--- a/doc/Présentation_OCP9_projetB4.pptx
+++ b/doc/Présentation_OCP9_projetB4.pptx
@@ -126,7 +126,7 @@
   </p:defaultTextStyle>
   <p:extLst>
     <p:ext uri="{EFAFB233-063F-42B5-8137-9DF3F51BA10A}">
-      <p15:sldGuideLst xmlns="" xmlns:p15="http://schemas.microsoft.com/office/powerpoint/2012/main">
+      <p15:sldGuideLst xmlns:p15="http://schemas.microsoft.com/office/powerpoint/2012/main" xmlns="">
         <p15:guide id="1" orient="horz" pos="1620" userDrawn="1">
           <p15:clr>
             <a:srgbClr val="A4A3A4"/>
@@ -140,7 +140,7 @@
       </p15:sldGuideLst>
     </p:ext>
     <p:ext uri="{2D200454-40CA-4A62-9FC3-DE9A4176ACB9}">
-      <p15:notesGuideLst xmlns="" xmlns:p15="http://schemas.microsoft.com/office/powerpoint/2012/main">
+      <p15:notesGuideLst xmlns:p15="http://schemas.microsoft.com/office/powerpoint/2012/main" xmlns="">
         <p15:guide id="1" orient="horz" pos="2880">
           <p15:clr>
             <a:srgbClr val="A4A3A4"/>
@@ -937,7 +937,7 @@
           <p:cNvPr id="6" name="Frame picture 1">
             <a:extLst>
               <a:ext uri="{FF2B5EF4-FFF2-40B4-BE49-F238E27FC236}">
-                <a16:creationId xmlns="" xmlns:a16="http://schemas.microsoft.com/office/drawing/2014/main" id="{65E86301-1998-EF4F-B706-B9BC864A3BF7}"/>
+                <a16:creationId xmlns:a16="http://schemas.microsoft.com/office/drawing/2014/main" xmlns="" id="{65E86301-1998-EF4F-B706-B9BC864A3BF7}"/>
               </a:ext>
             </a:extLst>
           </p:cNvPr>
@@ -984,7 +984,7 @@
           <p:cNvPr id="2" name="Title 1">
             <a:extLst>
               <a:ext uri="{FF2B5EF4-FFF2-40B4-BE49-F238E27FC236}">
-                <a16:creationId xmlns="" xmlns:a16="http://schemas.microsoft.com/office/drawing/2014/main" id="{CF267043-749E-4CC4-95FD-6FA8F074C44A}"/>
+                <a16:creationId xmlns:a16="http://schemas.microsoft.com/office/drawing/2014/main" xmlns="" id="{CF267043-749E-4CC4-95FD-6FA8F074C44A}"/>
               </a:ext>
             </a:extLst>
           </p:cNvPr>
@@ -1079,7 +1079,7 @@
           <p:cNvPr id="5" name="Title 1">
             <a:extLst>
               <a:ext uri="{FF2B5EF4-FFF2-40B4-BE49-F238E27FC236}">
-                <a16:creationId xmlns="" xmlns:a16="http://schemas.microsoft.com/office/drawing/2014/main" id="{CAF4CD65-24E4-4A2C-9857-C8365CEDC4DA}"/>
+                <a16:creationId xmlns:a16="http://schemas.microsoft.com/office/drawing/2014/main" xmlns="" id="{CAF4CD65-24E4-4A2C-9857-C8365CEDC4DA}"/>
               </a:ext>
             </a:extLst>
           </p:cNvPr>
@@ -1192,7 +1192,7 @@
   </p:clrMapOvr>
   <p:extLst>
     <p:ext uri="{DCECCB84-F9BA-43D5-87BE-67443E8EF086}">
-      <p15:sldGuideLst xmlns="" xmlns:p15="http://schemas.microsoft.com/office/powerpoint/2012/main"/>
+      <p15:sldGuideLst xmlns:p15="http://schemas.microsoft.com/office/powerpoint/2012/main" xmlns=""/>
     </p:ext>
   </p:extLst>
 </p:sldLayout>
@@ -1284,7 +1284,7 @@
           <p:cNvPr id="6" name="Title 1">
             <a:extLst>
               <a:ext uri="{FF2B5EF4-FFF2-40B4-BE49-F238E27FC236}">
-                <a16:creationId xmlns="" xmlns:a16="http://schemas.microsoft.com/office/drawing/2014/main" id="{41571FD5-12B2-421F-9B07-99071A4E6161}"/>
+                <a16:creationId xmlns:a16="http://schemas.microsoft.com/office/drawing/2014/main" xmlns="" id="{41571FD5-12B2-421F-9B07-99071A4E6161}"/>
               </a:ext>
             </a:extLst>
           </p:cNvPr>
@@ -1420,7 +1420,7 @@
           <p:cNvPr id="6" name="Title 1">
             <a:extLst>
               <a:ext uri="{FF2B5EF4-FFF2-40B4-BE49-F238E27FC236}">
-                <a16:creationId xmlns="" xmlns:a16="http://schemas.microsoft.com/office/drawing/2014/main" id="{67AF7496-90D2-4A52-8B85-42B4E4BF71E7}"/>
+                <a16:creationId xmlns:a16="http://schemas.microsoft.com/office/drawing/2014/main" xmlns="" id="{67AF7496-90D2-4A52-8B85-42B4E4BF71E7}"/>
               </a:ext>
             </a:extLst>
           </p:cNvPr>
@@ -2197,7 +2197,7 @@
   </p:txStyles>
   <p:extLst mod="1">
     <p:ext uri="{27BBF7A9-308A-43DC-89C8-2F10F3537804}">
-      <p15:sldGuideLst xmlns="" xmlns:p15="http://schemas.microsoft.com/office/powerpoint/2012/main">
+      <p15:sldGuideLst xmlns:p15="http://schemas.microsoft.com/office/powerpoint/2012/main" xmlns="">
         <p15:guide id="1" orient="horz" pos="3103" userDrawn="1">
           <p15:clr>
             <a:srgbClr val="000000"/>
@@ -2460,6 +2460,60 @@
           </a:p>
         </p:txBody>
       </p:sp>
+      <p:pic>
+        <p:nvPicPr>
+          <p:cNvPr id="1026" name="Picture 2"/>
+          <p:cNvPicPr>
+            <a:picLocks noChangeAspect="1" noChangeArrowheads="1"/>
+          </p:cNvPicPr>
+          <p:nvPr/>
+        </p:nvPicPr>
+        <p:blipFill>
+          <a:blip r:embed="rId2">
+            <a:extLst>
+              <a:ext uri="{28A0092B-C50C-407E-A947-70E740481C1C}">
+                <a14:useLocalDpi xmlns:a14="http://schemas.microsoft.com/office/drawing/2010/main" val="0"/>
+              </a:ext>
+            </a:extLst>
+          </a:blip>
+          <a:srcRect/>
+          <a:stretch>
+            <a:fillRect/>
+          </a:stretch>
+        </p:blipFill>
+        <p:spPr bwMode="auto">
+          <a:xfrm>
+            <a:off x="4686300" y="639916"/>
+            <a:ext cx="4457700" cy="4232311"/>
+          </a:xfrm>
+          <a:prstGeom prst="rect">
+            <a:avLst/>
+          </a:prstGeom>
+          <a:noFill/>
+          <a:ln>
+            <a:noFill/>
+          </a:ln>
+          <a:extLst>
+            <a:ext uri="{909E8E84-426E-40DD-AFC4-6F175D3DCCD1}">
+              <a14:hiddenFill xmlns:a14="http://schemas.microsoft.com/office/drawing/2010/main">
+                <a:solidFill>
+                  <a:schemeClr val="accent1"/>
+                </a:solidFill>
+              </a14:hiddenFill>
+            </a:ext>
+            <a:ext uri="{91240B29-F687-4F45-9708-019B960494DF}">
+              <a14:hiddenLine xmlns:a14="http://schemas.microsoft.com/office/drawing/2010/main" w="9525">
+                <a:solidFill>
+                  <a:schemeClr val="tx1"/>
+                </a:solidFill>
+                <a:miter lim="800000"/>
+                <a:headEnd/>
+                <a:tailEnd/>
+              </a14:hiddenLine>
+            </a:ext>
+          </a:extLst>
+        </p:spPr>
+      </p:pic>
     </p:spTree>
     <p:extLst>
       <p:ext uri="{BB962C8B-B14F-4D97-AF65-F5344CB8AC3E}">
@@ -2909,7 +2963,6 @@
               <a:rPr lang="fr-FR" dirty="0"/>
               <a:t>https://travis-ci.org/github/rvallet/ocp9-projetB4</a:t>
             </a:r>
-            <a:endParaRPr lang="fr-FR" dirty="0"/>
           </a:p>
         </p:txBody>
       </p:sp>
@@ -5871,7 +5924,7 @@
   </a:custClrLst>
   <a:extLst>
     <a:ext uri="{05A4C25C-085E-4340-85A3-A5531E510DB2}">
-      <thm15:themeFamily xmlns="" xmlns:thm15="http://schemas.microsoft.com/office/thememl/2012/main" name="Blank.potx" id="{D8CCFB3A-CA66-4E30-A885-EFBD64A1E9D9}" vid="{BF2D768E-DF08-4D64-BCAB-8216E154572B}"/>
+      <thm15:themeFamily xmlns:thm15="http://schemas.microsoft.com/office/thememl/2012/main" xmlns="" name="Blank.potx" id="{D8CCFB3A-CA66-4E30-A885-EFBD64A1E9D9}" vid="{BF2D768E-DF08-4D64-BCAB-8216E154572B}"/>
     </a:ext>
   </a:extLst>
 </a:theme>
@@ -6460,6 +6513,54 @@
 </file>
 
 <file path=customXml/itemProps1.xml><?xml version="1.0" encoding="utf-8"?>
+<ds:datastoreItem xmlns:ds="http://schemas.openxmlformats.org/officeDocument/2006/customXml" ds:itemID="{365D0148-12F0-478B-A755-985DA728D1A5}">
+  <ds:schemaRefs>
+    <ds:schemaRef ds:uri="http://www.joulesunlimited.com/juid"/>
+  </ds:schemaRefs>
+</ds:datastoreItem>
+</file>
+
+<file path=customXml/itemProps10.xml><?xml version="1.0" encoding="utf-8"?>
+<ds:datastoreItem xmlns:ds="http://schemas.openxmlformats.org/officeDocument/2006/customXml" ds:itemID="{0A116FEA-2A43-4A18-8ADE-FE586D59B1F4}">
+  <ds:schemaRefs>
+    <ds:schemaRef ds:uri="http://www.joulesunlimited.com/juid"/>
+  </ds:schemaRefs>
+</ds:datastoreItem>
+</file>
+
+<file path=customXml/itemProps11.xml><?xml version="1.0" encoding="utf-8"?>
+<ds:datastoreItem xmlns:ds="http://schemas.openxmlformats.org/officeDocument/2006/customXml" ds:itemID="{0553E0E7-1207-467A-862E-153EF903819B}">
+  <ds:schemaRefs>
+    <ds:schemaRef ds:uri="http://www.joulesunlimited.com/juid"/>
+  </ds:schemaRefs>
+</ds:datastoreItem>
+</file>
+
+<file path=customXml/itemProps12.xml><?xml version="1.0" encoding="utf-8"?>
+<ds:datastoreItem xmlns:ds="http://schemas.openxmlformats.org/officeDocument/2006/customXml" ds:itemID="{7FFB0592-BE29-41E9-B07C-3E9066368DA2}">
+  <ds:schemaRefs>
+    <ds:schemaRef ds:uri="http://www.joulesunlimited.com/juid"/>
+  </ds:schemaRefs>
+</ds:datastoreItem>
+</file>
+
+<file path=customXml/itemProps13.xml><?xml version="1.0" encoding="utf-8"?>
+<ds:datastoreItem xmlns:ds="http://schemas.openxmlformats.org/officeDocument/2006/customXml" ds:itemID="{4B36BCBD-AAD7-45FB-A384-6F9B19D98E94}">
+  <ds:schemaRefs>
+    <ds:schemaRef ds:uri="http://www.joulesunlimited.com/juid"/>
+  </ds:schemaRefs>
+</ds:datastoreItem>
+</file>
+
+<file path=customXml/itemProps14.xml><?xml version="1.0" encoding="utf-8"?>
+<ds:datastoreItem xmlns:ds="http://schemas.openxmlformats.org/officeDocument/2006/customXml" ds:itemID="{C1AD6AC2-B36E-4A8B-8C05-EC93DE0FE4C6}">
+  <ds:schemaRefs>
+    <ds:schemaRef ds:uri="http://www.joulesunlimited.com/juid"/>
+  </ds:schemaRefs>
+</ds:datastoreItem>
+</file>
+
+<file path=customXml/itemProps15.xml><?xml version="1.0" encoding="utf-8"?>
 <ds:datastoreItem xmlns:ds="http://schemas.openxmlformats.org/officeDocument/2006/customXml" ds:itemID="{272EBBDC-D360-4348-913A-50BDC586F769}">
   <ds:schemaRefs>
     <ds:schemaRef ds:uri="http://www.joulesunlimited.com/juid"/>
@@ -6467,7 +6568,79 @@
 </ds:datastoreItem>
 </file>
 
-<file path=customXml/itemProps10.xml><?xml version="1.0" encoding="utf-8"?>
+<file path=customXml/itemProps16.xml><?xml version="1.0" encoding="utf-8"?>
+<ds:datastoreItem xmlns:ds="http://schemas.openxmlformats.org/officeDocument/2006/customXml" ds:itemID="{21B56ADA-EAA5-4575-ADE9-DE594485FA0E}">
+  <ds:schemaRefs>
+    <ds:schemaRef ds:uri="http://www.joulesunlimited.com/juid"/>
+  </ds:schemaRefs>
+</ds:datastoreItem>
+</file>
+
+<file path=customXml/itemProps17.xml><?xml version="1.0" encoding="utf-8"?>
+<ds:datastoreItem xmlns:ds="http://schemas.openxmlformats.org/officeDocument/2006/customXml" ds:itemID="{8B6D617A-0FB1-4CA1-BA4C-BE06DE77381F}">
+  <ds:schemaRefs>
+    <ds:schemaRef ds:uri="http://www.joulesunlimited.com/juid"/>
+  </ds:schemaRefs>
+</ds:datastoreItem>
+</file>
+
+<file path=customXml/itemProps18.xml><?xml version="1.0" encoding="utf-8"?>
+<ds:datastoreItem xmlns:ds="http://schemas.openxmlformats.org/officeDocument/2006/customXml" ds:itemID="{E5A43A96-145C-4051-B26F-63E30B16E14A}">
+  <ds:schemaRefs>
+    <ds:schemaRef ds:uri="http://www.joulesunlimited.com/juid"/>
+  </ds:schemaRefs>
+</ds:datastoreItem>
+</file>
+
+<file path=customXml/itemProps19.xml><?xml version="1.0" encoding="utf-8"?>
+<ds:datastoreItem xmlns:ds="http://schemas.openxmlformats.org/officeDocument/2006/customXml" ds:itemID="{0407DC00-3AD9-4765-9ECD-EC27EC34C724}">
+  <ds:schemaRefs>
+    <ds:schemaRef ds:uri="http://www.joulesunlimited.com/juid"/>
+  </ds:schemaRefs>
+</ds:datastoreItem>
+</file>
+
+<file path=customXml/itemProps2.xml><?xml version="1.0" encoding="utf-8"?>
+<ds:datastoreItem xmlns:ds="http://schemas.openxmlformats.org/officeDocument/2006/customXml" ds:itemID="{C1699E6A-38C6-446F-9665-D4128549273D}">
+  <ds:schemaRefs>
+    <ds:schemaRef ds:uri="http://www.joulesunlimited.com/juid"/>
+  </ds:schemaRefs>
+</ds:datastoreItem>
+</file>
+
+<file path=customXml/itemProps20.xml><?xml version="1.0" encoding="utf-8"?>
+<ds:datastoreItem xmlns:ds="http://schemas.openxmlformats.org/officeDocument/2006/customXml" ds:itemID="{7BB09290-3589-4182-ADD1-CA2E3C0F771D}">
+  <ds:schemaRefs>
+    <ds:schemaRef ds:uri="http://www.joulesunlimited.com/juid"/>
+  </ds:schemaRefs>
+</ds:datastoreItem>
+</file>
+
+<file path=customXml/itemProps21.xml><?xml version="1.0" encoding="utf-8"?>
+<ds:datastoreItem xmlns:ds="http://schemas.openxmlformats.org/officeDocument/2006/customXml" ds:itemID="{BA388501-9B54-4C94-A6D2-E2FCF940976D}">
+  <ds:schemaRefs>
+    <ds:schemaRef ds:uri="http://www.joulesunlimited.com/juid"/>
+  </ds:schemaRefs>
+</ds:datastoreItem>
+</file>
+
+<file path=customXml/itemProps22.xml><?xml version="1.0" encoding="utf-8"?>
+<ds:datastoreItem xmlns:ds="http://schemas.openxmlformats.org/officeDocument/2006/customXml" ds:itemID="{D5C1DE85-FEE5-4CD5-BEAB-32B31BACBCFE}">
+  <ds:schemaRefs>
+    <ds:schemaRef ds:uri="http://www.joulesunlimited.com/juid"/>
+  </ds:schemaRefs>
+</ds:datastoreItem>
+</file>
+
+<file path=customXml/itemProps23.xml><?xml version="1.0" encoding="utf-8"?>
+<ds:datastoreItem xmlns:ds="http://schemas.openxmlformats.org/officeDocument/2006/customXml" ds:itemID="{6A900602-4AA5-4175-B192-210836D17189}">
+  <ds:schemaRefs>
+    <ds:schemaRef ds:uri="http://www.joulesunlimited.com/juid"/>
+  </ds:schemaRefs>
+</ds:datastoreItem>
+</file>
+
+<file path=customXml/itemProps24.xml><?xml version="1.0" encoding="utf-8"?>
 <ds:datastoreItem xmlns:ds="http://schemas.openxmlformats.org/officeDocument/2006/customXml" ds:itemID="{12A90D42-96F5-4AA3-8B57-0B593BA25485}">
   <ds:schemaRefs>
     <ds:schemaRef ds:uri="http://www.joulesunlimited.com/juid"/>
@@ -6475,15 +6648,111 @@
 </ds:datastoreItem>
 </file>
 
-<file path=customXml/itemProps11.xml><?xml version="1.0" encoding="utf-8"?>
-<ds:datastoreItem xmlns:ds="http://schemas.openxmlformats.org/officeDocument/2006/customXml" ds:itemID="{8B6D617A-0FB1-4CA1-BA4C-BE06DE77381F}">
+<file path=customXml/itemProps25.xml><?xml version="1.0" encoding="utf-8"?>
+<ds:datastoreItem xmlns:ds="http://schemas.openxmlformats.org/officeDocument/2006/customXml" ds:itemID="{6F9F3F13-4916-4C3E-9C5A-30ECD36B9B9A}">
   <ds:schemaRefs>
     <ds:schemaRef ds:uri="http://www.joulesunlimited.com/juid"/>
   </ds:schemaRefs>
 </ds:datastoreItem>
 </file>
 
-<file path=customXml/itemProps12.xml><?xml version="1.0" encoding="utf-8"?>
+<file path=customXml/itemProps26.xml><?xml version="1.0" encoding="utf-8"?>
+<ds:datastoreItem xmlns:ds="http://schemas.openxmlformats.org/officeDocument/2006/customXml" ds:itemID="{EB4C4CD1-ABD9-48E9-9E69-815A9A096DE0}">
+  <ds:schemaRefs>
+    <ds:schemaRef ds:uri="http://www.joulesunlimited.com/juid"/>
+  </ds:schemaRefs>
+</ds:datastoreItem>
+</file>
+
+<file path=customXml/itemProps27.xml><?xml version="1.0" encoding="utf-8"?>
+<ds:datastoreItem xmlns:ds="http://schemas.openxmlformats.org/officeDocument/2006/customXml" ds:itemID="{CE178A92-2A4A-4337-B7B7-67EB322B5A46}">
+  <ds:schemaRefs>
+    <ds:schemaRef ds:uri="http://www.joulesunlimited.com/juid"/>
+  </ds:schemaRefs>
+</ds:datastoreItem>
+</file>
+
+<file path=customXml/itemProps28.xml><?xml version="1.0" encoding="utf-8"?>
+<ds:datastoreItem xmlns:ds="http://schemas.openxmlformats.org/officeDocument/2006/customXml" ds:itemID="{4FCC20A6-1F8E-4FD8-A432-F84132A3DB86}">
+  <ds:schemaRefs>
+    <ds:schemaRef ds:uri="http://www.joulesunlimited.com/juid"/>
+  </ds:schemaRefs>
+</ds:datastoreItem>
+</file>
+
+<file path=customXml/itemProps29.xml><?xml version="1.0" encoding="utf-8"?>
+<ds:datastoreItem xmlns:ds="http://schemas.openxmlformats.org/officeDocument/2006/customXml" ds:itemID="{5211BA7A-995F-4966-ADEE-20903C05C84B}">
+  <ds:schemaRefs>
+    <ds:schemaRef ds:uri="http://www.joulesunlimited.com/juid"/>
+  </ds:schemaRefs>
+</ds:datastoreItem>
+</file>
+
+<file path=customXml/itemProps3.xml><?xml version="1.0" encoding="utf-8"?>
+<ds:datastoreItem xmlns:ds="http://schemas.openxmlformats.org/officeDocument/2006/customXml" ds:itemID="{05108CB9-601D-4FD5-B851-23F5FECD446A}">
+  <ds:schemaRefs>
+    <ds:schemaRef ds:uri="http://www.joulesunlimited.com/juid"/>
+  </ds:schemaRefs>
+</ds:datastoreItem>
+</file>
+
+<file path=customXml/itemProps30.xml><?xml version="1.0" encoding="utf-8"?>
+<ds:datastoreItem xmlns:ds="http://schemas.openxmlformats.org/officeDocument/2006/customXml" ds:itemID="{DB048453-F4DA-4209-B099-19684C39F0DB}">
+  <ds:schemaRefs>
+    <ds:schemaRef ds:uri="http://www.joulesunlimited.com/juid"/>
+  </ds:schemaRefs>
+</ds:datastoreItem>
+</file>
+
+<file path=customXml/itemProps31.xml><?xml version="1.0" encoding="utf-8"?>
+<ds:datastoreItem xmlns:ds="http://schemas.openxmlformats.org/officeDocument/2006/customXml" ds:itemID="{5FA85E9C-490F-4B8F-B50A-9DBF8145A93B}">
+  <ds:schemaRefs>
+    <ds:schemaRef ds:uri="http://www.joulesunlimited.com/juid"/>
+  </ds:schemaRefs>
+</ds:datastoreItem>
+</file>
+
+<file path=customXml/itemProps32.xml><?xml version="1.0" encoding="utf-8"?>
+<ds:datastoreItem xmlns:ds="http://schemas.openxmlformats.org/officeDocument/2006/customXml" ds:itemID="{3D3EEC19-198B-4DBF-968B-617470FE52A3}">
+  <ds:schemaRefs>
+    <ds:schemaRef ds:uri="http://www.joulesunlimited.com/juid"/>
+  </ds:schemaRefs>
+</ds:datastoreItem>
+</file>
+
+<file path=customXml/itemProps33.xml><?xml version="1.0" encoding="utf-8"?>
+<ds:datastoreItem xmlns:ds="http://schemas.openxmlformats.org/officeDocument/2006/customXml" ds:itemID="{7AB8C431-82F7-4495-9402-9D5736F47226}">
+  <ds:schemaRefs>
+    <ds:schemaRef ds:uri="http://www.joulesunlimited.com/juid"/>
+  </ds:schemaRefs>
+</ds:datastoreItem>
+</file>
+
+<file path=customXml/itemProps4.xml><?xml version="1.0" encoding="utf-8"?>
+<ds:datastoreItem xmlns:ds="http://schemas.openxmlformats.org/officeDocument/2006/customXml" ds:itemID="{4A602AE2-C421-49AA-A620-FC4F38415B84}">
+  <ds:schemaRefs>
+    <ds:schemaRef ds:uri="http://www.joulesunlimited.com/juid"/>
+  </ds:schemaRefs>
+</ds:datastoreItem>
+</file>
+
+<file path=customXml/itemProps5.xml><?xml version="1.0" encoding="utf-8"?>
+<ds:datastoreItem xmlns:ds="http://schemas.openxmlformats.org/officeDocument/2006/customXml" ds:itemID="{14822298-B9D8-4DDA-9A59-C2A813037319}">
+  <ds:schemaRefs>
+    <ds:schemaRef ds:uri="http://www.joulesunlimited.com/juid"/>
+  </ds:schemaRefs>
+</ds:datastoreItem>
+</file>
+
+<file path=customXml/itemProps6.xml><?xml version="1.0" encoding="utf-8"?>
+<ds:datastoreItem xmlns:ds="http://schemas.openxmlformats.org/officeDocument/2006/customXml" ds:itemID="{1371732C-77C3-47EE-BF45-4B66918F92B9}">
+  <ds:schemaRefs>
+    <ds:schemaRef ds:uri="http://www.joulesunlimited.com/juid"/>
+  </ds:schemaRefs>
+</ds:datastoreItem>
+</file>
+
+<file path=customXml/itemProps7.xml><?xml version="1.0" encoding="utf-8"?>
 <ds:datastoreItem xmlns:ds="http://schemas.openxmlformats.org/officeDocument/2006/customXml" ds:itemID="{13100955-99DD-4F1D-B284-562F25173232}">
   <ds:schemaRefs>
     <ds:schemaRef ds:uri="http://www.joulesunlimited.com/juid"/>
@@ -6491,39 +6760,7 @@
 </ds:datastoreItem>
 </file>
 
-<file path=customXml/itemProps13.xml><?xml version="1.0" encoding="utf-8"?>
-<ds:datastoreItem xmlns:ds="http://schemas.openxmlformats.org/officeDocument/2006/customXml" ds:itemID="{365D0148-12F0-478B-A755-985DA728D1A5}">
-  <ds:schemaRefs>
-    <ds:schemaRef ds:uri="http://www.joulesunlimited.com/juid"/>
-  </ds:schemaRefs>
-</ds:datastoreItem>
-</file>
-
-<file path=customXml/itemProps14.xml><?xml version="1.0" encoding="utf-8"?>
-<ds:datastoreItem xmlns:ds="http://schemas.openxmlformats.org/officeDocument/2006/customXml" ds:itemID="{5211BA7A-995F-4966-ADEE-20903C05C84B}">
-  <ds:schemaRefs>
-    <ds:schemaRef ds:uri="http://www.joulesunlimited.com/juid"/>
-  </ds:schemaRefs>
-</ds:datastoreItem>
-</file>
-
-<file path=customXml/itemProps15.xml><?xml version="1.0" encoding="utf-8"?>
-<ds:datastoreItem xmlns:ds="http://schemas.openxmlformats.org/officeDocument/2006/customXml" ds:itemID="{BA388501-9B54-4C94-A6D2-E2FCF940976D}">
-  <ds:schemaRefs>
-    <ds:schemaRef ds:uri="http://www.joulesunlimited.com/juid"/>
-  </ds:schemaRefs>
-</ds:datastoreItem>
-</file>
-
-<file path=customXml/itemProps16.xml><?xml version="1.0" encoding="utf-8"?>
-<ds:datastoreItem xmlns:ds="http://schemas.openxmlformats.org/officeDocument/2006/customXml" ds:itemID="{7FFB0592-BE29-41E9-B07C-3E9066368DA2}">
-  <ds:schemaRefs>
-    <ds:schemaRef ds:uri="http://www.joulesunlimited.com/juid"/>
-  </ds:schemaRefs>
-</ds:datastoreItem>
-</file>
-
-<file path=customXml/itemProps17.xml><?xml version="1.0" encoding="utf-8"?>
+<file path=customXml/itemProps8.xml><?xml version="1.0" encoding="utf-8"?>
 <ds:datastoreItem xmlns:ds="http://schemas.openxmlformats.org/officeDocument/2006/customXml" ds:itemID="{BF8CBE15-079F-4675-BF63-5D820EEC8C03}">
   <ds:schemaRefs>
     <ds:schemaRef ds:uri="http://www.joulesunlimited.com/juid"/>
@@ -6531,194 +6768,10 @@
 </ds:datastoreItem>
 </file>
 
-<file path=customXml/itemProps18.xml><?xml version="1.0" encoding="utf-8"?>
-<ds:datastoreItem xmlns:ds="http://schemas.openxmlformats.org/officeDocument/2006/customXml" ds:itemID="{C1699E6A-38C6-446F-9665-D4128549273D}">
-  <ds:schemaRefs>
-    <ds:schemaRef ds:uri="http://www.joulesunlimited.com/juid"/>
-  </ds:schemaRefs>
-</ds:datastoreItem>
-</file>
-
-<file path=customXml/itemProps19.xml><?xml version="1.0" encoding="utf-8"?>
-<ds:datastoreItem xmlns:ds="http://schemas.openxmlformats.org/officeDocument/2006/customXml" ds:itemID="{6F9F3F13-4916-4C3E-9C5A-30ECD36B9B9A}">
-  <ds:schemaRefs>
-    <ds:schemaRef ds:uri="http://www.joulesunlimited.com/juid"/>
-  </ds:schemaRefs>
-</ds:datastoreItem>
-</file>
-
-<file path=customXml/itemProps2.xml><?xml version="1.0" encoding="utf-8"?>
-<ds:datastoreItem xmlns:ds="http://schemas.openxmlformats.org/officeDocument/2006/customXml" ds:itemID="{0553E0E7-1207-467A-862E-153EF903819B}">
-  <ds:schemaRefs>
-    <ds:schemaRef ds:uri="http://www.joulesunlimited.com/juid"/>
-  </ds:schemaRefs>
-</ds:datastoreItem>
-</file>
-
-<file path=customXml/itemProps20.xml><?xml version="1.0" encoding="utf-8"?>
-<ds:datastoreItem xmlns:ds="http://schemas.openxmlformats.org/officeDocument/2006/customXml" ds:itemID="{4B36BCBD-AAD7-45FB-A384-6F9B19D98E94}">
-  <ds:schemaRefs>
-    <ds:schemaRef ds:uri="http://www.joulesunlimited.com/juid"/>
-  </ds:schemaRefs>
-</ds:datastoreItem>
-</file>
-
-<file path=customXml/itemProps21.xml><?xml version="1.0" encoding="utf-8"?>
-<ds:datastoreItem xmlns:ds="http://schemas.openxmlformats.org/officeDocument/2006/customXml" ds:itemID="{14822298-B9D8-4DDA-9A59-C2A813037319}">
-  <ds:schemaRefs>
-    <ds:schemaRef ds:uri="http://www.joulesunlimited.com/juid"/>
-  </ds:schemaRefs>
-</ds:datastoreItem>
-</file>
-
-<file path=customXml/itemProps22.xml><?xml version="1.0" encoding="utf-8"?>
-<ds:datastoreItem xmlns:ds="http://schemas.openxmlformats.org/officeDocument/2006/customXml" ds:itemID="{DB048453-F4DA-4209-B099-19684C39F0DB}">
-  <ds:schemaRefs>
-    <ds:schemaRef ds:uri="http://www.joulesunlimited.com/juid"/>
-  </ds:schemaRefs>
-</ds:datastoreItem>
-</file>
-
-<file path=customXml/itemProps23.xml><?xml version="1.0" encoding="utf-8"?>
-<ds:datastoreItem xmlns:ds="http://schemas.openxmlformats.org/officeDocument/2006/customXml" ds:itemID="{D5C1DE85-FEE5-4CD5-BEAB-32B31BACBCFE}">
-  <ds:schemaRefs>
-    <ds:schemaRef ds:uri="http://www.joulesunlimited.com/juid"/>
-  </ds:schemaRefs>
-</ds:datastoreItem>
-</file>
-
-<file path=customXml/itemProps24.xml><?xml version="1.0" encoding="utf-8"?>
-<ds:datastoreItem xmlns:ds="http://schemas.openxmlformats.org/officeDocument/2006/customXml" ds:itemID="{E5A43A96-145C-4051-B26F-63E30B16E14A}">
-  <ds:schemaRefs>
-    <ds:schemaRef ds:uri="http://www.joulesunlimited.com/juid"/>
-  </ds:schemaRefs>
-</ds:datastoreItem>
-</file>
-
-<file path=customXml/itemProps25.xml><?xml version="1.0" encoding="utf-8"?>
+<file path=customXml/itemProps9.xml><?xml version="1.0" encoding="utf-8"?>
 <ds:datastoreItem xmlns:ds="http://schemas.openxmlformats.org/officeDocument/2006/customXml" ds:itemID="{66B75566-FAB0-45AB-9D05-98BB04F94002}">
   <ds:schemaRefs>
     <ds:schemaRef ds:uri="http://www.joulesunlimited.com/juid"/>
   </ds:schemaRefs>
 </ds:datastoreItem>
-</file>
-
-<file path=customXml/itemProps26.xml><?xml version="1.0" encoding="utf-8"?>
-<ds:datastoreItem xmlns:ds="http://schemas.openxmlformats.org/officeDocument/2006/customXml" ds:itemID="{05108CB9-601D-4FD5-B851-23F5FECD446A}">
-  <ds:schemaRefs>
-    <ds:schemaRef ds:uri="http://www.joulesunlimited.com/juid"/>
-  </ds:schemaRefs>
-</ds:datastoreItem>
-</file>
-
-<file path=customXml/itemProps27.xml><?xml version="1.0" encoding="utf-8"?>
-<ds:datastoreItem xmlns:ds="http://schemas.openxmlformats.org/officeDocument/2006/customXml" ds:itemID="{5FA85E9C-490F-4B8F-B50A-9DBF8145A93B}">
-  <ds:schemaRefs>
-    <ds:schemaRef ds:uri="http://www.joulesunlimited.com/juid"/>
-  </ds:schemaRefs>
-</ds:datastoreItem>
-</file>
-
-<file path=customXml/itemProps28.xml><?xml version="1.0" encoding="utf-8"?>
-<ds:datastoreItem xmlns:ds="http://schemas.openxmlformats.org/officeDocument/2006/customXml" ds:itemID="{6A900602-4AA5-4175-B192-210836D17189}">
-  <ds:schemaRefs>
-    <ds:schemaRef ds:uri="http://www.joulesunlimited.com/juid"/>
-  </ds:schemaRefs>
-</ds:datastoreItem>
-</file>
-
-<file path=customXml/itemProps29.xml><?xml version="1.0" encoding="utf-8"?>
-<ds:datastoreItem xmlns:ds="http://schemas.openxmlformats.org/officeDocument/2006/customXml" ds:itemID="{C1AD6AC2-B36E-4A8B-8C05-EC93DE0FE4C6}">
-  <ds:schemaRefs>
-    <ds:schemaRef ds:uri="http://www.joulesunlimited.com/juid"/>
-  </ds:schemaRefs>
-</ds:datastoreItem>
-</file>
-
-<file path=customXml/itemProps3.xml><?xml version="1.0" encoding="utf-8"?>
-<ds:datastoreItem xmlns:ds="http://schemas.openxmlformats.org/officeDocument/2006/customXml" ds:itemID="{4A602AE2-C421-49AA-A620-FC4F38415B84}">
-  <ds:schemaRefs>
-    <ds:schemaRef ds:uri="http://www.joulesunlimited.com/juid"/>
-  </ds:schemaRefs>
-</ds:datastoreItem>
-</file>
-
-<file path=customXml/itemProps30.xml><?xml version="1.0" encoding="utf-8"?>
-<ds:datastoreItem xmlns:ds="http://schemas.openxmlformats.org/officeDocument/2006/customXml" ds:itemID="{3D3EEC19-198B-4DBF-968B-617470FE52A3}">
-  <ds:schemaRefs>
-    <ds:schemaRef ds:uri="http://www.joulesunlimited.com/juid"/>
-  </ds:schemaRefs>
-</ds:datastoreItem>
-</file>
-
-<file path=customXml/itemProps31.xml><?xml version="1.0" encoding="utf-8"?>
-<ds:datastoreItem xmlns:ds="http://schemas.openxmlformats.org/officeDocument/2006/customXml" ds:itemID="{EB4C4CD1-ABD9-48E9-9E69-815A9A096DE0}">
-  <ds:schemaRefs>
-    <ds:schemaRef ds:uri="http://www.joulesunlimited.com/juid"/>
-  </ds:schemaRefs>
-</ds:datastoreItem>
-</file>
-
-<file path=customXml/itemProps32.xml><?xml version="1.0" encoding="utf-8"?>
-<ds:datastoreItem xmlns:ds="http://schemas.openxmlformats.org/officeDocument/2006/customXml" ds:itemID="{0407DC00-3AD9-4765-9ECD-EC27EC34C724}">
-  <ds:schemaRefs>
-    <ds:schemaRef ds:uri="http://www.joulesunlimited.com/juid"/>
-  </ds:schemaRefs>
-</ds:datastoreItem>
-</file>
-
-<file path=customXml/itemProps33.xml><?xml version="1.0" encoding="utf-8"?>
-<ds:datastoreItem xmlns:ds="http://schemas.openxmlformats.org/officeDocument/2006/customXml" ds:itemID="{0A116FEA-2A43-4A18-8ADE-FE586D59B1F4}">
-  <ds:schemaRefs>
-    <ds:schemaRef ds:uri="http://www.joulesunlimited.com/juid"/>
-  </ds:schemaRefs>
-</ds:datastoreItem>
-</file>
-
-<file path=customXml/itemProps4.xml><?xml version="1.0" encoding="utf-8"?>
-<ds:datastoreItem xmlns:ds="http://schemas.openxmlformats.org/officeDocument/2006/customXml" ds:itemID="{CE178A92-2A4A-4337-B7B7-67EB322B5A46}">
-  <ds:schemaRefs>
-    <ds:schemaRef ds:uri="http://www.joulesunlimited.com/juid"/>
-  </ds:schemaRefs>
-</ds:datastoreItem>
-</file>
-
-<file path=customXml/itemProps5.xml><?xml version="1.0" encoding="utf-8"?>
-<ds:datastoreItem xmlns:ds="http://schemas.openxmlformats.org/officeDocument/2006/customXml" ds:itemID="{7BB09290-3589-4182-ADD1-CA2E3C0F771D}">
-  <ds:schemaRefs>
-    <ds:schemaRef ds:uri="http://www.joulesunlimited.com/juid"/>
-  </ds:schemaRefs>
-</ds:datastoreItem>
-</file>
-
-<file path=customXml/itemProps6.xml><?xml version="1.0" encoding="utf-8"?>
-<ds:datastoreItem xmlns:ds="http://schemas.openxmlformats.org/officeDocument/2006/customXml" ds:itemID="{21B56ADA-EAA5-4575-ADE9-DE594485FA0E}">
-  <ds:schemaRefs>
-    <ds:schemaRef ds:uri="http://www.joulesunlimited.com/juid"/>
-  </ds:schemaRefs>
-</ds:datastoreItem>
-</file>
-
-<file path=customXml/itemProps7.xml><?xml version="1.0" encoding="utf-8"?>
-<ds:datastoreItem xmlns:ds="http://schemas.openxmlformats.org/officeDocument/2006/customXml" ds:itemID="{1371732C-77C3-47EE-BF45-4B66918F92B9}">
-  <ds:schemaRefs>
-    <ds:schemaRef ds:uri="http://www.joulesunlimited.com/juid"/>
-  </ds:schemaRefs>
-</ds:datastoreItem>
-</file>
-
-<file path=customXml/itemProps8.xml><?xml version="1.0" encoding="utf-8"?>
-<ds:datastoreItem xmlns:ds="http://schemas.openxmlformats.org/officeDocument/2006/customXml" ds:itemID="{7AB8C431-82F7-4495-9402-9D5736F47226}">
-  <ds:schemaRefs>
-    <ds:schemaRef ds:uri="http://www.joulesunlimited.com/juid"/>
-  </ds:schemaRefs>
-</ds:datastoreItem>
-</file>
-
-<file path=customXml/itemProps9.xml><?xml version="1.0" encoding="utf-8"?>
-<ds:datastoreItem xmlns:ds="http://schemas.openxmlformats.org/officeDocument/2006/customXml" ds:itemID="{4FCC20A6-1F8E-4FD8-A432-F84132A3DB86}">
-  <ds:schemaRefs>
-    <ds:schemaRef ds:uri="http://www.joulesunlimited.com/juid"/>
-  </ds:schemaRefs>
-</ds:datastoreItem>
 </file>
</xml_diff>